<commit_message>
(Issue #133) Refactoring slides and content.  Added in more notes.
</commit_message>
<xml_diff>
--- a/lab-notebooks.pptx
+++ b/lab-notebooks.pptx
@@ -23,10 +23,10 @@
     <p:sldId id="330" r:id="rId14"/>
     <p:sldId id="332" r:id="rId15"/>
     <p:sldId id="331" r:id="rId16"/>
-    <p:sldId id="333" r:id="rId17"/>
-    <p:sldId id="336" r:id="rId18"/>
-    <p:sldId id="341" r:id="rId19"/>
-    <p:sldId id="338" r:id="rId20"/>
+    <p:sldId id="336" r:id="rId17"/>
+    <p:sldId id="341" r:id="rId18"/>
+    <p:sldId id="338" r:id="rId19"/>
+    <p:sldId id="345" r:id="rId20"/>
     <p:sldId id="335" r:id="rId21"/>
     <p:sldId id="342" r:id="rId22"/>
     <p:sldId id="343" r:id="rId23"/>
@@ -275,7 +275,7 @@
           <a:p>
             <a:fld id="{0B842F42-2CE9-4E35-95C1-410DC08A50B1}" type="datetimeFigureOut">
               <a:rPr lang="en-US" smtClean="0"/>
-              <a:t>7/19/22</a:t>
+              <a:t>7/22/22</a:t>
             </a:fld>
             <a:endParaRPr lang="en-US"/>
           </a:p>
@@ -440,7 +440,7 @@
           <a:p>
             <a:fld id="{6F282904-F315-4730-8D91-37D99E141A6F}" type="datetimeFigureOut">
               <a:rPr lang="en-US" smtClean="0"/>
-              <a:t>7/19/22</a:t>
+              <a:t>7/22/22</a:t>
             </a:fld>
             <a:endParaRPr lang="en-US"/>
           </a:p>
@@ -751,38 +751,35 @@
           <a:bodyPr/>
           <a:lstStyle/>
           <a:p>
-            <a:pPr marL="0" marR="0" lvl="0" indent="0" algn="l" defTabSz="914400" rtl="0" eaLnBrk="1" fontAlgn="auto" latinLnBrk="0" hangingPunct="1">
-              <a:lnSpc>
-                <a:spcPct val="100000"/>
-              </a:lnSpc>
-              <a:spcBef>
-                <a:spcPts val="0"/>
-              </a:spcBef>
-              <a:spcAft>
-                <a:spcPts val="0"/>
-              </a:spcAft>
-              <a:buClrTx/>
-              <a:buSzTx/>
-              <a:buFontTx/>
-              <a:buNone/>
-              <a:tabLst/>
-              <a:defRPr/>
-            </a:pPr>
-            <a:r>
-              <a:rPr lang="en-US" sz="1200" kern="1200" dirty="0">
-                <a:solidFill>
-                  <a:schemeClr val="tx1"/>
-                </a:solidFill>
-                <a:effectLst/>
-                <a:latin typeface="+mn-lt"/>
-                <a:ea typeface="+mn-ea"/>
-                <a:cs typeface="+mn-cs"/>
-              </a:rPr>
-              <a:t>This talk has grown from many interesting conversations that I have had with a variety of different computational sciences.  This includes different disciplines and different experience levels.  When I have these conversations, all parties generally tend to learn something.  This module will continue along those lines.  I am not here to convince anyone of anything.  I am not here to preach.  I am just here to present a novel experience.  Please ask me questions.  I will be direct and state strong opinions.  Therefore, please be direct and push back on some of these.</a:t>
+            <a:r>
+              <a:rPr lang="en-US" dirty="0"/>
+              <a:t>This talk was designed for 45 minutes</a:t>
             </a:r>
           </a:p>
           <a:p>
             <a:endParaRPr lang="en-US" dirty="0"/>
+          </a:p>
+          <a:p>
+            <a:r>
+              <a:rPr lang="en-US" dirty="0"/>
+              <a:t>This is a journey because we ramp up from fundamental, high-level concepts, through documentation to a concrete example of documentation.  </a:t>
+            </a:r>
+            <a:r>
+              <a:rPr lang="en-US" dirty="0" err="1"/>
+              <a:t>Anshu</a:t>
+            </a:r>
+            <a:r>
+              <a:rPr lang="en-US" dirty="0"/>
+              <a:t> and I have designed this talk and the talk on lab environments that follows it so that one is the extension of the other.  The second acknowledges that lab notebooks don’t exist as a single entity but must be baked into a larger lab env.  </a:t>
+            </a:r>
+            <a:r>
+              <a:rPr lang="en-US" dirty="0" err="1"/>
+              <a:t>Anshu</a:t>
+            </a:r>
+            <a:r>
+              <a:rPr lang="en-US" dirty="0"/>
+              <a:t> caps it all off by discussing how to use a lab env in the larger scale of a research campaign.  In this case, we have structured the journey as a long, sustained bottom-up crescendo toward discussing the importance of scientific rigor in computational sciences in a way that will hopefully be immediately relatable to the audience’s life.  Hopefully, this will help them appreciate retroactively the mundane low-level details discussed earlier.</a:t>
+            </a:r>
           </a:p>
         </p:txBody>
       </p:sp>
@@ -803,7 +800,7 @@
           <a:p>
             <a:fld id="{54E672D7-8E2D-4611-973D-F4591A707C34}" type="slidenum">
               <a:rPr lang="en-US" smtClean="0"/>
-              <a:t>3</a:t>
+              <a:t>1</a:t>
             </a:fld>
             <a:endParaRPr lang="en-US"/>
           </a:p>
@@ -812,7 +809,7 @@
     </p:spTree>
     <p:extLst>
       <p:ext uri="{BB962C8B-B14F-4D97-AF65-F5344CB8AC3E}">
-        <p14:creationId xmlns:p14="http://schemas.microsoft.com/office/powerpoint/2010/main" val="1936705258"/>
+        <p14:creationId xmlns:p14="http://schemas.microsoft.com/office/powerpoint/2010/main" val="4134398682"/>
       </p:ext>
     </p:extLst>
   </p:cSld>
@@ -867,12 +864,17 @@
           <a:lstStyle/>
           <a:p>
             <a:r>
-              <a:rPr lang="en-US" dirty="0" err="1"/>
-              <a:t>Kanare’s</a:t>
-            </a:r>
-            <a:r>
-              <a:rPr lang="en-US" dirty="0"/>
-              <a:t> quote does not imply that we need to put in motivation, reasoning, conclusions.  The quote makes it sound more like a cookbook.  I like to expand that so that the content captures the state of my brain and my train of thought.  Then, rereading my notes helps me load that state into my brain.</a:t>
+              <a:rPr lang="en-US" dirty="0"/>
+              <a:t>I believe that this is also known as debriefing.</a:t>
+            </a:r>
+          </a:p>
+          <a:p>
+            <a:endParaRPr lang="en-US" dirty="0"/>
+          </a:p>
+          <a:p>
+            <a:r>
+              <a:rPr lang="en-US" dirty="0"/>
+              <a:t>When we go through experiences we can grow and improve.  But processes exist to help us maximize that growth and improvement.</a:t>
             </a:r>
           </a:p>
         </p:txBody>
@@ -894,7 +896,7 @@
           <a:p>
             <a:fld id="{54E672D7-8E2D-4611-973D-F4591A707C34}" type="slidenum">
               <a:rPr lang="en-US" smtClean="0"/>
-              <a:t>15</a:t>
+              <a:t>11</a:t>
             </a:fld>
             <a:endParaRPr lang="en-US"/>
           </a:p>
@@ -903,7 +905,7 @@
     </p:spTree>
     <p:extLst>
       <p:ext uri="{BB962C8B-B14F-4D97-AF65-F5344CB8AC3E}">
-        <p14:creationId xmlns:p14="http://schemas.microsoft.com/office/powerpoint/2010/main" val="2768668385"/>
+        <p14:creationId xmlns:p14="http://schemas.microsoft.com/office/powerpoint/2010/main" val="3152359200"/>
       </p:ext>
     </p:extLst>
   </p:cSld>
@@ -959,16 +961,7 @@
           <a:p>
             <a:r>
               <a:rPr lang="en-US" dirty="0"/>
-              <a:t>The filtered lab notebook is from the instrument CRIRES+.  You have a team that has worked on the science verification and interfacing with public (user manual, tools), a team that works on data analysis pipelines (pipeline changes), a team that works on the hardware.  We can imagine that each team maintained a true lab notebook for their work.  These were then filtered and merged for the consumption by public.  </a:t>
-            </a:r>
-          </a:p>
-          <a:p>
-            <a:endParaRPr lang="en-US" dirty="0"/>
-          </a:p>
-          <a:p>
-            <a:r>
-              <a:rPr lang="en-US" dirty="0"/>
-              <a:t>The filtering should not be too strong as one cannot know what details are necessary for all the public scientists to do their work.</a:t>
+              <a:t>Not all documents are alike.</a:t>
             </a:r>
           </a:p>
         </p:txBody>
@@ -990,7 +983,7 @@
           <a:p>
             <a:fld id="{54E672D7-8E2D-4611-973D-F4591A707C34}" type="slidenum">
               <a:rPr lang="en-US" smtClean="0"/>
-              <a:t>16</a:t>
+              <a:t>12</a:t>
             </a:fld>
             <a:endParaRPr lang="en-US"/>
           </a:p>
@@ -999,7 +992,7 @@
     </p:spTree>
     <p:extLst>
       <p:ext uri="{BB962C8B-B14F-4D97-AF65-F5344CB8AC3E}">
-        <p14:creationId xmlns:p14="http://schemas.microsoft.com/office/powerpoint/2010/main" val="2213378732"/>
+        <p14:creationId xmlns:p14="http://schemas.microsoft.com/office/powerpoint/2010/main" val="4157260062"/>
       </p:ext>
     </p:extLst>
   </p:cSld>
@@ -1055,16 +1048,7 @@
           <a:p>
             <a:r>
               <a:rPr lang="en-US" dirty="0"/>
-              <a:t>Ask if any of the attendees ever sensed in their gut that things were not being done sufficiently cleanly or well.  Does this notion of inventing techniques resonate with them?  Have you reinvented the wheel?</a:t>
-            </a:r>
-          </a:p>
-          <a:p>
-            <a:endParaRPr lang="en-US" dirty="0"/>
-          </a:p>
-          <a:p>
-            <a:r>
-              <a:rPr lang="en-US" dirty="0"/>
-              <a:t>Is this surprising to anyone?  Does anyone already use something akin to a lab notebook?</a:t>
+              <a:t>Automated is in quotes because the TIOs and astronomers still needed to input information into a system.  But there was a process for them to input such data into tools that aggregated their input with other notes.</a:t>
             </a:r>
           </a:p>
         </p:txBody>
@@ -1086,7 +1070,7 @@
           <a:p>
             <a:fld id="{54E672D7-8E2D-4611-973D-F4591A707C34}" type="slidenum">
               <a:rPr lang="en-US" smtClean="0"/>
-              <a:t>17</a:t>
+              <a:t>13</a:t>
             </a:fld>
             <a:endParaRPr lang="en-US"/>
           </a:p>
@@ -1095,7 +1079,7 @@
     </p:spTree>
     <p:extLst>
       <p:ext uri="{BB962C8B-B14F-4D97-AF65-F5344CB8AC3E}">
-        <p14:creationId xmlns:p14="http://schemas.microsoft.com/office/powerpoint/2010/main" val="3785804979"/>
+        <p14:creationId xmlns:p14="http://schemas.microsoft.com/office/powerpoint/2010/main" val="2141150432"/>
       </p:ext>
     </p:extLst>
   </p:cSld>
@@ -1151,7 +1135,20 @@
           <a:p>
             <a:r>
               <a:rPr lang="en-US" dirty="0"/>
-              <a:t>Let’s me concentrate on the work </a:t>
+              <a:t>Emphasize no filtering.  We often believe in the moment that we can predict what will be relevant and useful.  We are usually wrong.</a:t>
+            </a:r>
+          </a:p>
+          <a:p>
+            <a:endParaRPr lang="en-US" dirty="0"/>
+          </a:p>
+          <a:p>
+            <a:r>
+              <a:rPr lang="en-US" dirty="0" err="1"/>
+              <a:t>Kanare’s</a:t>
+            </a:r>
+            <a:r>
+              <a:rPr lang="en-US" dirty="0"/>
+              <a:t> quote does not imply that we need to put in motivation, reasoning, conclusions.  The quote makes it sound more like a cookbook.  I like to expand that so that the content captures the state of my brain and my train of thought.  Then, rereading my notes helps me load that state into my brain.  Hopefully it will do the same for others.</a:t>
             </a:r>
           </a:p>
         </p:txBody>
@@ -1173,7 +1170,7 @@
           <a:p>
             <a:fld id="{54E672D7-8E2D-4611-973D-F4591A707C34}" type="slidenum">
               <a:rPr lang="en-US" smtClean="0"/>
-              <a:t>18</a:t>
+              <a:t>14</a:t>
             </a:fld>
             <a:endParaRPr lang="en-US"/>
           </a:p>
@@ -1182,7 +1179,7 @@
     </p:spTree>
     <p:extLst>
       <p:ext uri="{BB962C8B-B14F-4D97-AF65-F5344CB8AC3E}">
-        <p14:creationId xmlns:p14="http://schemas.microsoft.com/office/powerpoint/2010/main" val="2021161080"/>
+        <p14:creationId xmlns:p14="http://schemas.microsoft.com/office/powerpoint/2010/main" val="2768668385"/>
       </p:ext>
     </p:extLst>
   </p:cSld>
@@ -1238,7 +1235,7 @@
           <a:p>
             <a:r>
               <a:rPr lang="en-US" dirty="0"/>
-              <a:t>I have tried playing around with multiple different non-ELN tools to adapt them to my needs.  To date, Microsoft OneNote was the closest to what I expect and need, but still fell short.</a:t>
+              <a:t>The filtered lab notebook is from the instrument CRIRES+.  You have a team that has worked on the science verification and interfacing with public (user manual, tools), a team that works on data analysis pipelines (pipeline changes), a distributed team that works on the hardware.  We can imagine that each team maintained a true lab notebook for their work.  These were then filtered and merged for the consumption by public.  </a:t>
             </a:r>
           </a:p>
           <a:p>
@@ -1247,7 +1244,7 @@
           <a:p>
             <a:r>
               <a:rPr lang="en-US" dirty="0"/>
-              <a:t>I, and I have seen others, end up jumping around, which might work if done well, but could make life harder.</a:t>
+              <a:t>The filtering should not be too strong as one cannot know what details are necessary for all the public scientists to do their work.</a:t>
             </a:r>
           </a:p>
         </p:txBody>
@@ -1269,7 +1266,7 @@
           <a:p>
             <a:fld id="{54E672D7-8E2D-4611-973D-F4591A707C34}" type="slidenum">
               <a:rPr lang="en-US" smtClean="0"/>
-              <a:t>19</a:t>
+              <a:t>15</a:t>
             </a:fld>
             <a:endParaRPr lang="en-US"/>
           </a:p>
@@ -1278,7 +1275,7 @@
     </p:spTree>
     <p:extLst>
       <p:ext uri="{BB962C8B-B14F-4D97-AF65-F5344CB8AC3E}">
-        <p14:creationId xmlns:p14="http://schemas.microsoft.com/office/powerpoint/2010/main" val="3675372732"/>
+        <p14:creationId xmlns:p14="http://schemas.microsoft.com/office/powerpoint/2010/main" val="2213378732"/>
       </p:ext>
     </p:extLst>
   </p:cSld>
@@ -1334,6 +1331,294 @@
           <a:p>
             <a:r>
               <a:rPr lang="en-US" dirty="0"/>
+              <a:t>Ask if any of the attendees ever sensed in their gut that things were not being done sufficiently cleanly or well.  Does this notion of inventing techniques resonate with them?  Have you reinvented the wheel?</a:t>
+            </a:r>
+          </a:p>
+          <a:p>
+            <a:endParaRPr lang="en-US" dirty="0"/>
+          </a:p>
+          <a:p>
+            <a:r>
+              <a:rPr lang="en-US" dirty="0"/>
+              <a:t>Is this surprising to anyone?  Does anyone already use something akin to a lab notebook?</a:t>
+            </a:r>
+          </a:p>
+        </p:txBody>
+      </p:sp>
+      <p:sp>
+        <p:nvSpPr>
+          <p:cNvPr id="4" name="Slide Number Placeholder 3"/>
+          <p:cNvSpPr>
+            <a:spLocks noGrp="1"/>
+          </p:cNvSpPr>
+          <p:nvPr>
+            <p:ph type="sldNum" sz="quarter" idx="5"/>
+          </p:nvPr>
+        </p:nvSpPr>
+        <p:spPr/>
+        <p:txBody>
+          <a:bodyPr/>
+          <a:lstStyle/>
+          <a:p>
+            <a:fld id="{54E672D7-8E2D-4611-973D-F4591A707C34}" type="slidenum">
+              <a:rPr lang="en-US" smtClean="0"/>
+              <a:t>17</a:t>
+            </a:fld>
+            <a:endParaRPr lang="en-US"/>
+          </a:p>
+        </p:txBody>
+      </p:sp>
+    </p:spTree>
+    <p:extLst>
+      <p:ext uri="{BB962C8B-B14F-4D97-AF65-F5344CB8AC3E}">
+        <p14:creationId xmlns:p14="http://schemas.microsoft.com/office/powerpoint/2010/main" val="3785804979"/>
+      </p:ext>
+    </p:extLst>
+  </p:cSld>
+  <p:clrMapOvr>
+    <a:masterClrMapping/>
+  </p:clrMapOvr>
+</p:notes>
+</file>
+
+<file path=ppt/notesSlides/notesSlide16.xml><?xml version="1.0" encoding="utf-8"?>
+<p:notes xmlns:a="http://schemas.openxmlformats.org/drawingml/2006/main" xmlns:r="http://schemas.openxmlformats.org/officeDocument/2006/relationships" xmlns:p="http://schemas.openxmlformats.org/presentationml/2006/main">
+  <p:cSld>
+    <p:spTree>
+      <p:nvGrpSpPr>
+        <p:cNvPr id="1" name=""/>
+        <p:cNvGrpSpPr/>
+        <p:nvPr/>
+      </p:nvGrpSpPr>
+      <p:grpSpPr>
+        <a:xfrm>
+          <a:off x="0" y="0"/>
+          <a:ext cx="0" cy="0"/>
+          <a:chOff x="0" y="0"/>
+          <a:chExt cx="0" cy="0"/>
+        </a:xfrm>
+      </p:grpSpPr>
+      <p:sp>
+        <p:nvSpPr>
+          <p:cNvPr id="2" name="Slide Image Placeholder 1"/>
+          <p:cNvSpPr>
+            <a:spLocks noGrp="1" noRot="1" noChangeAspect="1"/>
+          </p:cNvSpPr>
+          <p:nvPr>
+            <p:ph type="sldImg"/>
+          </p:nvPr>
+        </p:nvSpPr>
+        <p:spPr/>
+      </p:sp>
+      <p:sp>
+        <p:nvSpPr>
+          <p:cNvPr id="3" name="Notes Placeholder 2"/>
+          <p:cNvSpPr>
+            <a:spLocks noGrp="1"/>
+          </p:cNvSpPr>
+          <p:nvPr>
+            <p:ph type="body" idx="1"/>
+          </p:nvPr>
+        </p:nvSpPr>
+        <p:spPr/>
+        <p:txBody>
+          <a:bodyPr/>
+          <a:lstStyle/>
+          <a:p>
+            <a:r>
+              <a:rPr lang="en-US" dirty="0"/>
+              <a:t>Let’s me concentrate on the work </a:t>
+            </a:r>
+          </a:p>
+        </p:txBody>
+      </p:sp>
+      <p:sp>
+        <p:nvSpPr>
+          <p:cNvPr id="4" name="Slide Number Placeholder 3"/>
+          <p:cNvSpPr>
+            <a:spLocks noGrp="1"/>
+          </p:cNvSpPr>
+          <p:nvPr>
+            <p:ph type="sldNum" sz="quarter" idx="5"/>
+          </p:nvPr>
+        </p:nvSpPr>
+        <p:spPr/>
+        <p:txBody>
+          <a:bodyPr/>
+          <a:lstStyle/>
+          <a:p>
+            <a:fld id="{54E672D7-8E2D-4611-973D-F4591A707C34}" type="slidenum">
+              <a:rPr lang="en-US" smtClean="0"/>
+              <a:t>18</a:t>
+            </a:fld>
+            <a:endParaRPr lang="en-US"/>
+          </a:p>
+        </p:txBody>
+      </p:sp>
+    </p:spTree>
+    <p:extLst>
+      <p:ext uri="{BB962C8B-B14F-4D97-AF65-F5344CB8AC3E}">
+        <p14:creationId xmlns:p14="http://schemas.microsoft.com/office/powerpoint/2010/main" val="2021161080"/>
+      </p:ext>
+    </p:extLst>
+  </p:cSld>
+  <p:clrMapOvr>
+    <a:masterClrMapping/>
+  </p:clrMapOvr>
+</p:notes>
+</file>
+
+<file path=ppt/notesSlides/notesSlide17.xml><?xml version="1.0" encoding="utf-8"?>
+<p:notes xmlns:a="http://schemas.openxmlformats.org/drawingml/2006/main" xmlns:r="http://schemas.openxmlformats.org/officeDocument/2006/relationships" xmlns:p="http://schemas.openxmlformats.org/presentationml/2006/main">
+  <p:cSld>
+    <p:spTree>
+      <p:nvGrpSpPr>
+        <p:cNvPr id="1" name=""/>
+        <p:cNvGrpSpPr/>
+        <p:nvPr/>
+      </p:nvGrpSpPr>
+      <p:grpSpPr>
+        <a:xfrm>
+          <a:off x="0" y="0"/>
+          <a:ext cx="0" cy="0"/>
+          <a:chOff x="0" y="0"/>
+          <a:chExt cx="0" cy="0"/>
+        </a:xfrm>
+      </p:grpSpPr>
+      <p:sp>
+        <p:nvSpPr>
+          <p:cNvPr id="2" name="Slide Image Placeholder 1"/>
+          <p:cNvSpPr>
+            <a:spLocks noGrp="1" noRot="1" noChangeAspect="1"/>
+          </p:cNvSpPr>
+          <p:nvPr>
+            <p:ph type="sldImg"/>
+          </p:nvPr>
+        </p:nvSpPr>
+        <p:spPr/>
+      </p:sp>
+      <p:sp>
+        <p:nvSpPr>
+          <p:cNvPr id="3" name="Notes Placeholder 2"/>
+          <p:cNvSpPr>
+            <a:spLocks noGrp="1"/>
+          </p:cNvSpPr>
+          <p:nvPr>
+            <p:ph type="body" idx="1"/>
+          </p:nvPr>
+        </p:nvSpPr>
+        <p:spPr/>
+        <p:txBody>
+          <a:bodyPr/>
+          <a:lstStyle/>
+          <a:p>
+            <a:r>
+              <a:rPr lang="en-US" dirty="0"/>
+              <a:t>I have tried playing around with multiple different non-ELN tools to adapt them to my needs.  To date, Microsoft OneNote was the closest to what I expect and need, but still fell short.</a:t>
+            </a:r>
+          </a:p>
+          <a:p>
+            <a:endParaRPr lang="en-US" dirty="0"/>
+          </a:p>
+          <a:p>
+            <a:r>
+              <a:rPr lang="en-US" dirty="0"/>
+              <a:t>I, and I have seen others, end up jumping around, which might work if done well, but could make life harder.</a:t>
+            </a:r>
+          </a:p>
+        </p:txBody>
+      </p:sp>
+      <p:sp>
+        <p:nvSpPr>
+          <p:cNvPr id="4" name="Slide Number Placeholder 3"/>
+          <p:cNvSpPr>
+            <a:spLocks noGrp="1"/>
+          </p:cNvSpPr>
+          <p:nvPr>
+            <p:ph type="sldNum" sz="quarter" idx="5"/>
+          </p:nvPr>
+        </p:nvSpPr>
+        <p:spPr/>
+        <p:txBody>
+          <a:bodyPr/>
+          <a:lstStyle/>
+          <a:p>
+            <a:fld id="{54E672D7-8E2D-4611-973D-F4591A707C34}" type="slidenum">
+              <a:rPr lang="en-US" smtClean="0"/>
+              <a:t>19</a:t>
+            </a:fld>
+            <a:endParaRPr lang="en-US"/>
+          </a:p>
+        </p:txBody>
+      </p:sp>
+    </p:spTree>
+    <p:extLst>
+      <p:ext uri="{BB962C8B-B14F-4D97-AF65-F5344CB8AC3E}">
+        <p14:creationId xmlns:p14="http://schemas.microsoft.com/office/powerpoint/2010/main" val="3675372732"/>
+      </p:ext>
+    </p:extLst>
+  </p:cSld>
+  <p:clrMapOvr>
+    <a:masterClrMapping/>
+  </p:clrMapOvr>
+</p:notes>
+</file>
+
+<file path=ppt/notesSlides/notesSlide18.xml><?xml version="1.0" encoding="utf-8"?>
+<p:notes xmlns:a="http://schemas.openxmlformats.org/drawingml/2006/main" xmlns:r="http://schemas.openxmlformats.org/officeDocument/2006/relationships" xmlns:p="http://schemas.openxmlformats.org/presentationml/2006/main">
+  <p:cSld>
+    <p:spTree>
+      <p:nvGrpSpPr>
+        <p:cNvPr id="1" name=""/>
+        <p:cNvGrpSpPr/>
+        <p:nvPr/>
+      </p:nvGrpSpPr>
+      <p:grpSpPr>
+        <a:xfrm>
+          <a:off x="0" y="0"/>
+          <a:ext cx="0" cy="0"/>
+          <a:chOff x="0" y="0"/>
+          <a:chExt cx="0" cy="0"/>
+        </a:xfrm>
+      </p:grpSpPr>
+      <p:sp>
+        <p:nvSpPr>
+          <p:cNvPr id="2" name="Slide Image Placeholder 1"/>
+          <p:cNvSpPr>
+            <a:spLocks noGrp="1" noRot="1" noChangeAspect="1"/>
+          </p:cNvSpPr>
+          <p:nvPr>
+            <p:ph type="sldImg"/>
+          </p:nvPr>
+        </p:nvSpPr>
+        <p:spPr/>
+      </p:sp>
+      <p:sp>
+        <p:nvSpPr>
+          <p:cNvPr id="3" name="Notes Placeholder 2"/>
+          <p:cNvSpPr>
+            <a:spLocks noGrp="1"/>
+          </p:cNvSpPr>
+          <p:nvPr>
+            <p:ph type="body" idx="1"/>
+          </p:nvPr>
+        </p:nvSpPr>
+        <p:spPr/>
+        <p:txBody>
+          <a:bodyPr/>
+          <a:lstStyle/>
+          <a:p>
+            <a:r>
+              <a:rPr lang="en-US" dirty="0"/>
+              <a:t>Explain that this slide is a cliffhanger.  We will explore this topic and attempt to answer these questions in the next talk.  Also, be frank and explain that I am presently in the process of re-inventing the wheel and don’t necessarily know the answers to these questions.</a:t>
+            </a:r>
+          </a:p>
+          <a:p>
+            <a:endParaRPr lang="en-US" dirty="0"/>
+          </a:p>
+          <a:p>
+            <a:r>
+              <a:rPr lang="en-US" dirty="0"/>
               <a:t>If we scatter notes across multiple tools, how do we and should we be able to combine them into something that looks like an actual lab notebook?</a:t>
             </a:r>
           </a:p>
@@ -1343,7 +1628,7 @@
           <a:p>
             <a:r>
               <a:rPr lang="en-US" dirty="0"/>
-              <a:t>I would imagine that many developers would say that this commit message is not great.</a:t>
+              <a:t>I would imagine that many SW engineers would say that this commit message is not great.  In fact GitHub and GitLab often tell me that my messages don’t conform to best practices.</a:t>
             </a:r>
           </a:p>
           <a:p>
@@ -1363,6 +1648,43 @@
               <a:rPr lang="en-US" dirty="0"/>
               <a:t>Rereading my commit messages as a first part of a code review helps me load the chronology and the big picture.</a:t>
             </a:r>
+          </a:p>
+          <a:p>
+            <a:endParaRPr lang="en-US" dirty="0"/>
+          </a:p>
+          <a:p>
+            <a:pPr marL="0" marR="0" lvl="0" indent="0" algn="l" defTabSz="914400" rtl="0" eaLnBrk="1" fontAlgn="auto" latinLnBrk="0" hangingPunct="1">
+              <a:lnSpc>
+                <a:spcPct val="100000"/>
+              </a:lnSpc>
+              <a:spcBef>
+                <a:spcPts val="0"/>
+              </a:spcBef>
+              <a:spcAft>
+                <a:spcPts val="0"/>
+              </a:spcAft>
+              <a:buClrTx/>
+              <a:buSzTx/>
+              <a:buFontTx/>
+              <a:buNone/>
+              <a:tabLst/>
+              <a:defRPr/>
+            </a:pPr>
+            <a:r>
+              <a:rPr lang="en-US" dirty="0"/>
+              <a:t>I assume that there are areas of computational science (e.g., nuclear science and engineering, simulations that aid in designing life critical systems such as planes).  This is what I mentioned at the beginning of the talk.  Rather than search out differences, we need to search out </a:t>
+            </a:r>
+            <a:r>
+              <a:rPr lang="en-US" dirty="0" err="1"/>
+              <a:t>similiarities</a:t>
+            </a:r>
+            <a:r>
+              <a:rPr lang="en-US" dirty="0"/>
+              <a:t> when we talk with people from different disciplines and sub-disciplines.  Ask them about the pain points related to doing low-level foundational science and how they try to overcome them.   Yes, we are reinventing the wheel, but hopefully we can do so quickly and successfully by sharing with and learning from others.</a:t>
+            </a:r>
+          </a:p>
+          <a:p>
+            <a:endParaRPr lang="en-US" dirty="0"/>
           </a:p>
         </p:txBody>
       </p:sp>
@@ -1446,13 +1768,19 @@
           <a:bodyPr/>
           <a:lstStyle/>
           <a:p>
+            <a:r>
+              <a:rPr lang="en-US" dirty="0"/>
+              <a:t>Emphasize that Katherine’s quote has three main points, each of which resonates with me.</a:t>
+            </a:r>
+          </a:p>
+          <a:p>
             <a:pPr marL="171450" indent="-171450">
               <a:buFont typeface="Arial" panose="020B0604020202020204" pitchFamily="34" charset="0"/>
               <a:buChar char="•"/>
             </a:pPr>
             <a:r>
               <a:rPr lang="en-US" dirty="0"/>
-              <a:t>Physics was mostly about designing, constructing, all aspects of scientific data including data analysis.</a:t>
+              <a:t>low-level science practices are required to do rigorous, reproducible science</a:t>
             </a:r>
           </a:p>
           <a:p>
@@ -1460,33 +1788,10 @@
               <a:buFont typeface="Arial" panose="020B0604020202020204" pitchFamily="34" charset="0"/>
               <a:buChar char="•"/>
             </a:pPr>
-            <a:endParaRPr lang="en-US" dirty="0"/>
-          </a:p>
-          <a:p>
-            <a:pPr marL="0" marR="0" lvl="0" indent="0" algn="l" defTabSz="914400" rtl="0" eaLnBrk="1" fontAlgn="auto" latinLnBrk="0" hangingPunct="1">
-              <a:lnSpc>
-                <a:spcPct val="100000"/>
-              </a:lnSpc>
-              <a:spcBef>
-                <a:spcPts val="0"/>
-              </a:spcBef>
-              <a:spcAft>
-                <a:spcPts val="0"/>
-              </a:spcAft>
-              <a:buClrTx/>
-              <a:buSzTx/>
-              <a:buFontTx/>
-              <a:buNone/>
-              <a:tabLst/>
-              <a:defRPr/>
-            </a:pPr>
-            <a:r>
-              <a:rPr lang="en-US" dirty="0"/>
-              <a:t>* Observatory was working to ensure high-quality results with full context so that public can do science</a:t>
-            </a:r>
-          </a:p>
-          <a:p>
-            <a:endParaRPr lang="en-US" dirty="0"/>
+            <a:r>
+              <a:rPr lang="en-US" dirty="0"/>
+              <a:t>Experimentalists do understand this</a:t>
+            </a:r>
           </a:p>
           <a:p>
             <a:pPr marL="171450" indent="-171450">
@@ -1495,7 +1800,16 @@
             </a:pPr>
             <a:r>
               <a:rPr lang="en-US" dirty="0"/>
-              <a:t>While my experimental background was closer to R&amp;D, the laboratory work was clearly more about operations - Paranal is a science factory.  This is different in some ways, very rigorous, and at a very large scale.  To adapt ideas/tips/tricks/tools for observatory, there needs to be some simplification.</a:t>
+              <a:t>Computational science not so much</a:t>
+            </a:r>
+          </a:p>
+          <a:p>
+            <a:endParaRPr lang="en-US" dirty="0"/>
+          </a:p>
+          <a:p>
+            <a:r>
+              <a:rPr lang="en-US" dirty="0"/>
+              <a:t>What does she mean by software practices</a:t>
             </a:r>
           </a:p>
           <a:p>
@@ -1503,37 +1817,9 @@
               <a:buFont typeface="Arial" panose="020B0604020202020204" pitchFamily="34" charset="0"/>
               <a:buChar char="•"/>
             </a:pPr>
-            <a:endParaRPr lang="en-US" dirty="0"/>
-          </a:p>
-          <a:p>
-            <a:pPr marL="171450" marR="0" lvl="0" indent="-171450" algn="l" defTabSz="914400" rtl="0" eaLnBrk="1" fontAlgn="auto" latinLnBrk="0" hangingPunct="1">
-              <a:lnSpc>
-                <a:spcPct val="100000"/>
-              </a:lnSpc>
-              <a:spcBef>
-                <a:spcPts val="0"/>
-              </a:spcBef>
-              <a:spcAft>
-                <a:spcPts val="0"/>
-              </a:spcAft>
-              <a:buClrTx/>
-              <a:buSzTx/>
-              <a:buFont typeface="Arial" panose="020B0604020202020204" pitchFamily="34" charset="0"/>
-              <a:buChar char="•"/>
-              <a:tabLst/>
-              <a:defRPr/>
-            </a:pPr>
-            <a:r>
-              <a:rPr lang="en-US" dirty="0"/>
-              <a:t>Part of working on scientific instrumentation is understanding how the data is generated and therefore understanding how to correctly and rigorously </a:t>
-            </a:r>
-            <a:r>
-              <a:rPr lang="en-US" dirty="0" err="1"/>
-              <a:t>analyse</a:t>
-            </a:r>
-            <a:r>
-              <a:rPr lang="en-US" dirty="0"/>
-              <a:t> data and draw conclusions from data.</a:t>
+            <a:r>
+              <a:rPr lang="en-US" dirty="0"/>
+              <a:t>Design and implement software following best practices</a:t>
             </a:r>
           </a:p>
           <a:p>
@@ -1541,29 +1827,9 @@
               <a:buFont typeface="Arial" panose="020B0604020202020204" pitchFamily="34" charset="0"/>
               <a:buChar char="•"/>
             </a:pPr>
-            <a:endParaRPr lang="en-US" dirty="0"/>
-          </a:p>
-          <a:p>
-            <a:pPr marL="171450" marR="0" lvl="0" indent="-171450" algn="l" defTabSz="914400" rtl="0" eaLnBrk="1" fontAlgn="auto" latinLnBrk="0" hangingPunct="1">
-              <a:lnSpc>
-                <a:spcPct val="100000"/>
-              </a:lnSpc>
-              <a:spcBef>
-                <a:spcPts val="0"/>
-              </a:spcBef>
-              <a:spcAft>
-                <a:spcPts val="0"/>
-              </a:spcAft>
-              <a:buClrTx/>
-              <a:buSzTx/>
-              <a:buFont typeface="Arial" panose="020B0604020202020204" pitchFamily="34" charset="0"/>
-              <a:buChar char="•"/>
-              <a:tabLst/>
-              <a:defRPr/>
-            </a:pPr>
-            <a:r>
-              <a:rPr lang="en-US" dirty="0"/>
-              <a:t>Emphasize that implicit in this is my belief that developing scientific software is developing a scientific instrument.  How many people share this view?  If not, how do people view their software and how they use it?</a:t>
+            <a:r>
+              <a:rPr lang="en-US" dirty="0"/>
+              <a:t>Test your code</a:t>
             </a:r>
           </a:p>
           <a:p>
@@ -1571,7 +1837,47 @@
               <a:buFont typeface="Arial" panose="020B0604020202020204" pitchFamily="34" charset="0"/>
               <a:buChar char="•"/>
             </a:pPr>
+            <a:r>
+              <a:rPr lang="en-US" dirty="0"/>
+              <a:t>Use version control and use it well</a:t>
+            </a:r>
+          </a:p>
+          <a:p>
+            <a:pPr marL="171450" indent="-171450">
+              <a:buFont typeface="Arial" panose="020B0604020202020204" pitchFamily="34" charset="0"/>
+              <a:buChar char="•"/>
+            </a:pPr>
+            <a:r>
+              <a:rPr lang="en-US" dirty="0"/>
+              <a:t>Code reviews</a:t>
+            </a:r>
+          </a:p>
+          <a:p>
+            <a:pPr marL="171450" indent="-171450">
+              <a:buFont typeface="Arial" panose="020B0604020202020204" pitchFamily="34" charset="0"/>
+              <a:buChar char="•"/>
+            </a:pPr>
+            <a:r>
+              <a:rPr lang="en-US" dirty="0"/>
+              <a:t>Documentation (e.g., document your assumptions)</a:t>
+            </a:r>
+          </a:p>
+          <a:p>
             <a:endParaRPr lang="en-US" dirty="0"/>
+          </a:p>
+          <a:p>
+            <a:r>
+              <a:rPr lang="en-US" dirty="0"/>
+              <a:t>Many people refer to this as “software engineering”.  I whole-heartedly disagree with this.  I understand this work to be foundational, bedrock science that is required to do high-quality trustworthy high-level science.  But, we need not reinvent the wheel.  We can learn from the SW </a:t>
+            </a:r>
+            <a:r>
+              <a:rPr lang="en-US" dirty="0" err="1"/>
+              <a:t>Eng</a:t>
+            </a:r>
+            <a:r>
+              <a:rPr lang="en-US" dirty="0"/>
+              <a:t> community and adapt what they know and use.</a:t>
+            </a:r>
           </a:p>
         </p:txBody>
       </p:sp>
@@ -1592,7 +1898,7 @@
           <a:p>
             <a:fld id="{54E672D7-8E2D-4611-973D-F4591A707C34}" type="slidenum">
               <a:rPr lang="en-US" smtClean="0"/>
-              <a:t>4</a:t>
+              <a:t>3</a:t>
             </a:fld>
             <a:endParaRPr lang="en-US"/>
           </a:p>
@@ -1601,7 +1907,7 @@
     </p:spTree>
     <p:extLst>
       <p:ext uri="{BB962C8B-B14F-4D97-AF65-F5344CB8AC3E}">
-        <p14:creationId xmlns:p14="http://schemas.microsoft.com/office/powerpoint/2010/main" val="795729674"/>
+        <p14:creationId xmlns:p14="http://schemas.microsoft.com/office/powerpoint/2010/main" val="1936705258"/>
       </p:ext>
     </p:extLst>
   </p:cSld>
@@ -1655,10 +1961,141 @@
           <a:bodyPr/>
           <a:lstStyle/>
           <a:p>
-            <a:r>
-              <a:rPr lang="en-US" dirty="0"/>
-              <a:t>Point out that if they search for this, they will find many pages.  Those pages have changed over time.  For instance, I often times no longer see understanding included.  I don’t know much beyond this classification, but find the classification to be quite useful.</a:t>
-            </a:r>
+            <a:pPr marL="171450" indent="-171450">
+              <a:buFont typeface="Arial" panose="020B0604020202020204" pitchFamily="34" charset="0"/>
+              <a:buChar char="•"/>
+            </a:pPr>
+            <a:r>
+              <a:rPr lang="en-US" dirty="0"/>
+              <a:t>This slide should give them context for understanding my point of view.  Emphasize that one main point of this talk is to maintain an open mind when talking to people whose work is slightly different.  Therefore, if role is different from yours, don’t assume that what I will say is useless.  Rather, search out similarities rather than differences.</a:t>
+            </a:r>
+          </a:p>
+          <a:p>
+            <a:pPr marL="171450" indent="-171450">
+              <a:buFont typeface="Arial" panose="020B0604020202020204" pitchFamily="34" charset="0"/>
+              <a:buChar char="•"/>
+            </a:pPr>
+            <a:endParaRPr lang="en-US" dirty="0"/>
+          </a:p>
+          <a:p>
+            <a:pPr marL="171450" indent="-171450">
+              <a:buFont typeface="Arial" panose="020B0604020202020204" pitchFamily="34" charset="0"/>
+              <a:buChar char="•"/>
+            </a:pPr>
+            <a:r>
+              <a:rPr lang="en-US" dirty="0"/>
+              <a:t>Physics was mostly about designing, constructing, all aspects of scientific data including data analysis.</a:t>
+            </a:r>
+          </a:p>
+          <a:p>
+            <a:pPr marL="171450" indent="-171450">
+              <a:buFont typeface="Arial" panose="020B0604020202020204" pitchFamily="34" charset="0"/>
+              <a:buChar char="•"/>
+            </a:pPr>
+            <a:endParaRPr lang="en-US" dirty="0"/>
+          </a:p>
+          <a:p>
+            <a:pPr marL="0" marR="0" lvl="0" indent="0" algn="l" defTabSz="914400" rtl="0" eaLnBrk="1" fontAlgn="auto" latinLnBrk="0" hangingPunct="1">
+              <a:lnSpc>
+                <a:spcPct val="100000"/>
+              </a:lnSpc>
+              <a:spcBef>
+                <a:spcPts val="0"/>
+              </a:spcBef>
+              <a:spcAft>
+                <a:spcPts val="0"/>
+              </a:spcAft>
+              <a:buClrTx/>
+              <a:buSzTx/>
+              <a:buFontTx/>
+              <a:buNone/>
+              <a:tabLst/>
+              <a:defRPr/>
+            </a:pPr>
+            <a:r>
+              <a:rPr lang="en-US" dirty="0"/>
+              <a:t>* Observatory was working to ensure high-quality results with full context so that public can do science</a:t>
+            </a:r>
+          </a:p>
+          <a:p>
+            <a:endParaRPr lang="en-US" dirty="0"/>
+          </a:p>
+          <a:p>
+            <a:pPr marL="171450" indent="-171450">
+              <a:buFont typeface="Arial" panose="020B0604020202020204" pitchFamily="34" charset="0"/>
+              <a:buChar char="•"/>
+            </a:pPr>
+            <a:r>
+              <a:rPr lang="en-US" dirty="0"/>
+              <a:t>While my experimental background was closer to R&amp;D, the laboratory work was clearly more about operations - Paranal is a science factory.  This is different in some ways, very rigorous, and at a very large scale.  To adapt ideas/tips/tricks/tools for observatory, there needs to be some simplification.</a:t>
+            </a:r>
+          </a:p>
+          <a:p>
+            <a:pPr marL="171450" indent="-171450">
+              <a:buFont typeface="Arial" panose="020B0604020202020204" pitchFamily="34" charset="0"/>
+              <a:buChar char="•"/>
+            </a:pPr>
+            <a:endParaRPr lang="en-US" dirty="0"/>
+          </a:p>
+          <a:p>
+            <a:pPr marL="171450" marR="0" lvl="0" indent="-171450" algn="l" defTabSz="914400" rtl="0" eaLnBrk="1" fontAlgn="auto" latinLnBrk="0" hangingPunct="1">
+              <a:lnSpc>
+                <a:spcPct val="100000"/>
+              </a:lnSpc>
+              <a:spcBef>
+                <a:spcPts val="0"/>
+              </a:spcBef>
+              <a:spcAft>
+                <a:spcPts val="0"/>
+              </a:spcAft>
+              <a:buClrTx/>
+              <a:buSzTx/>
+              <a:buFont typeface="Arial" panose="020B0604020202020204" pitchFamily="34" charset="0"/>
+              <a:buChar char="•"/>
+              <a:tabLst/>
+              <a:defRPr/>
+            </a:pPr>
+            <a:r>
+              <a:rPr lang="en-US" dirty="0"/>
+              <a:t>Part of working on scientific instrumentation is understanding how the data is generated and therefore understanding how to correctly and rigorously analyze data and draw conclusions from data.</a:t>
+            </a:r>
+          </a:p>
+          <a:p>
+            <a:pPr marL="171450" indent="-171450">
+              <a:buFont typeface="Arial" panose="020B0604020202020204" pitchFamily="34" charset="0"/>
+              <a:buChar char="•"/>
+            </a:pPr>
+            <a:endParaRPr lang="en-US" dirty="0"/>
+          </a:p>
+          <a:p>
+            <a:pPr marL="171450" marR="0" lvl="0" indent="-171450" algn="l" defTabSz="914400" rtl="0" eaLnBrk="1" fontAlgn="auto" latinLnBrk="0" hangingPunct="1">
+              <a:lnSpc>
+                <a:spcPct val="100000"/>
+              </a:lnSpc>
+              <a:spcBef>
+                <a:spcPts val="0"/>
+              </a:spcBef>
+              <a:spcAft>
+                <a:spcPts val="0"/>
+              </a:spcAft>
+              <a:buClrTx/>
+              <a:buSzTx/>
+              <a:buFont typeface="Arial" panose="020B0604020202020204" pitchFamily="34" charset="0"/>
+              <a:buChar char="•"/>
+              <a:tabLst/>
+              <a:defRPr/>
+            </a:pPr>
+            <a:r>
+              <a:rPr lang="en-US" dirty="0"/>
+              <a:t>Emphasize that implicit in this is my belief that developing scientific software is developing a scientific instrument.  How many people share this view?  If not, how do people view their software and how they use it?</a:t>
+            </a:r>
+          </a:p>
+          <a:p>
+            <a:pPr marL="171450" indent="-171450">
+              <a:buFont typeface="Arial" panose="020B0604020202020204" pitchFamily="34" charset="0"/>
+              <a:buChar char="•"/>
+            </a:pPr>
+            <a:endParaRPr lang="en-US" dirty="0"/>
           </a:p>
         </p:txBody>
       </p:sp>
@@ -1679,7 +2116,7 @@
           <a:p>
             <a:fld id="{54E672D7-8E2D-4611-973D-F4591A707C34}" type="slidenum">
               <a:rPr lang="en-US" smtClean="0"/>
-              <a:t>5</a:t>
+              <a:t>4</a:t>
             </a:fld>
             <a:endParaRPr lang="en-US"/>
           </a:p>
@@ -1688,7 +2125,7 @@
     </p:spTree>
     <p:extLst>
       <p:ext uri="{BB962C8B-B14F-4D97-AF65-F5344CB8AC3E}">
-        <p14:creationId xmlns:p14="http://schemas.microsoft.com/office/powerpoint/2010/main" val="2958482426"/>
+        <p14:creationId xmlns:p14="http://schemas.microsoft.com/office/powerpoint/2010/main" val="795729674"/>
       </p:ext>
     </p:extLst>
   </p:cSld>
@@ -1742,9 +2179,53 @@
           <a:bodyPr/>
           <a:lstStyle/>
           <a:p>
-            <a:r>
-              <a:rPr lang="en-US" dirty="0"/>
-              <a:t>Information</a:t>
+            <a:pPr marL="0" marR="0" lvl="0" indent="0" algn="l" defTabSz="914400" rtl="0" eaLnBrk="1" fontAlgn="auto" latinLnBrk="0" hangingPunct="1">
+              <a:lnSpc>
+                <a:spcPct val="100000"/>
+              </a:lnSpc>
+              <a:spcBef>
+                <a:spcPts val="0"/>
+              </a:spcBef>
+              <a:spcAft>
+                <a:spcPts val="0"/>
+              </a:spcAft>
+              <a:buClrTx/>
+              <a:buSzTx/>
+              <a:buFontTx/>
+              <a:buNone/>
+              <a:tabLst/>
+              <a:defRPr/>
+            </a:pPr>
+            <a:r>
+              <a:rPr lang="en-US" sz="1200" kern="1200" dirty="0">
+                <a:solidFill>
+                  <a:schemeClr val="tx1"/>
+                </a:solidFill>
+                <a:effectLst/>
+                <a:latin typeface="+mn-lt"/>
+                <a:ea typeface="+mn-ea"/>
+                <a:cs typeface="+mn-cs"/>
+              </a:rPr>
+              <a:t>This talk has grown from many interesting conversations that I have had with a variety of different computational sciences.  This includes different disciplines and different experience levels.  When I have these conversations, all parties generally tend to learn something.  This module will continue along those lines.  I am not here to convince anyone of anything.  I am not here to preach.  I am just here to present a novel experience.  Please ask me questions.  I will be direct and state strong opinions.  Therefore, please be direct and push back on some of these.</a:t>
+            </a:r>
+            <a:endParaRPr lang="en-US" dirty="0"/>
+          </a:p>
+          <a:p>
+            <a:endParaRPr lang="en-US" dirty="0"/>
+          </a:p>
+          <a:p>
+            <a:r>
+              <a:rPr lang="en-US" dirty="0"/>
+              <a:t>Point out that if they search for this, they will find many pages.  Those pages have changed over time – it used to be DIKUW, not it’s the DIKW pyramid.  For instance, I often times no longer see understanding included.  I don’t know much beyond this classification, but find the classification to be quite useful.</a:t>
+            </a:r>
+          </a:p>
+          <a:p>
+            <a:endParaRPr lang="en-US" dirty="0"/>
+          </a:p>
+          <a:p>
+            <a:r>
+              <a:rPr lang="en-US" dirty="0"/>
+              <a:t>We won’t be defining these terms exactly as that is likely quite hard.  We will go through examples to gain an intuitive understanding of these concepts.</a:t>
             </a:r>
           </a:p>
         </p:txBody>
@@ -1766,7 +2247,7 @@
           <a:p>
             <a:fld id="{54E672D7-8E2D-4611-973D-F4591A707C34}" type="slidenum">
               <a:rPr lang="en-US" smtClean="0"/>
-              <a:t>6</a:t>
+              <a:t>5</a:t>
             </a:fld>
             <a:endParaRPr lang="en-US"/>
           </a:p>
@@ -1775,7 +2256,7 @@
     </p:spTree>
     <p:extLst>
       <p:ext uri="{BB962C8B-B14F-4D97-AF65-F5344CB8AC3E}">
-        <p14:creationId xmlns:p14="http://schemas.microsoft.com/office/powerpoint/2010/main" val="720366741"/>
+        <p14:creationId xmlns:p14="http://schemas.microsoft.com/office/powerpoint/2010/main" val="2958482426"/>
       </p:ext>
     </p:extLst>
   </p:cSld>
@@ -1831,7 +2312,7 @@
           <a:p>
             <a:r>
               <a:rPr lang="en-US" dirty="0"/>
-              <a:t>I didn’t use the given timeseries information to derive this knowledge.  Someone with understanding of meteorology did they have a deep understanding derived from years of study and experience. However, that person presented and communicated the knowledge for consumption by those without understanding.</a:t>
+              <a:t>My understanding is that data is *not* facts, as some claim.  Rather, data can be flawed and noisy.  Information is facts that are true relative to the potentially flawed data.</a:t>
             </a:r>
           </a:p>
           <a:p>
@@ -1840,7 +2321,7 @@
           <a:p>
             <a:r>
               <a:rPr lang="en-US" dirty="0"/>
-              <a:t>When you go to school, are your teachers and professors putting understanding in your head or do they share knowledge and create an environment in which one can generate understanding.  When you read the internet are you gaining knowledge of understanding?</a:t>
+              <a:t>Data is valuable because it helps us make decisions.</a:t>
             </a:r>
           </a:p>
           <a:p>
@@ -1849,13 +2330,8 @@
           <a:p>
             <a:r>
               <a:rPr lang="en-US" dirty="0"/>
-              <a:t>Understanding is built on the shoulders of giants.  You read an article that helps you generate understanding.  But the author of that article generated it from understanding he developed from taking classes with </a:t>
-            </a:r>
-            <a:r>
-              <a:rPr lang="en-US"/>
-              <a:t>other </a:t>
-            </a:r>
-            <a:endParaRPr lang="en-US" dirty="0"/>
+              <a:t>Information is data made (hopefully) useful.</a:t>
+            </a:r>
           </a:p>
         </p:txBody>
       </p:sp>
@@ -1876,7 +2352,7 @@
           <a:p>
             <a:fld id="{54E672D7-8E2D-4611-973D-F4591A707C34}" type="slidenum">
               <a:rPr lang="en-US" smtClean="0"/>
-              <a:t>7</a:t>
+              <a:t>6</a:t>
             </a:fld>
             <a:endParaRPr lang="en-US"/>
           </a:p>
@@ -1885,7 +2361,7 @@
     </p:spTree>
     <p:extLst>
       <p:ext uri="{BB962C8B-B14F-4D97-AF65-F5344CB8AC3E}">
-        <p14:creationId xmlns:p14="http://schemas.microsoft.com/office/powerpoint/2010/main" val="2638889168"/>
+        <p14:creationId xmlns:p14="http://schemas.microsoft.com/office/powerpoint/2010/main" val="720366741"/>
       </p:ext>
     </p:extLst>
   </p:cSld>
@@ -1941,7 +2417,51 @@
           <a:p>
             <a:r>
               <a:rPr lang="en-US" dirty="0"/>
-              <a:t>Really most any project benefits from some sort of knowledge management.  </a:t>
+              <a:t>Knowledge is generated by a process in such a way that it is an educated best guess.  But, it should be a solid and justifiable educated guess.  In this sense, it is not true but our best current guess at what is true.</a:t>
+            </a:r>
+          </a:p>
+          <a:p>
+            <a:endParaRPr lang="en-US" dirty="0"/>
+          </a:p>
+          <a:p>
+            <a:r>
+              <a:rPr lang="en-US" dirty="0"/>
+              <a:t>It’s hard to define understanding.  I have just written down my best guesses.</a:t>
+            </a:r>
+          </a:p>
+          <a:p>
+            <a:endParaRPr lang="en-US" dirty="0"/>
+          </a:p>
+          <a:p>
+            <a:r>
+              <a:rPr lang="en-US" dirty="0"/>
+              <a:t>I didn’t use the given timeseries information to derive this knowledge.  Someone with understanding of meteorology did. </a:t>
+            </a:r>
+            <a:r>
+              <a:rPr lang="en-US" dirty="0" err="1"/>
+              <a:t>Tthey</a:t>
+            </a:r>
+            <a:r>
+              <a:rPr lang="en-US" dirty="0"/>
+              <a:t> have a deep understanding derived from years of study and experience. However, that person presented and communicated the knowledge for consumption by those without understanding.</a:t>
+            </a:r>
+          </a:p>
+          <a:p>
+            <a:endParaRPr lang="en-US" dirty="0"/>
+          </a:p>
+          <a:p>
+            <a:r>
+              <a:rPr lang="en-US" dirty="0"/>
+              <a:t>When you go to school, are your teachers and professors putting understanding in your head or do they share knowledge and create an environment in which one can generate understanding?</a:t>
+            </a:r>
+          </a:p>
+          <a:p>
+            <a:endParaRPr lang="en-US" dirty="0"/>
+          </a:p>
+          <a:p>
+            <a:r>
+              <a:rPr lang="en-US" dirty="0"/>
+              <a:t>Understanding is built on the shoulders of giants.  You read an article that helps you generate understanding.  But the author of that article generated it from understanding he developed from taking classes with other </a:t>
             </a:r>
           </a:p>
         </p:txBody>
@@ -1963,7 +2483,7 @@
           <a:p>
             <a:fld id="{54E672D7-8E2D-4611-973D-F4591A707C34}" type="slidenum">
               <a:rPr lang="en-US" smtClean="0"/>
-              <a:t>10</a:t>
+              <a:t>7</a:t>
             </a:fld>
             <a:endParaRPr lang="en-US"/>
           </a:p>
@@ -1972,7 +2492,7 @@
     </p:spTree>
     <p:extLst>
       <p:ext uri="{BB962C8B-B14F-4D97-AF65-F5344CB8AC3E}">
-        <p14:creationId xmlns:p14="http://schemas.microsoft.com/office/powerpoint/2010/main" val="1399277158"/>
+        <p14:creationId xmlns:p14="http://schemas.microsoft.com/office/powerpoint/2010/main" val="2638889168"/>
       </p:ext>
     </p:extLst>
   </p:cSld>
@@ -2026,9 +2546,158 @@
           <a:bodyPr/>
           <a:lstStyle/>
           <a:p>
-            <a:r>
-              <a:rPr lang="en-US" dirty="0"/>
-              <a:t>When we go through experiences we can grow and improve.  But processes exist to help us maximize that growth and improvement.</a:t>
+            <a:pPr marL="0" marR="0" lvl="0" indent="0" algn="l" defTabSz="914400" rtl="0" eaLnBrk="1" fontAlgn="auto" latinLnBrk="0" hangingPunct="1">
+              <a:lnSpc>
+                <a:spcPct val="100000"/>
+              </a:lnSpc>
+              <a:spcBef>
+                <a:spcPts val="0"/>
+              </a:spcBef>
+              <a:spcAft>
+                <a:spcPts val="0"/>
+              </a:spcAft>
+              <a:buClrTx/>
+              <a:buSzTx/>
+              <a:buFontTx/>
+              <a:buNone/>
+              <a:tabLst/>
+              <a:defRPr/>
+            </a:pPr>
+            <a:r>
+              <a:rPr lang="en-US" dirty="0"/>
+              <a:t>One extreme is trying to understand all aspects of the work that we do.  Is that feasible or even achievable?</a:t>
+            </a:r>
+          </a:p>
+          <a:p>
+            <a:pPr marL="0" marR="0" lvl="0" indent="0" algn="l" defTabSz="914400" rtl="0" eaLnBrk="1" fontAlgn="auto" latinLnBrk="0" hangingPunct="1">
+              <a:lnSpc>
+                <a:spcPct val="100000"/>
+              </a:lnSpc>
+              <a:spcBef>
+                <a:spcPts val="0"/>
+              </a:spcBef>
+              <a:spcAft>
+                <a:spcPts val="0"/>
+              </a:spcAft>
+              <a:buClrTx/>
+              <a:buSzTx/>
+              <a:buFontTx/>
+              <a:buNone/>
+              <a:tabLst/>
+              <a:defRPr/>
+            </a:pPr>
+            <a:endParaRPr lang="en-US" dirty="0"/>
+          </a:p>
+          <a:p>
+            <a:pPr marL="0" marR="0" lvl="0" indent="0" algn="l" defTabSz="914400" rtl="0" eaLnBrk="1" fontAlgn="auto" latinLnBrk="0" hangingPunct="1">
+              <a:lnSpc>
+                <a:spcPct val="100000"/>
+              </a:lnSpc>
+              <a:spcBef>
+                <a:spcPts val="0"/>
+              </a:spcBef>
+              <a:spcAft>
+                <a:spcPts val="0"/>
+              </a:spcAft>
+              <a:buClrTx/>
+              <a:buSzTx/>
+              <a:buFontTx/>
+              <a:buNone/>
+              <a:tabLst/>
+              <a:defRPr/>
+            </a:pPr>
+            <a:r>
+              <a:rPr lang="en-US" dirty="0"/>
+              <a:t>The other extreme is in choosing how we use the internet:</a:t>
+            </a:r>
+          </a:p>
+          <a:p>
+            <a:pPr marL="0" marR="0" lvl="0" indent="0" algn="l" defTabSz="914400" rtl="0" eaLnBrk="1" fontAlgn="auto" latinLnBrk="0" hangingPunct="1">
+              <a:lnSpc>
+                <a:spcPct val="100000"/>
+              </a:lnSpc>
+              <a:spcBef>
+                <a:spcPts val="0"/>
+              </a:spcBef>
+              <a:spcAft>
+                <a:spcPts val="0"/>
+              </a:spcAft>
+              <a:buClrTx/>
+              <a:buSzTx/>
+              <a:buFontTx/>
+              <a:buNone/>
+              <a:tabLst/>
+              <a:defRPr/>
+            </a:pPr>
+            <a:r>
+              <a:rPr lang="en-US" dirty="0"/>
+              <a:t>When you read the internet are you gaining knowledge of understanding?  Is it possible to build understanding by only accessing bits of knowledge scattered across the internet?  I believe that Elaine’s work would say no.  You need someone with understanding to collect knowledge sources across the internet, organize these, and present them in such a way that the novice can generate understanding.</a:t>
+            </a:r>
+          </a:p>
+          <a:p>
+            <a:pPr marL="0" marR="0" lvl="0" indent="0" algn="l" defTabSz="914400" rtl="0" eaLnBrk="1" fontAlgn="auto" latinLnBrk="0" hangingPunct="1">
+              <a:lnSpc>
+                <a:spcPct val="100000"/>
+              </a:lnSpc>
+              <a:spcBef>
+                <a:spcPts val="0"/>
+              </a:spcBef>
+              <a:spcAft>
+                <a:spcPts val="0"/>
+              </a:spcAft>
+              <a:buClrTx/>
+              <a:buSzTx/>
+              <a:buFontTx/>
+              <a:buNone/>
+              <a:tabLst/>
+              <a:defRPr/>
+            </a:pPr>
+            <a:endParaRPr lang="en-US" dirty="0"/>
+          </a:p>
+          <a:p>
+            <a:pPr marL="0" marR="0" lvl="0" indent="0" algn="l" defTabSz="914400" rtl="0" eaLnBrk="1" fontAlgn="auto" latinLnBrk="0" hangingPunct="1">
+              <a:lnSpc>
+                <a:spcPct val="100000"/>
+              </a:lnSpc>
+              <a:spcBef>
+                <a:spcPts val="0"/>
+              </a:spcBef>
+              <a:spcAft>
+                <a:spcPts val="0"/>
+              </a:spcAft>
+              <a:buClrTx/>
+              <a:buSzTx/>
+              <a:buFontTx/>
+              <a:buNone/>
+              <a:tabLst/>
+              <a:defRPr/>
+            </a:pPr>
+            <a:r>
+              <a:rPr lang="en-US" dirty="0"/>
+              <a:t>A different, modern way to approach this same question:</a:t>
+            </a:r>
+          </a:p>
+          <a:p>
+            <a:pPr marL="0" marR="0" lvl="0" indent="0" algn="l" defTabSz="914400" rtl="0" eaLnBrk="1" fontAlgn="auto" latinLnBrk="0" hangingPunct="1">
+              <a:lnSpc>
+                <a:spcPct val="100000"/>
+              </a:lnSpc>
+              <a:spcBef>
+                <a:spcPts val="0"/>
+              </a:spcBef>
+              <a:spcAft>
+                <a:spcPts val="0"/>
+              </a:spcAft>
+              <a:buClrTx/>
+              <a:buSzTx/>
+              <a:buFontTx/>
+              <a:buNone/>
+              <a:tabLst/>
+              <a:defRPr/>
+            </a:pPr>
+            <a:r>
+              <a:rPr lang="en-US" dirty="0"/>
+              <a:t>If an ML/DL code had generated the knowledge given in the example but in such a way that interpretability is low, are we OK with inexpressible or inaccessible understanding?</a:t>
             </a:r>
           </a:p>
         </p:txBody>
@@ -2050,7 +2719,7 @@
           <a:p>
             <a:fld id="{54E672D7-8E2D-4611-973D-F4591A707C34}" type="slidenum">
               <a:rPr lang="en-US" smtClean="0"/>
-              <a:t>11</a:t>
+              <a:t>8</a:t>
             </a:fld>
             <a:endParaRPr lang="en-US"/>
           </a:p>
@@ -2059,7 +2728,7 @@
     </p:spTree>
     <p:extLst>
       <p:ext uri="{BB962C8B-B14F-4D97-AF65-F5344CB8AC3E}">
-        <p14:creationId xmlns:p14="http://schemas.microsoft.com/office/powerpoint/2010/main" val="3152359200"/>
+        <p14:creationId xmlns:p14="http://schemas.microsoft.com/office/powerpoint/2010/main" val="29386948"/>
       </p:ext>
     </p:extLst>
   </p:cSld>
@@ -2115,16 +2784,7 @@
           <a:p>
             <a:r>
               <a:rPr lang="en-US" dirty="0"/>
-              <a:t>Mention that this is just a cartoon.  If we want a real hierarchy we might need to think some more about this.</a:t>
-            </a:r>
-          </a:p>
-          <a:p>
-            <a:endParaRPr lang="en-US" dirty="0"/>
-          </a:p>
-          <a:p>
-            <a:r>
-              <a:rPr lang="en-US" dirty="0"/>
-              <a:t>Developer docs are an example of living docs.  PRs and Issue are living but the frozen.  Commit messages are frozen.</a:t>
+              <a:t>This can explain some of the difficulties that occur when a git expert is forced to use a workflow designed for a team with only git knowledge.  They aren’t allowed to work in a more powerful, efficient, and effective way.  If they do work in their powerful, they can upset all those with insufficient understanding.</a:t>
             </a:r>
           </a:p>
         </p:txBody>
@@ -2146,7 +2806,7 @@
           <a:p>
             <a:fld id="{54E672D7-8E2D-4611-973D-F4591A707C34}" type="slidenum">
               <a:rPr lang="en-US" smtClean="0"/>
-              <a:t>13</a:t>
+              <a:t>9</a:t>
             </a:fld>
             <a:endParaRPr lang="en-US"/>
           </a:p>
@@ -2155,7 +2815,7 @@
     </p:spTree>
     <p:extLst>
       <p:ext uri="{BB962C8B-B14F-4D97-AF65-F5344CB8AC3E}">
-        <p14:creationId xmlns:p14="http://schemas.microsoft.com/office/powerpoint/2010/main" val="2191483250"/>
+        <p14:creationId xmlns:p14="http://schemas.microsoft.com/office/powerpoint/2010/main" val="153949558"/>
       </p:ext>
     </p:extLst>
   </p:cSld>
@@ -2211,7 +2871,25 @@
           <a:p>
             <a:r>
               <a:rPr lang="en-US" dirty="0"/>
-              <a:t>Automated is in quotes because the TIOs and astronomers still needed to input information into a system.  But there was a process for them to input such data into tools that aggregated their input with other notes.</a:t>
+              <a:t>Really most any project benefits from some sort of knowledge management.  </a:t>
+            </a:r>
+          </a:p>
+          <a:p>
+            <a:endParaRPr lang="en-US" dirty="0"/>
+          </a:p>
+          <a:p>
+            <a:r>
+              <a:rPr lang="en-US" dirty="0"/>
+              <a:t>The key is first to recognize when knowledge is generated.  Once I became aware of this classification and began to think in terms of it, it became easier for me to recognize knowledge generation.  It’s as if a bell goes off in my brain that indicates we need to record what was just said.</a:t>
+            </a:r>
+          </a:p>
+          <a:p>
+            <a:endParaRPr lang="en-US" dirty="0"/>
+          </a:p>
+          <a:p>
+            <a:r>
+              <a:rPr lang="en-US" dirty="0"/>
+              <a:t>The answer to the question is ”clearly no”,  We need to communicate to our future selves for the sake of productivity and reproducible research.</a:t>
             </a:r>
           </a:p>
         </p:txBody>
@@ -2233,7 +2911,7 @@
           <a:p>
             <a:fld id="{54E672D7-8E2D-4611-973D-F4591A707C34}" type="slidenum">
               <a:rPr lang="en-US" smtClean="0"/>
-              <a:t>14</a:t>
+              <a:t>10</a:t>
             </a:fld>
             <a:endParaRPr lang="en-US"/>
           </a:p>
@@ -2242,7 +2920,7 @@
     </p:spTree>
     <p:extLst>
       <p:ext uri="{BB962C8B-B14F-4D97-AF65-F5344CB8AC3E}">
-        <p14:creationId xmlns:p14="http://schemas.microsoft.com/office/powerpoint/2010/main" val="2141150432"/>
+        <p14:creationId xmlns:p14="http://schemas.microsoft.com/office/powerpoint/2010/main" val="1399277158"/>
       </p:ext>
     </p:extLst>
   </p:cSld>
@@ -6334,6 +7012,7 @@
               <a:rPr lang="en-US" dirty="0"/>
               <a:t>An Example: Lessons Learned</a:t>
             </a:r>
+            <a:endParaRPr lang="en-US" b="0" dirty="0"/>
           </a:p>
         </p:txBody>
       </p:sp>
@@ -6541,69 +7220,285 @@
           <a:bodyPr/>
           <a:lstStyle/>
           <a:p>
-            <a:r>
-              <a:rPr lang="en-US" dirty="0"/>
-              <a:t>Documentation is a fundamental form of knowledge communication.</a:t>
-            </a:r>
-          </a:p>
-          <a:p>
-            <a:r>
-              <a:rPr lang="en-US" dirty="0"/>
-              <a:t>Studying documentation can lead to increased understanding.</a:t>
-            </a:r>
-          </a:p>
-          <a:p>
-            <a:r>
-              <a:rPr lang="en-US" dirty="0"/>
-              <a:t>The cynical point of view</a:t>
-            </a:r>
-          </a:p>
-          <a:p>
-            <a:pPr lvl="1"/>
-            <a:r>
-              <a:rPr lang="en-US" dirty="0"/>
-              <a:t>We want and appreciate documentation that is well done,</a:t>
-            </a:r>
-          </a:p>
-          <a:p>
-            <a:pPr lvl="1"/>
-            <a:r>
-              <a:rPr lang="en-US" dirty="0"/>
-              <a:t>We love to consume documentation; write it, not so much.</a:t>
-            </a:r>
-          </a:p>
-          <a:p>
-            <a:r>
-              <a:rPr lang="en-US" dirty="0"/>
-              <a:t>Rephrased</a:t>
-            </a:r>
-          </a:p>
-          <a:p>
-            <a:pPr lvl="1"/>
-            <a:r>
-              <a:rPr lang="en-US" dirty="0"/>
-              <a:t>We want and appreciate it when others share knowledge with us.</a:t>
-            </a:r>
-          </a:p>
-          <a:p>
-            <a:pPr lvl="1"/>
-            <a:r>
-              <a:rPr lang="en-US" dirty="0"/>
-              <a:t>We don’t want to take the time to capture, preserve, and communicate knowledge we generate.</a:t>
-            </a:r>
-          </a:p>
-          <a:p>
-            <a:r>
-              <a:rPr lang="en-US" dirty="0"/>
-              <a:t>This is one aspect of productivity</a:t>
-            </a:r>
-          </a:p>
-          <a:p>
-            <a:pPr lvl="1"/>
-            <a:r>
-              <a:rPr lang="en-US" dirty="0"/>
-              <a:t>One person decreases their short-term efficiency so that many (and the team) achieve long-term efficiency and quality.</a:t>
-            </a:r>
+            <a:pPr marL="0" indent="0" algn="ctr">
+              <a:buNone/>
+            </a:pPr>
+            <a:r>
+              <a:rPr lang="en-US" dirty="0"/>
+              <a:t>Documentation is knowledge communication &amp; can build understanding</a:t>
+            </a:r>
+          </a:p>
+        </p:txBody>
+      </p:sp>
+      <p:pic>
+        <p:nvPicPr>
+          <p:cNvPr id="4" name="Picture 3">
+            <a:extLst>
+              <a:ext uri="{FF2B5EF4-FFF2-40B4-BE49-F238E27FC236}">
+                <a16:creationId xmlns:a16="http://schemas.microsoft.com/office/drawing/2014/main" id="{2806206A-CDD0-AC37-139B-D8CCA944AA6B}"/>
+              </a:ext>
+            </a:extLst>
+          </p:cNvPr>
+          <p:cNvPicPr>
+            <a:picLocks noChangeAspect="1"/>
+          </p:cNvPicPr>
+          <p:nvPr/>
+        </p:nvPicPr>
+        <p:blipFill>
+          <a:blip r:embed="rId3"/>
+          <a:stretch>
+            <a:fillRect/>
+          </a:stretch>
+        </p:blipFill>
+        <p:spPr>
+          <a:xfrm>
+            <a:off x="1853448" y="1716242"/>
+            <a:ext cx="7874583" cy="2574158"/>
+          </a:xfrm>
+          <a:prstGeom prst="rect">
+            <a:avLst/>
+          </a:prstGeom>
+        </p:spPr>
+      </p:pic>
+      <p:sp>
+        <p:nvSpPr>
+          <p:cNvPr id="5" name="Content Placeholder 2">
+            <a:extLst>
+              <a:ext uri="{FF2B5EF4-FFF2-40B4-BE49-F238E27FC236}">
+                <a16:creationId xmlns:a16="http://schemas.microsoft.com/office/drawing/2014/main" id="{656F91B9-4DFC-6521-8532-ACAE057615CC}"/>
+              </a:ext>
+            </a:extLst>
+          </p:cNvPr>
+          <p:cNvSpPr txBox="1">
+            <a:spLocks/>
+          </p:cNvSpPr>
+          <p:nvPr/>
+        </p:nvSpPr>
+        <p:spPr bwMode="auto">
+          <a:xfrm>
+            <a:off x="1242838" y="4571230"/>
+            <a:ext cx="11626543" cy="1875290"/>
+          </a:xfrm>
+          <a:prstGeom prst="rect">
+            <a:avLst/>
+          </a:prstGeom>
+          <a:noFill/>
+          <a:ln w="9525">
+            <a:noFill/>
+            <a:miter lim="800000"/>
+            <a:headEnd/>
+            <a:tailEnd/>
+          </a:ln>
+        </p:spPr>
+        <p:txBody>
+          <a:bodyPr vert="horz" wrap="square" lIns="91440" tIns="45720" rIns="91440" bIns="45720" numCol="1" anchor="t" anchorCtr="0" compatLnSpc="1">
+            <a:prstTxWarp prst="textNoShape">
+              <a:avLst/>
+            </a:prstTxWarp>
+            <a:noAutofit/>
+          </a:bodyPr>
+          <a:lstStyle>
+            <a:lvl1pPr marL="230188" indent="-230188" algn="l" rtl="0" eaLnBrk="1" fontAlgn="base" hangingPunct="1">
+              <a:lnSpc>
+                <a:spcPct val="90000"/>
+              </a:lnSpc>
+              <a:spcBef>
+                <a:spcPts val="1400"/>
+              </a:spcBef>
+              <a:spcAft>
+                <a:spcPct val="0"/>
+              </a:spcAft>
+              <a:buClr>
+                <a:schemeClr val="tx1"/>
+              </a:buClr>
+              <a:buFont typeface="Arial" charset="0"/>
+              <a:buChar char="•"/>
+              <a:defRPr sz="2400" kern="1200">
+                <a:solidFill>
+                  <a:schemeClr val="tx1"/>
+                </a:solidFill>
+                <a:latin typeface="Arial" panose="020B0604020202020204" pitchFamily="34" charset="0"/>
+                <a:ea typeface="+mn-ea"/>
+                <a:cs typeface="Arial" panose="020B0604020202020204" pitchFamily="34" charset="0"/>
+              </a:defRPr>
+            </a:lvl1pPr>
+            <a:lvl2pPr marL="625475" indent="-279400" algn="l" rtl="0" eaLnBrk="1" fontAlgn="base" hangingPunct="1">
+              <a:lnSpc>
+                <a:spcPct val="90000"/>
+              </a:lnSpc>
+              <a:spcBef>
+                <a:spcPts val="800"/>
+              </a:spcBef>
+              <a:spcAft>
+                <a:spcPct val="0"/>
+              </a:spcAft>
+              <a:buClr>
+                <a:schemeClr val="tx1"/>
+              </a:buClr>
+              <a:buFont typeface="Arial" charset="0"/>
+              <a:buChar char="–"/>
+              <a:defRPr sz="2000" kern="1200">
+                <a:solidFill>
+                  <a:schemeClr val="tx1"/>
+                </a:solidFill>
+                <a:latin typeface="Arial" panose="020B0604020202020204" pitchFamily="34" charset="0"/>
+                <a:ea typeface="+mn-ea"/>
+                <a:cs typeface="Arial" panose="020B0604020202020204" pitchFamily="34" charset="0"/>
+              </a:defRPr>
+            </a:lvl2pPr>
+            <a:lvl3pPr marL="914400" indent="-230188" algn="l" rtl="0" eaLnBrk="1" fontAlgn="base" hangingPunct="1">
+              <a:lnSpc>
+                <a:spcPct val="90000"/>
+              </a:lnSpc>
+              <a:spcBef>
+                <a:spcPts val="800"/>
+              </a:spcBef>
+              <a:spcAft>
+                <a:spcPct val="0"/>
+              </a:spcAft>
+              <a:buClr>
+                <a:schemeClr val="tx1"/>
+              </a:buClr>
+              <a:buFont typeface="Arial" charset="0"/>
+              <a:buChar char="•"/>
+              <a:defRPr sz="1800" kern="1200">
+                <a:solidFill>
+                  <a:schemeClr val="tx1"/>
+                </a:solidFill>
+                <a:latin typeface="Arial" panose="020B0604020202020204" pitchFamily="34" charset="0"/>
+                <a:ea typeface="+mn-ea"/>
+                <a:cs typeface="Arial" panose="020B0604020202020204" pitchFamily="34" charset="0"/>
+              </a:defRPr>
+            </a:lvl3pPr>
+            <a:lvl4pPr marL="1144588" indent="-173038" algn="l" rtl="0" eaLnBrk="1" fontAlgn="base" hangingPunct="1">
+              <a:lnSpc>
+                <a:spcPct val="90000"/>
+              </a:lnSpc>
+              <a:spcBef>
+                <a:spcPts val="800"/>
+              </a:spcBef>
+              <a:spcAft>
+                <a:spcPct val="0"/>
+              </a:spcAft>
+              <a:buClr>
+                <a:schemeClr val="tx1"/>
+              </a:buClr>
+              <a:buFont typeface="Arial" charset="0"/>
+              <a:buChar char="–"/>
+              <a:defRPr sz="1600" kern="1200">
+                <a:solidFill>
+                  <a:schemeClr val="tx1"/>
+                </a:solidFill>
+                <a:latin typeface="Arial" panose="020B0604020202020204" pitchFamily="34" charset="0"/>
+                <a:ea typeface="+mn-ea"/>
+                <a:cs typeface="Arial" panose="020B0604020202020204" pitchFamily="34" charset="0"/>
+              </a:defRPr>
+            </a:lvl4pPr>
+            <a:lvl5pPr marL="1482725" indent="-222250" algn="l" rtl="0" eaLnBrk="1" fontAlgn="base" hangingPunct="1">
+              <a:lnSpc>
+                <a:spcPct val="90000"/>
+              </a:lnSpc>
+              <a:spcBef>
+                <a:spcPts val="600"/>
+              </a:spcBef>
+              <a:spcAft>
+                <a:spcPct val="0"/>
+              </a:spcAft>
+              <a:buClr>
+                <a:schemeClr val="tx1"/>
+              </a:buClr>
+              <a:buFont typeface="Arial" panose="020B0604020202020204" pitchFamily="34" charset="0"/>
+              <a:buChar char="•"/>
+              <a:defRPr sz="1600" kern="1200">
+                <a:solidFill>
+                  <a:schemeClr val="tx1"/>
+                </a:solidFill>
+                <a:latin typeface="Arial" panose="020B0604020202020204" pitchFamily="34" charset="0"/>
+                <a:ea typeface="+mn-ea"/>
+                <a:cs typeface="Arial" panose="020B0604020202020204" pitchFamily="34" charset="0"/>
+              </a:defRPr>
+            </a:lvl5pPr>
+            <a:lvl6pPr marL="2514600" indent="-228600" algn="l" defTabSz="914400" rtl="0" eaLnBrk="1" latinLnBrk="0" hangingPunct="1">
+              <a:spcBef>
+                <a:spcPct val="20000"/>
+              </a:spcBef>
+              <a:buFont typeface="Arial" pitchFamily="34" charset="0"/>
+              <a:buChar char="•"/>
+              <a:defRPr sz="2000" kern="1200">
+                <a:solidFill>
+                  <a:schemeClr val="tx1"/>
+                </a:solidFill>
+                <a:latin typeface="+mn-lt"/>
+                <a:ea typeface="+mn-ea"/>
+                <a:cs typeface="+mn-cs"/>
+              </a:defRPr>
+            </a:lvl6pPr>
+            <a:lvl7pPr marL="2971800" indent="-228600" algn="l" defTabSz="914400" rtl="0" eaLnBrk="1" latinLnBrk="0" hangingPunct="1">
+              <a:spcBef>
+                <a:spcPct val="20000"/>
+              </a:spcBef>
+              <a:buFont typeface="Arial" pitchFamily="34" charset="0"/>
+              <a:buChar char="•"/>
+              <a:defRPr sz="2000" kern="1200">
+                <a:solidFill>
+                  <a:schemeClr val="tx1"/>
+                </a:solidFill>
+                <a:latin typeface="+mn-lt"/>
+                <a:ea typeface="+mn-ea"/>
+                <a:cs typeface="+mn-cs"/>
+              </a:defRPr>
+            </a:lvl7pPr>
+            <a:lvl8pPr marL="3429000" indent="-228600" algn="l" defTabSz="914400" rtl="0" eaLnBrk="1" latinLnBrk="0" hangingPunct="1">
+              <a:spcBef>
+                <a:spcPct val="20000"/>
+              </a:spcBef>
+              <a:buFont typeface="Arial" pitchFamily="34" charset="0"/>
+              <a:buChar char="•"/>
+              <a:defRPr sz="2000" kern="1200">
+                <a:solidFill>
+                  <a:schemeClr val="tx1"/>
+                </a:solidFill>
+                <a:latin typeface="+mn-lt"/>
+                <a:ea typeface="+mn-ea"/>
+                <a:cs typeface="+mn-cs"/>
+              </a:defRPr>
+            </a:lvl8pPr>
+            <a:lvl9pPr marL="3886200" indent="-228600" algn="l" defTabSz="914400" rtl="0" eaLnBrk="1" latinLnBrk="0" hangingPunct="1">
+              <a:spcBef>
+                <a:spcPct val="20000"/>
+              </a:spcBef>
+              <a:buFont typeface="Arial" pitchFamily="34" charset="0"/>
+              <a:buChar char="•"/>
+              <a:defRPr sz="2000" kern="1200">
+                <a:solidFill>
+                  <a:schemeClr val="tx1"/>
+                </a:solidFill>
+                <a:latin typeface="+mn-lt"/>
+                <a:ea typeface="+mn-ea"/>
+                <a:cs typeface="+mn-cs"/>
+              </a:defRPr>
+            </a:lvl9pPr>
+          </a:lstStyle>
+          <a:p>
+            <a:r>
+              <a:rPr lang="en-US" sz="2000" dirty="0"/>
+              <a:t>Data at the bottom.  Knowledge as we move up?</a:t>
+            </a:r>
+          </a:p>
+          <a:p>
+            <a:r>
+              <a:rPr lang="en-US" sz="2000" dirty="0"/>
+              <a:t>Some documents frozen at creation.  Others are living.</a:t>
+            </a:r>
+          </a:p>
+          <a:p>
+            <a:r>
+              <a:rPr lang="en-US" sz="2000" dirty="0"/>
+              <a:t>Does this capture how hard it is to do documentation in a distributed, digital world?</a:t>
+            </a:r>
+          </a:p>
+          <a:p>
+            <a:endParaRPr lang="en-US" sz="2000" dirty="0"/>
           </a:p>
         </p:txBody>
       </p:sp>
@@ -6642,7 +7537,7 @@
           <p:cNvPr id="2" name="Title 1">
             <a:extLst>
               <a:ext uri="{FF2B5EF4-FFF2-40B4-BE49-F238E27FC236}">
-                <a16:creationId xmlns:a16="http://schemas.microsoft.com/office/drawing/2014/main" id="{31E37D79-D84D-7A00-1AAB-2EBE242FDD5F}"/>
+                <a16:creationId xmlns:a16="http://schemas.microsoft.com/office/drawing/2014/main" id="{9CDA5DAC-D638-AA10-5E70-A77E5B69D79E}"/>
               </a:ext>
             </a:extLst>
           </p:cNvPr>
@@ -6660,14 +7555,7 @@
           <a:p>
             <a:r>
               <a:rPr lang="en-US" dirty="0"/>
-              <a:t>Hierarchy of Documentation</a:t>
-            </a:r>
-            <a:br>
-              <a:rPr lang="en-US" dirty="0"/>
-            </a:br>
-            <a:r>
-              <a:rPr lang="en-US" sz="2400" b="0" dirty="0"/>
-              <a:t>Not all documents are alike</a:t>
+              <a:t>And finally we reach our destination</a:t>
             </a:r>
           </a:p>
         </p:txBody>
@@ -6677,7 +7565,7 @@
           <p:cNvPr id="3" name="Content Placeholder 2">
             <a:extLst>
               <a:ext uri="{FF2B5EF4-FFF2-40B4-BE49-F238E27FC236}">
-                <a16:creationId xmlns:a16="http://schemas.microsoft.com/office/drawing/2014/main" id="{804AAC5C-AC1D-1FC8-4345-5BA9FFB6CFC6}"/>
+                <a16:creationId xmlns:a16="http://schemas.microsoft.com/office/drawing/2014/main" id="{5BE9B2DA-E858-1EB6-45DC-E8398F9475E3}"/>
               </a:ext>
             </a:extLst>
           </p:cNvPr>
@@ -6690,70 +7578,127 @@
         </p:nvSpPr>
         <p:spPr>
           <a:xfrm>
-            <a:off x="365760" y="4430648"/>
-            <a:ext cx="11626543" cy="1875290"/>
+            <a:off x="744239" y="3575491"/>
+            <a:ext cx="10700346" cy="2358779"/>
           </a:xfrm>
         </p:spPr>
         <p:txBody>
           <a:bodyPr/>
           <a:lstStyle/>
           <a:p>
-            <a:r>
-              <a:rPr lang="en-US" dirty="0"/>
-              <a:t>Data at the bottom.  Knowledge as we move up?</a:t>
-            </a:r>
-          </a:p>
-          <a:p>
-            <a:r>
-              <a:rPr lang="en-US" dirty="0"/>
-              <a:t>Some documents frozen at creation.  Others are living.</a:t>
-            </a:r>
-          </a:p>
-          <a:p>
-            <a:r>
-              <a:rPr lang="en-US" dirty="0"/>
-              <a:t>Does this capture how hard it is to do documentation in a distributed, digital world?</a:t>
-            </a:r>
-          </a:p>
-          <a:p>
-            <a:endParaRPr lang="en-US" dirty="0"/>
-          </a:p>
-        </p:txBody>
-      </p:sp>
-      <p:pic>
-        <p:nvPicPr>
-          <p:cNvPr id="4" name="Picture 3">
+            <a:pPr marL="0" indent="0">
+              <a:buNone/>
+            </a:pPr>
+            <a:r>
+              <a:rPr lang="en-US" dirty="0"/>
+              <a:t>"...to write with enough detail and clarity that another scientist could pick up the notebook at some time in the future, repeat the work based on the written descriptions, and make the same observations that were originally recorded. If this guideline is followed, even the original author will be able to understand the notes when looking back on them after considerable time has passed!”</a:t>
+            </a:r>
+          </a:p>
+          <a:p>
+            <a:pPr marL="0" indent="0">
+              <a:buNone/>
+            </a:pPr>
+            <a:r>
+              <a:rPr lang="en-US" dirty="0"/>
+              <a:t>	- Howard </a:t>
+            </a:r>
+            <a:r>
+              <a:rPr lang="en-US" dirty="0" err="1"/>
+              <a:t>Kanare</a:t>
+            </a:r>
+            <a:r>
+              <a:rPr lang="en-US" dirty="0"/>
+              <a:t>, “</a:t>
+            </a:r>
+            <a:r>
+              <a:rPr lang="en-US" i="1" dirty="0"/>
+              <a:t>Writing the Laboratory Notebook</a:t>
+            </a:r>
+            <a:r>
+              <a:rPr lang="en-US" dirty="0"/>
+              <a:t>”, 1985</a:t>
+            </a:r>
+          </a:p>
+        </p:txBody>
+      </p:sp>
+      <p:sp>
+        <p:nvSpPr>
+          <p:cNvPr id="4" name="Rectangle 3">
             <a:extLst>
               <a:ext uri="{FF2B5EF4-FFF2-40B4-BE49-F238E27FC236}">
-                <a16:creationId xmlns:a16="http://schemas.microsoft.com/office/drawing/2014/main" id="{D4346C03-4119-536B-2ED5-9CC8793FF322}"/>
+                <a16:creationId xmlns:a16="http://schemas.microsoft.com/office/drawing/2014/main" id="{ABF114B4-557E-6985-4AE3-A655B0543BBC}"/>
               </a:ext>
             </a:extLst>
           </p:cNvPr>
-          <p:cNvPicPr>
-            <a:picLocks noChangeAspect="1"/>
-          </p:cNvPicPr>
+          <p:cNvSpPr/>
           <p:nvPr/>
-        </p:nvPicPr>
-        <p:blipFill>
-          <a:blip r:embed="rId3"/>
-          <a:stretch>
-            <a:fillRect/>
-          </a:stretch>
-        </p:blipFill>
+        </p:nvSpPr>
         <p:spPr>
           <a:xfrm>
-            <a:off x="2114704" y="1535199"/>
-            <a:ext cx="7874583" cy="2574158"/>
+            <a:off x="365760" y="1308152"/>
+            <a:ext cx="10536470" cy="1631216"/>
           </a:xfrm>
           <a:prstGeom prst="rect">
             <a:avLst/>
           </a:prstGeom>
         </p:spPr>
-      </p:pic>
+        <p:txBody>
+          <a:bodyPr wrap="square">
+            <a:spAutoFit/>
+          </a:bodyPr>
+          <a:lstStyle/>
+          <a:p>
+            <a:r>
+              <a:rPr lang="en-US" sz="2000" dirty="0"/>
+              <a:t>Lab notebooks are</a:t>
+            </a:r>
+          </a:p>
+          <a:p>
+            <a:pPr marL="285750" indent="-285750">
+              <a:buFont typeface="Arial" panose="020B0604020202020204" pitchFamily="34" charset="0"/>
+              <a:buChar char="•"/>
+            </a:pPr>
+            <a:r>
+              <a:rPr lang="en-US" sz="2000" dirty="0"/>
+              <a:t>a fundamental part of communication as well as rigorous, reproducible science in a lab,</a:t>
+            </a:r>
+          </a:p>
+          <a:p>
+            <a:pPr marL="285750" indent="-285750">
+              <a:buFont typeface="Arial" panose="020B0604020202020204" pitchFamily="34" charset="0"/>
+              <a:buChar char="•"/>
+            </a:pPr>
+            <a:r>
+              <a:rPr lang="en-US" sz="2000" dirty="0"/>
+              <a:t>a tool for preventing scientific fraud and for defending against allegations of fraud,</a:t>
+            </a:r>
+          </a:p>
+          <a:p>
+            <a:pPr marL="285750" indent="-285750">
+              <a:buFont typeface="Arial" panose="020B0604020202020204" pitchFamily="34" charset="0"/>
+              <a:buChar char="•"/>
+            </a:pPr>
+            <a:r>
+              <a:rPr lang="en-US" sz="2000" dirty="0"/>
+              <a:t>a common-place or required part of an experimental laboratory, and</a:t>
+            </a:r>
+          </a:p>
+          <a:p>
+            <a:pPr marL="285750" indent="-285750">
+              <a:buFont typeface="Arial" panose="020B0604020202020204" pitchFamily="34" charset="0"/>
+              <a:buChar char="•"/>
+            </a:pPr>
+            <a:r>
+              <a:rPr lang="en-US" sz="2000" dirty="0"/>
+              <a:t>Populating a scientific “lab notebook” was an “automated” process at the observatory.</a:t>
+            </a:r>
+          </a:p>
+        </p:txBody>
+      </p:sp>
     </p:spTree>
     <p:extLst>
       <p:ext uri="{BB962C8B-B14F-4D97-AF65-F5344CB8AC3E}">
-        <p14:creationId xmlns:p14="http://schemas.microsoft.com/office/powerpoint/2010/main" val="854180296"/>
+        <p14:creationId xmlns:p14="http://schemas.microsoft.com/office/powerpoint/2010/main" val="1526375668"/>
       </p:ext>
     </p:extLst>
   </p:cSld>
@@ -6785,199 +7730,6 @@
           <p:cNvPr id="2" name="Title 1">
             <a:extLst>
               <a:ext uri="{FF2B5EF4-FFF2-40B4-BE49-F238E27FC236}">
-                <a16:creationId xmlns:a16="http://schemas.microsoft.com/office/drawing/2014/main" id="{9CDA5DAC-D638-AA10-5E70-A77E5B69D79E}"/>
-              </a:ext>
-            </a:extLst>
-          </p:cNvPr>
-          <p:cNvSpPr>
-            <a:spLocks noGrp="1"/>
-          </p:cNvSpPr>
-          <p:nvPr>
-            <p:ph type="title"/>
-          </p:nvPr>
-        </p:nvSpPr>
-        <p:spPr/>
-        <p:txBody>
-          <a:bodyPr/>
-          <a:lstStyle/>
-          <a:p>
-            <a:r>
-              <a:rPr lang="en-US" dirty="0"/>
-              <a:t>And finally we reach our destination</a:t>
-            </a:r>
-          </a:p>
-        </p:txBody>
-      </p:sp>
-      <p:sp>
-        <p:nvSpPr>
-          <p:cNvPr id="3" name="Content Placeholder 2">
-            <a:extLst>
-              <a:ext uri="{FF2B5EF4-FFF2-40B4-BE49-F238E27FC236}">
-                <a16:creationId xmlns:a16="http://schemas.microsoft.com/office/drawing/2014/main" id="{5BE9B2DA-E858-1EB6-45DC-E8398F9475E3}"/>
-              </a:ext>
-            </a:extLst>
-          </p:cNvPr>
-          <p:cNvSpPr>
-            <a:spLocks noGrp="1"/>
-          </p:cNvSpPr>
-          <p:nvPr>
-            <p:ph idx="1"/>
-          </p:nvPr>
-        </p:nvSpPr>
-        <p:spPr>
-          <a:xfrm>
-            <a:off x="744239" y="3575491"/>
-            <a:ext cx="10700346" cy="2358779"/>
-          </a:xfrm>
-        </p:spPr>
-        <p:txBody>
-          <a:bodyPr/>
-          <a:lstStyle/>
-          <a:p>
-            <a:pPr marL="0" indent="0">
-              <a:buNone/>
-            </a:pPr>
-            <a:r>
-              <a:rPr lang="en-US" dirty="0"/>
-              <a:t>"...to write with enough detail and clarity that another scientist could pick up the notebook at some time in the future, repeat the work based on the written descriptions, and make the same observations that were originally recorded. If this guideline is followed, even the original author will be able to understand the notes when looking back on them after considerable time has passed!”</a:t>
-            </a:r>
-          </a:p>
-          <a:p>
-            <a:pPr marL="0" indent="0">
-              <a:buNone/>
-            </a:pPr>
-            <a:r>
-              <a:rPr lang="en-US" dirty="0"/>
-              <a:t>	- Howard </a:t>
-            </a:r>
-            <a:r>
-              <a:rPr lang="en-US" dirty="0" err="1"/>
-              <a:t>Kanare</a:t>
-            </a:r>
-            <a:r>
-              <a:rPr lang="en-US" dirty="0"/>
-              <a:t>, “</a:t>
-            </a:r>
-            <a:r>
-              <a:rPr lang="en-US" i="1" dirty="0"/>
-              <a:t>Writing the Laboratory Notebook</a:t>
-            </a:r>
-            <a:r>
-              <a:rPr lang="en-US" dirty="0"/>
-              <a:t>”, 1985</a:t>
-            </a:r>
-          </a:p>
-        </p:txBody>
-      </p:sp>
-      <p:sp>
-        <p:nvSpPr>
-          <p:cNvPr id="4" name="Rectangle 3">
-            <a:extLst>
-              <a:ext uri="{FF2B5EF4-FFF2-40B4-BE49-F238E27FC236}">
-                <a16:creationId xmlns:a16="http://schemas.microsoft.com/office/drawing/2014/main" id="{ABF114B4-557E-6985-4AE3-A655B0543BBC}"/>
-              </a:ext>
-            </a:extLst>
-          </p:cNvPr>
-          <p:cNvSpPr/>
-          <p:nvPr/>
-        </p:nvSpPr>
-        <p:spPr>
-          <a:xfrm>
-            <a:off x="365760" y="1308152"/>
-            <a:ext cx="10536470" cy="1631216"/>
-          </a:xfrm>
-          <a:prstGeom prst="rect">
-            <a:avLst/>
-          </a:prstGeom>
-        </p:spPr>
-        <p:txBody>
-          <a:bodyPr wrap="square">
-            <a:spAutoFit/>
-          </a:bodyPr>
-          <a:lstStyle/>
-          <a:p>
-            <a:r>
-              <a:rPr lang="en-US" sz="2000" dirty="0"/>
-              <a:t>Lab notebooks are</a:t>
-            </a:r>
-          </a:p>
-          <a:p>
-            <a:pPr marL="285750" indent="-285750">
-              <a:buFont typeface="Arial" panose="020B0604020202020204" pitchFamily="34" charset="0"/>
-              <a:buChar char="•"/>
-            </a:pPr>
-            <a:r>
-              <a:rPr lang="en-US" sz="2000" dirty="0"/>
-              <a:t>a fundamental part of communication as well as rigorous, reproducible science in a lab,</a:t>
-            </a:r>
-          </a:p>
-          <a:p>
-            <a:pPr marL="285750" indent="-285750">
-              <a:buFont typeface="Arial" panose="020B0604020202020204" pitchFamily="34" charset="0"/>
-              <a:buChar char="•"/>
-            </a:pPr>
-            <a:r>
-              <a:rPr lang="en-US" sz="2000" dirty="0"/>
-              <a:t>a tool for preventing scientific fraud and for defending against allegations of fraud,</a:t>
-            </a:r>
-          </a:p>
-          <a:p>
-            <a:pPr marL="285750" indent="-285750">
-              <a:buFont typeface="Arial" panose="020B0604020202020204" pitchFamily="34" charset="0"/>
-              <a:buChar char="•"/>
-            </a:pPr>
-            <a:r>
-              <a:rPr lang="en-US" sz="2000" dirty="0"/>
-              <a:t>a common-place or required part of an experimental laboratory, and</a:t>
-            </a:r>
-          </a:p>
-          <a:p>
-            <a:pPr marL="285750" indent="-285750">
-              <a:buFont typeface="Arial" panose="020B0604020202020204" pitchFamily="34" charset="0"/>
-              <a:buChar char="•"/>
-            </a:pPr>
-            <a:r>
-              <a:rPr lang="en-US" sz="2000" dirty="0"/>
-              <a:t>Populating a scientific “lab notebook” was an “automated” process at the observatory.</a:t>
-            </a:r>
-          </a:p>
-        </p:txBody>
-      </p:sp>
-    </p:spTree>
-    <p:extLst>
-      <p:ext uri="{BB962C8B-B14F-4D97-AF65-F5344CB8AC3E}">
-        <p14:creationId xmlns:p14="http://schemas.microsoft.com/office/powerpoint/2010/main" val="1526375668"/>
-      </p:ext>
-    </p:extLst>
-  </p:cSld>
-  <p:clrMapOvr>
-    <a:masterClrMapping/>
-  </p:clrMapOvr>
-</p:sld>
-</file>
-
-<file path=ppt/slides/slide15.xml><?xml version="1.0" encoding="utf-8"?>
-<p:sld xmlns:a="http://schemas.openxmlformats.org/drawingml/2006/main" xmlns:r="http://schemas.openxmlformats.org/officeDocument/2006/relationships" xmlns:p="http://schemas.openxmlformats.org/presentationml/2006/main">
-  <p:cSld>
-    <p:spTree>
-      <p:nvGrpSpPr>
-        <p:cNvPr id="1" name=""/>
-        <p:cNvGrpSpPr/>
-        <p:nvPr/>
-      </p:nvGrpSpPr>
-      <p:grpSpPr>
-        <a:xfrm>
-          <a:off x="0" y="0"/>
-          <a:ext cx="0" cy="0"/>
-          <a:chOff x="0" y="0"/>
-          <a:chExt cx="0" cy="0"/>
-        </a:xfrm>
-      </p:grpSpPr>
-      <p:sp>
-        <p:nvSpPr>
-          <p:cNvPr id="2" name="Title 1">
-            <a:extLst>
-              <a:ext uri="{FF2B5EF4-FFF2-40B4-BE49-F238E27FC236}">
                 <a16:creationId xmlns:a16="http://schemas.microsoft.com/office/drawing/2014/main" id="{D91B3A35-D31B-5202-5327-3F2E4D74433D}"/>
               </a:ext>
             </a:extLst>
@@ -7050,7 +7802,7 @@
           <a:p>
             <a:r>
               <a:rPr lang="en-US" dirty="0"/>
-              <a:t>Don’t need perfect grammar and full sentences, </a:t>
+              <a:t>Don’t need perfect grammar and full sentences,</a:t>
             </a:r>
           </a:p>
           <a:p>
@@ -7135,7 +7887,7 @@
 </p:sld>
 </file>
 
-<file path=ppt/slides/slide16.xml><?xml version="1.0" encoding="utf-8"?>
+<file path=ppt/slides/slide15.xml><?xml version="1.0" encoding="utf-8"?>
 <p:sld xmlns:a="http://schemas.openxmlformats.org/drawingml/2006/main" xmlns:r="http://schemas.openxmlformats.org/officeDocument/2006/relationships" xmlns:p="http://schemas.openxmlformats.org/presentationml/2006/main">
   <p:cSld>
     <p:spTree>
@@ -7313,6 +8065,461 @@
     <p:extLst>
       <p:ext uri="{BB962C8B-B14F-4D97-AF65-F5344CB8AC3E}">
         <p14:creationId xmlns:p14="http://schemas.microsoft.com/office/powerpoint/2010/main" val="1981766383"/>
+      </p:ext>
+    </p:extLst>
+  </p:cSld>
+  <p:clrMapOvr>
+    <a:masterClrMapping/>
+  </p:clrMapOvr>
+</p:sld>
+</file>
+
+<file path=ppt/slides/slide16.xml><?xml version="1.0" encoding="utf-8"?>
+<p:sld xmlns:a="http://schemas.openxmlformats.org/drawingml/2006/main" xmlns:r="http://schemas.openxmlformats.org/officeDocument/2006/relationships" xmlns:p="http://schemas.openxmlformats.org/presentationml/2006/main">
+  <p:cSld>
+    <p:spTree>
+      <p:nvGrpSpPr>
+        <p:cNvPr id="1" name=""/>
+        <p:cNvGrpSpPr/>
+        <p:nvPr/>
+      </p:nvGrpSpPr>
+      <p:grpSpPr>
+        <a:xfrm>
+          <a:off x="0" y="0"/>
+          <a:ext cx="0" cy="0"/>
+          <a:chOff x="0" y="0"/>
+          <a:chExt cx="0" cy="0"/>
+        </a:xfrm>
+      </p:grpSpPr>
+      <p:sp>
+        <p:nvSpPr>
+          <p:cNvPr id="2" name="Title 1">
+            <a:extLst>
+              <a:ext uri="{FF2B5EF4-FFF2-40B4-BE49-F238E27FC236}">
+                <a16:creationId xmlns:a16="http://schemas.microsoft.com/office/drawing/2014/main" id="{3068DB0C-F0BD-C810-0320-3476DE4A6F55}"/>
+              </a:ext>
+            </a:extLst>
+          </p:cNvPr>
+          <p:cNvSpPr>
+            <a:spLocks noGrp="1"/>
+          </p:cNvSpPr>
+          <p:nvPr>
+            <p:ph type="title"/>
+          </p:nvPr>
+        </p:nvSpPr>
+        <p:spPr/>
+        <p:txBody>
+          <a:bodyPr/>
+          <a:lstStyle/>
+          <a:p>
+            <a:r>
+              <a:rPr lang="en-US" dirty="0"/>
+              <a:t>No one likes writing lab notes…</a:t>
+            </a:r>
+          </a:p>
+        </p:txBody>
+      </p:sp>
+      <p:sp>
+        <p:nvSpPr>
+          <p:cNvPr id="3" name="Content Placeholder 2">
+            <a:extLst>
+              <a:ext uri="{FF2B5EF4-FFF2-40B4-BE49-F238E27FC236}">
+                <a16:creationId xmlns:a16="http://schemas.microsoft.com/office/drawing/2014/main" id="{F100E866-8F79-2218-7AE0-147862690C86}"/>
+              </a:ext>
+            </a:extLst>
+          </p:cNvPr>
+          <p:cNvSpPr>
+            <a:spLocks noGrp="1"/>
+          </p:cNvSpPr>
+          <p:nvPr>
+            <p:ph idx="1"/>
+          </p:nvPr>
+        </p:nvSpPr>
+        <p:spPr>
+          <a:xfrm>
+            <a:off x="409507" y="2092357"/>
+            <a:ext cx="5440787" cy="4047778"/>
+          </a:xfrm>
+        </p:spPr>
+        <p:txBody>
+          <a:bodyPr/>
+          <a:lstStyle/>
+          <a:p>
+            <a:pPr marL="0" indent="0">
+              <a:buNone/>
+            </a:pPr>
+            <a:r>
+              <a:rPr lang="en-US" sz="2000" dirty="0"/>
+              <a:t>Optimistic</a:t>
+            </a:r>
+          </a:p>
+          <a:p>
+            <a:r>
+              <a:rPr lang="en-US" sz="2000" dirty="0"/>
+              <a:t>Lack of experience</a:t>
+            </a:r>
+          </a:p>
+          <a:p>
+            <a:r>
+              <a:rPr lang="en-US" sz="2000" dirty="0"/>
+              <a:t>Lack of training</a:t>
+            </a:r>
+          </a:p>
+          <a:p>
+            <a:r>
+              <a:rPr lang="en-US" sz="2000" dirty="0"/>
+              <a:t>Lack of appreciation</a:t>
+            </a:r>
+          </a:p>
+          <a:p>
+            <a:r>
+              <a:rPr lang="en-US" sz="2000" dirty="0"/>
+              <a:t>Lack of incentives</a:t>
+            </a:r>
+          </a:p>
+        </p:txBody>
+      </p:sp>
+      <p:sp>
+        <p:nvSpPr>
+          <p:cNvPr id="4" name="Content Placeholder 2">
+            <a:extLst>
+              <a:ext uri="{FF2B5EF4-FFF2-40B4-BE49-F238E27FC236}">
+                <a16:creationId xmlns:a16="http://schemas.microsoft.com/office/drawing/2014/main" id="{4F285C41-25FD-7164-0152-69A4495BCC55}"/>
+              </a:ext>
+            </a:extLst>
+          </p:cNvPr>
+          <p:cNvSpPr txBox="1">
+            <a:spLocks/>
+          </p:cNvSpPr>
+          <p:nvPr/>
+        </p:nvSpPr>
+        <p:spPr bwMode="auto">
+          <a:xfrm>
+            <a:off x="5934268" y="2092357"/>
+            <a:ext cx="5801300" cy="2479641"/>
+          </a:xfrm>
+          <a:prstGeom prst="rect">
+            <a:avLst/>
+          </a:prstGeom>
+          <a:noFill/>
+          <a:ln w="9525">
+            <a:noFill/>
+            <a:miter lim="800000"/>
+            <a:headEnd/>
+            <a:tailEnd/>
+          </a:ln>
+        </p:spPr>
+        <p:txBody>
+          <a:bodyPr vert="horz" wrap="square" lIns="91440" tIns="45720" rIns="91440" bIns="45720" numCol="1" anchor="t" anchorCtr="0" compatLnSpc="1">
+            <a:prstTxWarp prst="textNoShape">
+              <a:avLst/>
+            </a:prstTxWarp>
+            <a:noAutofit/>
+          </a:bodyPr>
+          <a:lstStyle>
+            <a:lvl1pPr marL="230188" indent="-230188" algn="l" rtl="0" eaLnBrk="1" fontAlgn="base" hangingPunct="1">
+              <a:lnSpc>
+                <a:spcPct val="90000"/>
+              </a:lnSpc>
+              <a:spcBef>
+                <a:spcPts val="1400"/>
+              </a:spcBef>
+              <a:spcAft>
+                <a:spcPct val="0"/>
+              </a:spcAft>
+              <a:buClr>
+                <a:schemeClr val="tx1"/>
+              </a:buClr>
+              <a:buFont typeface="Arial" charset="0"/>
+              <a:buChar char="•"/>
+              <a:defRPr sz="2400" kern="1200">
+                <a:solidFill>
+                  <a:schemeClr val="tx1"/>
+                </a:solidFill>
+                <a:latin typeface="Arial" panose="020B0604020202020204" pitchFamily="34" charset="0"/>
+                <a:ea typeface="+mn-ea"/>
+                <a:cs typeface="Arial" panose="020B0604020202020204" pitchFamily="34" charset="0"/>
+              </a:defRPr>
+            </a:lvl1pPr>
+            <a:lvl2pPr marL="625475" indent="-279400" algn="l" rtl="0" eaLnBrk="1" fontAlgn="base" hangingPunct="1">
+              <a:lnSpc>
+                <a:spcPct val="90000"/>
+              </a:lnSpc>
+              <a:spcBef>
+                <a:spcPts val="800"/>
+              </a:spcBef>
+              <a:spcAft>
+                <a:spcPct val="0"/>
+              </a:spcAft>
+              <a:buClr>
+                <a:schemeClr val="tx1"/>
+              </a:buClr>
+              <a:buFont typeface="Arial" charset="0"/>
+              <a:buChar char="–"/>
+              <a:defRPr sz="2000" kern="1200">
+                <a:solidFill>
+                  <a:schemeClr val="tx1"/>
+                </a:solidFill>
+                <a:latin typeface="Arial" panose="020B0604020202020204" pitchFamily="34" charset="0"/>
+                <a:ea typeface="+mn-ea"/>
+                <a:cs typeface="Arial" panose="020B0604020202020204" pitchFamily="34" charset="0"/>
+              </a:defRPr>
+            </a:lvl2pPr>
+            <a:lvl3pPr marL="914400" indent="-230188" algn="l" rtl="0" eaLnBrk="1" fontAlgn="base" hangingPunct="1">
+              <a:lnSpc>
+                <a:spcPct val="90000"/>
+              </a:lnSpc>
+              <a:spcBef>
+                <a:spcPts val="800"/>
+              </a:spcBef>
+              <a:spcAft>
+                <a:spcPct val="0"/>
+              </a:spcAft>
+              <a:buClr>
+                <a:schemeClr val="tx1"/>
+              </a:buClr>
+              <a:buFont typeface="Arial" charset="0"/>
+              <a:buChar char="•"/>
+              <a:defRPr sz="1800" kern="1200">
+                <a:solidFill>
+                  <a:schemeClr val="tx1"/>
+                </a:solidFill>
+                <a:latin typeface="Arial" panose="020B0604020202020204" pitchFamily="34" charset="0"/>
+                <a:ea typeface="+mn-ea"/>
+                <a:cs typeface="Arial" panose="020B0604020202020204" pitchFamily="34" charset="0"/>
+              </a:defRPr>
+            </a:lvl3pPr>
+            <a:lvl4pPr marL="1144588" indent="-173038" algn="l" rtl="0" eaLnBrk="1" fontAlgn="base" hangingPunct="1">
+              <a:lnSpc>
+                <a:spcPct val="90000"/>
+              </a:lnSpc>
+              <a:spcBef>
+                <a:spcPts val="800"/>
+              </a:spcBef>
+              <a:spcAft>
+                <a:spcPct val="0"/>
+              </a:spcAft>
+              <a:buClr>
+                <a:schemeClr val="tx1"/>
+              </a:buClr>
+              <a:buFont typeface="Arial" charset="0"/>
+              <a:buChar char="–"/>
+              <a:defRPr sz="1600" kern="1200">
+                <a:solidFill>
+                  <a:schemeClr val="tx1"/>
+                </a:solidFill>
+                <a:latin typeface="Arial" panose="020B0604020202020204" pitchFamily="34" charset="0"/>
+                <a:ea typeface="+mn-ea"/>
+                <a:cs typeface="Arial" panose="020B0604020202020204" pitchFamily="34" charset="0"/>
+              </a:defRPr>
+            </a:lvl4pPr>
+            <a:lvl5pPr marL="1482725" indent="-222250" algn="l" rtl="0" eaLnBrk="1" fontAlgn="base" hangingPunct="1">
+              <a:lnSpc>
+                <a:spcPct val="90000"/>
+              </a:lnSpc>
+              <a:spcBef>
+                <a:spcPts val="600"/>
+              </a:spcBef>
+              <a:spcAft>
+                <a:spcPct val="0"/>
+              </a:spcAft>
+              <a:buClr>
+                <a:schemeClr val="tx1"/>
+              </a:buClr>
+              <a:buFont typeface="Arial" panose="020B0604020202020204" pitchFamily="34" charset="0"/>
+              <a:buChar char="•"/>
+              <a:defRPr sz="1600" kern="1200">
+                <a:solidFill>
+                  <a:schemeClr val="tx1"/>
+                </a:solidFill>
+                <a:latin typeface="Arial" panose="020B0604020202020204" pitchFamily="34" charset="0"/>
+                <a:ea typeface="+mn-ea"/>
+                <a:cs typeface="Arial" panose="020B0604020202020204" pitchFamily="34" charset="0"/>
+              </a:defRPr>
+            </a:lvl5pPr>
+            <a:lvl6pPr marL="2514600" indent="-228600" algn="l" defTabSz="914400" rtl="0" eaLnBrk="1" latinLnBrk="0" hangingPunct="1">
+              <a:spcBef>
+                <a:spcPct val="20000"/>
+              </a:spcBef>
+              <a:buFont typeface="Arial" pitchFamily="34" charset="0"/>
+              <a:buChar char="•"/>
+              <a:defRPr sz="2000" kern="1200">
+                <a:solidFill>
+                  <a:schemeClr val="tx1"/>
+                </a:solidFill>
+                <a:latin typeface="+mn-lt"/>
+                <a:ea typeface="+mn-ea"/>
+                <a:cs typeface="+mn-cs"/>
+              </a:defRPr>
+            </a:lvl6pPr>
+            <a:lvl7pPr marL="2971800" indent="-228600" algn="l" defTabSz="914400" rtl="0" eaLnBrk="1" latinLnBrk="0" hangingPunct="1">
+              <a:spcBef>
+                <a:spcPct val="20000"/>
+              </a:spcBef>
+              <a:buFont typeface="Arial" pitchFamily="34" charset="0"/>
+              <a:buChar char="•"/>
+              <a:defRPr sz="2000" kern="1200">
+                <a:solidFill>
+                  <a:schemeClr val="tx1"/>
+                </a:solidFill>
+                <a:latin typeface="+mn-lt"/>
+                <a:ea typeface="+mn-ea"/>
+                <a:cs typeface="+mn-cs"/>
+              </a:defRPr>
+            </a:lvl7pPr>
+            <a:lvl8pPr marL="3429000" indent="-228600" algn="l" defTabSz="914400" rtl="0" eaLnBrk="1" latinLnBrk="0" hangingPunct="1">
+              <a:spcBef>
+                <a:spcPct val="20000"/>
+              </a:spcBef>
+              <a:buFont typeface="Arial" pitchFamily="34" charset="0"/>
+              <a:buChar char="•"/>
+              <a:defRPr sz="2000" kern="1200">
+                <a:solidFill>
+                  <a:schemeClr val="tx1"/>
+                </a:solidFill>
+                <a:latin typeface="+mn-lt"/>
+                <a:ea typeface="+mn-ea"/>
+                <a:cs typeface="+mn-cs"/>
+              </a:defRPr>
+            </a:lvl8pPr>
+            <a:lvl9pPr marL="3886200" indent="-228600" algn="l" defTabSz="914400" rtl="0" eaLnBrk="1" latinLnBrk="0" hangingPunct="1">
+              <a:spcBef>
+                <a:spcPct val="20000"/>
+              </a:spcBef>
+              <a:buFont typeface="Arial" pitchFamily="34" charset="0"/>
+              <a:buChar char="•"/>
+              <a:defRPr sz="2000" kern="1200">
+                <a:solidFill>
+                  <a:schemeClr val="tx1"/>
+                </a:solidFill>
+                <a:latin typeface="+mn-lt"/>
+                <a:ea typeface="+mn-ea"/>
+                <a:cs typeface="+mn-cs"/>
+              </a:defRPr>
+            </a:lvl9pPr>
+          </a:lstStyle>
+          <a:p>
+            <a:pPr marL="0" indent="0">
+              <a:buNone/>
+            </a:pPr>
+            <a:r>
+              <a:rPr lang="en-US" sz="2000" dirty="0"/>
+              <a:t>Cynical</a:t>
+            </a:r>
+          </a:p>
+          <a:p>
+            <a:r>
+              <a:rPr lang="en-US" sz="2000" dirty="0"/>
+              <a:t>We want and appreciate it when others share knowledge with us.</a:t>
+            </a:r>
+          </a:p>
+          <a:p>
+            <a:r>
+              <a:rPr lang="en-US" sz="2000" dirty="0"/>
+              <a:t>We don’t want to take the time to capture, preserve, and communicate knowledge we generate.</a:t>
+            </a:r>
+          </a:p>
+        </p:txBody>
+      </p:sp>
+      <p:sp>
+        <p:nvSpPr>
+          <p:cNvPr id="5" name="TextBox 4">
+            <a:extLst>
+              <a:ext uri="{FF2B5EF4-FFF2-40B4-BE49-F238E27FC236}">
+                <a16:creationId xmlns:a16="http://schemas.microsoft.com/office/drawing/2014/main" id="{62A06DBE-0C76-4BBC-6218-0B193ACAD5FE}"/>
+              </a:ext>
+            </a:extLst>
+          </p:cNvPr>
+          <p:cNvSpPr txBox="1"/>
+          <p:nvPr/>
+        </p:nvSpPr>
+        <p:spPr>
+          <a:xfrm>
+            <a:off x="1642805" y="1157496"/>
+            <a:ext cx="8582927" cy="803297"/>
+          </a:xfrm>
+          <a:prstGeom prst="rect">
+            <a:avLst/>
+          </a:prstGeom>
+          <a:noFill/>
+        </p:spPr>
+        <p:txBody>
+          <a:bodyPr wrap="none" lIns="118872" tIns="91440" rIns="118872" bIns="91440" rtlCol="0" anchor="ctr" anchorCtr="0">
+            <a:spAutoFit/>
+          </a:bodyPr>
+          <a:lstStyle/>
+          <a:p>
+            <a:pPr lvl="1"/>
+            <a:r>
+              <a:rPr lang="en-US" sz="2400" dirty="0"/>
+              <a:t>We love to consume documentation; write it, not so much.</a:t>
+            </a:r>
+          </a:p>
+          <a:p>
+            <a:pPr algn="l">
+              <a:lnSpc>
+                <a:spcPct val="90000"/>
+              </a:lnSpc>
+            </a:pPr>
+            <a:endParaRPr lang="en-US" dirty="0"/>
+          </a:p>
+        </p:txBody>
+      </p:sp>
+      <p:sp>
+        <p:nvSpPr>
+          <p:cNvPr id="6" name="TextBox 5">
+            <a:extLst>
+              <a:ext uri="{FF2B5EF4-FFF2-40B4-BE49-F238E27FC236}">
+                <a16:creationId xmlns:a16="http://schemas.microsoft.com/office/drawing/2014/main" id="{2DB2D50D-DAD0-2A00-E9BE-362D6401030C}"/>
+              </a:ext>
+            </a:extLst>
+          </p:cNvPr>
+          <p:cNvSpPr txBox="1"/>
+          <p:nvPr/>
+        </p:nvSpPr>
+        <p:spPr>
+          <a:xfrm>
+            <a:off x="1306285" y="4618653"/>
+            <a:ext cx="9088017" cy="1541961"/>
+          </a:xfrm>
+          <a:prstGeom prst="rect">
+            <a:avLst/>
+          </a:prstGeom>
+          <a:noFill/>
+        </p:spPr>
+        <p:txBody>
+          <a:bodyPr wrap="square" lIns="118872" tIns="91440" rIns="118872" bIns="91440" rtlCol="0" anchor="ctr" anchorCtr="0">
+            <a:spAutoFit/>
+          </a:bodyPr>
+          <a:lstStyle/>
+          <a:p>
+            <a:pPr algn="ctr"/>
+            <a:r>
+              <a:rPr lang="en-US" sz="2400" b="1" dirty="0"/>
+              <a:t>One aspect of productivity</a:t>
+            </a:r>
+          </a:p>
+          <a:p>
+            <a:pPr lvl="1" algn="ctr"/>
+            <a:r>
+              <a:rPr lang="en-US" sz="2400" dirty="0"/>
+              <a:t>One person decreases their short-term efficiency so that many (and the team) achieve long-term efficiency and quality.</a:t>
+            </a:r>
+          </a:p>
+          <a:p>
+            <a:pPr algn="ctr">
+              <a:lnSpc>
+                <a:spcPct val="90000"/>
+              </a:lnSpc>
+            </a:pPr>
+            <a:endParaRPr lang="en-US" dirty="0"/>
+          </a:p>
+        </p:txBody>
+      </p:sp>
+    </p:spTree>
+    <p:extLst>
+      <p:ext uri="{BB962C8B-B14F-4D97-AF65-F5344CB8AC3E}">
+        <p14:creationId xmlns:p14="http://schemas.microsoft.com/office/powerpoint/2010/main" val="872583987"/>
       </p:ext>
     </p:extLst>
   </p:cSld>
@@ -7683,13 +8890,13 @@
           <a:p>
             <a:r>
               <a:rPr lang="en-US" dirty="0"/>
+              <a:t>Sometimes it’s good if notetaking slows down progress</a:t>
+            </a:r>
+          </a:p>
+          <a:p>
+            <a:r>
+              <a:rPr lang="en-US" dirty="0"/>
               <a:t>Concentrate on the work that I am performing rather than on tooling</a:t>
-            </a:r>
-          </a:p>
-          <a:p>
-            <a:r>
-              <a:rPr lang="en-US" dirty="0"/>
-              <a:t>Sometimes it’s good if notetaking slows down progress</a:t>
             </a:r>
           </a:p>
           <a:p>
@@ -8406,7 +9613,7 @@
             </a:pPr>
             <a:r>
               <a:rPr lang="en-US" dirty="0"/>
-              <a:t>Scientific HPC is several young fields that “on close examination, have not really stabilized or optimized their collaborative processes in a manner analogous to that of more mature, "classical" sciences. As a consequence, valuable science is often needlessly lost, or left uncollected.”</a:t>
+              <a:t>Scientific HPC is several young fields that “on close examination, have not really stabilized or optimized their collaborative processes in a manner analogous to that of more mature, ‘classical’ sciences. As a consequence, valuable science is often needlessly lost, or left uncollected.”</a:t>
             </a:r>
           </a:p>
           <a:p>
@@ -8531,7 +9738,12 @@
             <p:ph idx="1"/>
           </p:nvPr>
         </p:nvSpPr>
-        <p:spPr/>
+        <p:spPr>
+          <a:xfrm>
+            <a:off x="365760" y="1438778"/>
+            <a:ext cx="11369809" cy="4047778"/>
+          </a:xfrm>
+        </p:spPr>
         <p:txBody>
           <a:bodyPr/>
           <a:lstStyle/>
@@ -8610,7 +9822,7 @@
         </p:nvSpPr>
         <p:spPr>
           <a:xfrm>
-            <a:off x="3121573" y="5307363"/>
+            <a:off x="3121573" y="5232715"/>
             <a:ext cx="6620017" cy="766364"/>
           </a:xfrm>
           <a:prstGeom prst="rect">
@@ -8992,7 +10204,12 @@
             <p:ph idx="1"/>
           </p:nvPr>
         </p:nvSpPr>
-        <p:spPr/>
+        <p:spPr>
+          <a:xfrm>
+            <a:off x="365760" y="1196184"/>
+            <a:ext cx="11369809" cy="4047778"/>
+          </a:xfrm>
+        </p:spPr>
         <p:txBody>
           <a:bodyPr/>
           <a:lstStyle/>
@@ -9020,8 +10237,12 @@
           <a:p>
             <a:pPr lvl="1"/>
             <a:r>
-              <a:rPr lang="en-US" dirty="0"/>
-              <a:t>Example: When relative humidity levels are high and the temperature drops, there is an increased probability of precipitation. </a:t>
+              <a:rPr lang="en-US" b="1" dirty="0"/>
+              <a:t>Example</a:t>
+            </a:r>
+            <a:r>
+              <a:rPr lang="en-US" dirty="0"/>
+              <a:t>: When relative humidity levels are high and the temperature drops, there is an increased probability of precipitation. </a:t>
             </a:r>
             <a:r>
               <a:rPr lang="en-US" dirty="0">
@@ -9042,22 +10263,32 @@
             <a:pPr lvl="1"/>
             <a:r>
               <a:rPr lang="en-US" dirty="0"/>
-              <a:t>A deep theoretical background in and practical experience with </a:t>
-            </a:r>
-            <a:r>
-              <a:rPr lang="en-US" dirty="0" err="1"/>
-              <a:t>thesystem</a:t>
-            </a:r>
-            <a:r>
-              <a:rPr lang="en-US" dirty="0"/>
-              <a:t> whose data was acquired and studied.</a:t>
+              <a:t>A deep theoretical background in and practical experience with the system whose data was acquired and studied?</a:t>
             </a:r>
           </a:p>
           <a:p>
             <a:pPr lvl="1"/>
             <a:r>
               <a:rPr lang="en-US" dirty="0"/>
-              <a:t>Example: A meteorologist could explain (at different levels of detail) how the atmosphere works to substantiate the knowledge.</a:t>
+              <a:t>The ability to explain why?</a:t>
+            </a:r>
+          </a:p>
+          <a:p>
+            <a:pPr lvl="1"/>
+            <a:r>
+              <a:rPr lang="en-US" dirty="0"/>
+              <a:t>“Understanding is a kind of ecstasy” – Carl Sagan </a:t>
+            </a:r>
+          </a:p>
+          <a:p>
+            <a:pPr lvl="1"/>
+            <a:r>
+              <a:rPr lang="en-US" b="1" dirty="0"/>
+              <a:t>Example</a:t>
+            </a:r>
+            <a:r>
+              <a:rPr lang="en-US" dirty="0"/>
+              <a:t>: A meteorologist could explain at different levels of detail how the atmosphere works to justify the knowledge.</a:t>
             </a:r>
           </a:p>
           <a:p>
@@ -9082,7 +10313,7 @@
         </p:nvSpPr>
         <p:spPr>
           <a:xfrm>
-            <a:off x="2057954" y="5180570"/>
+            <a:off x="2057954" y="5311200"/>
             <a:ext cx="8072916" cy="517065"/>
           </a:xfrm>
           <a:prstGeom prst="rect">
@@ -10352,6 +11583,15 @@
 </file>
 
 <file path=customXml/item1.xml><?xml version="1.0" encoding="utf-8"?>
+<?mso-contentType ?>
+<FormTemplates xmlns="http://schemas.microsoft.com/sharepoint/v3/contenttype/forms">
+  <Display>DocumentLibraryForm</Display>
+  <Edit>DocumentLibraryForm</Edit>
+  <New>DocumentLibraryForm</New>
+</FormTemplates>
+</file>
+
+<file path=customXml/item2.xml><?xml version="1.0" encoding="utf-8"?>
 <ct:contentTypeSchema xmlns:ct="http://schemas.microsoft.com/office/2006/metadata/contentType" xmlns:ma="http://schemas.microsoft.com/office/2006/metadata/properties/metaAttributes" ct:_="" ma:_="" ma:contentTypeName="Document" ma:contentTypeID="0x010100565464437F680748A68B85EB6594EA7D" ma:contentTypeVersion="0" ma:contentTypeDescription="Create a new document." ma:contentTypeScope="" ma:versionID="fe3f4dd58d5914c51cfc6deaa8ad845c">
   <xsd:schema xmlns:xsd="http://www.w3.org/2001/XMLSchema" xmlns:p="http://schemas.microsoft.com/office/2006/metadata/properties" targetNamespace="http://schemas.microsoft.com/office/2006/metadata/properties" ma:root="true" ma:fieldsID="4aeb20c0e3442673af7ee10786458764">
     <xsd:element name="properties">
@@ -10400,15 +11640,6 @@
 </ct:contentTypeSchema>
 </file>
 
-<file path=customXml/item2.xml><?xml version="1.0" encoding="utf-8"?>
-<?mso-contentType ?>
-<FormTemplates xmlns="http://schemas.microsoft.com/sharepoint/v3/contenttype/forms">
-  <Display>DocumentLibraryForm</Display>
-  <Edit>DocumentLibraryForm</Edit>
-  <New>DocumentLibraryForm</New>
-</FormTemplates>
-</file>
-
 <file path=customXml/item3.xml><?xml version="1.0" encoding="utf-8"?>
 <p:properties xmlns:p="http://schemas.microsoft.com/office/2006/metadata/properties" xmlns:xsi="http://www.w3.org/2001/XMLSchema-instance" xmlns:pc="http://schemas.microsoft.com/office/infopath/2007/PartnerControls">
   <documentManagement/>
@@ -10416,6 +11647,14 @@
 </file>
 
 <file path=customXml/itemProps1.xml><?xml version="1.0" encoding="utf-8"?>
+<ds:datastoreItem xmlns:ds="http://schemas.openxmlformats.org/officeDocument/2006/customXml" ds:itemID="{19E20559-B232-4371-8690-E3D8007EDB82}">
+  <ds:schemaRefs>
+    <ds:schemaRef ds:uri="http://schemas.microsoft.com/sharepoint/v3/contenttype/forms"/>
+  </ds:schemaRefs>
+</ds:datastoreItem>
+</file>
+
+<file path=customXml/itemProps2.xml><?xml version="1.0" encoding="utf-8"?>
 <ds:datastoreItem xmlns:ds="http://schemas.openxmlformats.org/officeDocument/2006/customXml" ds:itemID="{E8DB7DEB-074E-4EE8-9B6E-FD277323109C}">
   <ds:schemaRefs>
     <ds:schemaRef ds:uri="http://schemas.microsoft.com/office/2006/metadata/contentType"/>
@@ -10426,14 +11665,6 @@
     <ds:schemaRef ds:uri="http://purl.org/dc/elements/1.1/"/>
     <ds:schemaRef ds:uri="http://purl.org/dc/terms/"/>
     <ds:schemaRef ds:uri="http://schemas.microsoft.com/office/internal/2005/internalDocumentation"/>
-  </ds:schemaRefs>
-</ds:datastoreItem>
-</file>
-
-<file path=customXml/itemProps2.xml><?xml version="1.0" encoding="utf-8"?>
-<ds:datastoreItem xmlns:ds="http://schemas.openxmlformats.org/officeDocument/2006/customXml" ds:itemID="{19E20559-B232-4371-8690-E3D8007EDB82}">
-  <ds:schemaRefs>
-    <ds:schemaRef ds:uri="http://schemas.microsoft.com/sharepoint/v3/contenttype/forms"/>
   </ds:schemaRefs>
 </ds:datastoreItem>
 </file>

</xml_diff>

<commit_message>
(Issue #133)  Reworked some slides.  Added in lab notes examples.  No more TODOs in slide deck.
</commit_message>
<xml_diff>
--- a/lab-notebooks.pptx
+++ b/lab-notebooks.pptx
@@ -5,26 +5,26 @@
     <p:sldMasterId id="2147483935" r:id="rId4"/>
   </p:sldMasterIdLst>
   <p:notesMasterIdLst>
-    <p:notesMasterId r:id="rId27"/>
+    <p:notesMasterId r:id="rId29"/>
   </p:notesMasterIdLst>
   <p:handoutMasterIdLst>
-    <p:handoutMasterId r:id="rId28"/>
+    <p:handoutMasterId r:id="rId30"/>
   </p:handoutMasterIdLst>
   <p:sldIdLst>
     <p:sldId id="256" r:id="rId5"/>
     <p:sldId id="321" r:id="rId6"/>
     <p:sldId id="322" r:id="rId7"/>
     <p:sldId id="323" r:id="rId8"/>
-    <p:sldId id="325" r:id="rId9"/>
-    <p:sldId id="326" r:id="rId10"/>
-    <p:sldId id="327" r:id="rId11"/>
-    <p:sldId id="328" r:id="rId12"/>
-    <p:sldId id="329" r:id="rId13"/>
-    <p:sldId id="330" r:id="rId14"/>
-    <p:sldId id="332" r:id="rId15"/>
-    <p:sldId id="331" r:id="rId16"/>
-    <p:sldId id="336" r:id="rId17"/>
-    <p:sldId id="341" r:id="rId18"/>
+    <p:sldId id="349" r:id="rId9"/>
+    <p:sldId id="325" r:id="rId10"/>
+    <p:sldId id="326" r:id="rId11"/>
+    <p:sldId id="327" r:id="rId12"/>
+    <p:sldId id="328" r:id="rId13"/>
+    <p:sldId id="329" r:id="rId14"/>
+    <p:sldId id="330" r:id="rId15"/>
+    <p:sldId id="332" r:id="rId16"/>
+    <p:sldId id="331" r:id="rId17"/>
+    <p:sldId id="336" r:id="rId18"/>
     <p:sldId id="346" r:id="rId19"/>
     <p:sldId id="338" r:id="rId20"/>
     <p:sldId id="345" r:id="rId21"/>
@@ -33,6 +33,8 @@
     <p:sldId id="343" r:id="rId24"/>
     <p:sldId id="339" r:id="rId25"/>
     <p:sldId id="344" r:id="rId26"/>
+    <p:sldId id="348" r:id="rId27"/>
+    <p:sldId id="347" r:id="rId28"/>
   </p:sldIdLst>
   <p:sldSz cx="12188825" cy="6858000"/>
   <p:notesSz cx="7010400" cy="9296400"/>
@@ -934,7 +936,7 @@
           <a:p>
             <a:fld id="{54E672D7-8E2D-4611-973D-F4591A707C34}" type="slidenum">
               <a:rPr lang="en-US" smtClean="0"/>
-              <a:t>11</a:t>
+              <a:t>12</a:t>
             </a:fld>
             <a:endParaRPr lang="en-US"/>
           </a:p>
@@ -1021,7 +1023,7 @@
           <a:p>
             <a:fld id="{54E672D7-8E2D-4611-973D-F4591A707C34}" type="slidenum">
               <a:rPr lang="en-US" smtClean="0"/>
-              <a:t>12</a:t>
+              <a:t>13</a:t>
             </a:fld>
             <a:endParaRPr lang="en-US"/>
           </a:p>
@@ -1108,7 +1110,7 @@
           <a:p>
             <a:fld id="{54E672D7-8E2D-4611-973D-F4591A707C34}" type="slidenum">
               <a:rPr lang="en-US" smtClean="0"/>
-              <a:t>13</a:t>
+              <a:t>14</a:t>
             </a:fld>
             <a:endParaRPr lang="en-US"/>
           </a:p>
@@ -1173,20 +1175,124 @@
           <a:p>
             <a:r>
               <a:rPr lang="en-US" dirty="0"/>
-              <a:t>Emphasize no filtering.  We often believe in the moment that we can predict what will be relevant and useful.  We are usually wrong.</a:t>
-            </a:r>
-          </a:p>
-          <a:p>
+              <a:t>Reasons why the bad is indeed bad.</a:t>
+            </a:r>
+          </a:p>
+          <a:p>
+            <a:pPr marL="171450" indent="-171450">
+              <a:buFont typeface="Arial" panose="020B0604020202020204" pitchFamily="34" charset="0"/>
+              <a:buChar char="•"/>
+            </a:pPr>
+            <a:r>
+              <a:rPr lang="en-US" dirty="0"/>
+              <a:t>Not at all comprehensive.</a:t>
+            </a:r>
+          </a:p>
+          <a:p>
+            <a:pPr marL="171450" indent="-171450">
+              <a:buFont typeface="Arial" panose="020B0604020202020204" pitchFamily="34" charset="0"/>
+              <a:buChar char="•"/>
+            </a:pPr>
+            <a:r>
+              <a:rPr lang="en-US" dirty="0"/>
+              <a:t>Don’t explain what the bug is.</a:t>
+            </a:r>
+          </a:p>
+          <a:p>
+            <a:pPr marL="171450" indent="-171450">
+              <a:buFont typeface="Arial" panose="020B0604020202020204" pitchFamily="34" charset="0"/>
+              <a:buChar char="•"/>
+            </a:pPr>
+            <a:r>
+              <a:rPr lang="en-US" dirty="0"/>
+              <a:t>Didn’t explain what library nor what the issue was with the bug.</a:t>
+            </a:r>
+          </a:p>
+          <a:p>
+            <a:pPr marL="171450" indent="-171450">
+              <a:buFont typeface="Arial" panose="020B0604020202020204" pitchFamily="34" charset="0"/>
+              <a:buChar char="•"/>
+            </a:pPr>
+            <a:r>
+              <a:rPr lang="en-US" dirty="0"/>
+              <a:t>Didn’t explain if tests were failing before and if so, which and how.</a:t>
+            </a:r>
+          </a:p>
+          <a:p>
+            <a:pPr marL="171450" indent="-171450">
+              <a:buFont typeface="Arial" panose="020B0604020202020204" pitchFamily="34" charset="0"/>
+              <a:buChar char="•"/>
+            </a:pPr>
+            <a:r>
+              <a:rPr lang="en-US" dirty="0"/>
+              <a:t>It was a lot of work.  Some details about how the debugging progressed my be useful for others or for future me.  If we had done this well, such notes might serve as a procedure for finding similar bugs in the future.</a:t>
+            </a:r>
+          </a:p>
+          <a:p>
+            <a:pPr marL="171450" indent="-171450">
+              <a:buFont typeface="Arial" panose="020B0604020202020204" pitchFamily="34" charset="0"/>
+              <a:buChar char="•"/>
+            </a:pPr>
             <a:endParaRPr lang="en-US" dirty="0"/>
           </a:p>
           <a:p>
-            <a:r>
-              <a:rPr lang="en-US" dirty="0" err="1"/>
-              <a:t>Kanare’s</a:t>
-            </a:r>
-            <a:r>
-              <a:rPr lang="en-US" dirty="0"/>
-              <a:t> quote does not imply that we need to put in motivation, reasoning, conclusions.  The quote makes it sound more like a cookbook.  I like to expand that so that the content captures the state of my brain and my train of thought.  Then, rereading my notes helps me load that state into my brain.  Hopefully it will do the same for others.</a:t>
+            <a:pPr marL="171450" indent="-171450">
+              <a:buFont typeface="Arial" panose="020B0604020202020204" pitchFamily="34" charset="0"/>
+              <a:buChar char="•"/>
+            </a:pPr>
+            <a:r>
+              <a:rPr lang="en-US" dirty="0"/>
+              <a:t>Doesn’t need to be exhaustive.  I can just leave myself some bread crumbs with the expectation that writing notes is easier, but recreating notes could be time consuming should I ever need to do so.</a:t>
+            </a:r>
+          </a:p>
+          <a:p>
+            <a:pPr marL="171450" indent="-171450">
+              <a:buFont typeface="Arial" panose="020B0604020202020204" pitchFamily="34" charset="0"/>
+              <a:buChar char="•"/>
+            </a:pPr>
+            <a:r>
+              <a:rPr lang="en-US" dirty="0"/>
+              <a:t>Are the bread crumbs enough?  Can they determine what flags are implied by debug version?  What about the full SW stack?  What about the SW stack for the analysis?  Is such detail needed for this stage of work and if not, is that filtering?</a:t>
+            </a:r>
+          </a:p>
+          <a:p>
+            <a:pPr marL="171450" indent="-171450">
+              <a:buFont typeface="Arial" panose="020B0604020202020204" pitchFamily="34" charset="0"/>
+              <a:buChar char="•"/>
+            </a:pPr>
+            <a:r>
+              <a:rPr lang="en-US" dirty="0"/>
+              <a:t>Note that the build logs are acting as lab notes.</a:t>
+            </a:r>
+          </a:p>
+          <a:p>
+            <a:pPr marL="171450" indent="-171450">
+              <a:buFont typeface="Arial" panose="020B0604020202020204" pitchFamily="34" charset="0"/>
+              <a:buChar char="•"/>
+            </a:pPr>
+            <a:r>
+              <a:rPr lang="en-US" dirty="0"/>
+              <a:t>Note also, that we could have included git information in the build logs to make things simpler.</a:t>
+            </a:r>
+          </a:p>
+          <a:p>
+            <a:pPr marL="171450" indent="-171450">
+              <a:buFont typeface="Arial" panose="020B0604020202020204" pitchFamily="34" charset="0"/>
+              <a:buChar char="•"/>
+            </a:pPr>
+            <a:r>
+              <a:rPr lang="en-US" dirty="0"/>
+              <a:t>We likely should have included a graphic that points out missing peak.  Annotating the graphic with what was expected would be nice.</a:t>
+            </a:r>
+          </a:p>
+          <a:p>
+            <a:pPr marL="171450" indent="-171450">
+              <a:buFont typeface="Arial" panose="020B0604020202020204" pitchFamily="34" charset="0"/>
+              <a:buChar char="•"/>
+            </a:pPr>
+            <a:r>
+              <a:rPr lang="en-US" dirty="0"/>
+              <a:t>The better example is also not great.</a:t>
             </a:r>
           </a:p>
         </p:txBody>
@@ -1208,7 +1314,7 @@
           <a:p>
             <a:fld id="{54E672D7-8E2D-4611-973D-F4591A707C34}" type="slidenum">
               <a:rPr lang="en-US" smtClean="0"/>
-              <a:t>14</a:t>
+              <a:t>15</a:t>
             </a:fld>
             <a:endParaRPr lang="en-US"/>
           </a:p>
@@ -1217,7 +1323,7 @@
     </p:spTree>
     <p:extLst>
       <p:ext uri="{BB962C8B-B14F-4D97-AF65-F5344CB8AC3E}">
-        <p14:creationId xmlns:p14="http://schemas.microsoft.com/office/powerpoint/2010/main" val="2768668385"/>
+        <p14:creationId xmlns:p14="http://schemas.microsoft.com/office/powerpoint/2010/main" val="1636867555"/>
       </p:ext>
     </p:extLst>
   </p:cSld>
@@ -2285,7 +2391,7 @@
           <a:p>
             <a:fld id="{54E672D7-8E2D-4611-973D-F4591A707C34}" type="slidenum">
               <a:rPr lang="en-US" smtClean="0"/>
-              <a:t>5</a:t>
+              <a:t>6</a:t>
             </a:fld>
             <a:endParaRPr lang="en-US"/>
           </a:p>
@@ -2390,7 +2496,7 @@
           <a:p>
             <a:fld id="{54E672D7-8E2D-4611-973D-F4591A707C34}" type="slidenum">
               <a:rPr lang="en-US" smtClean="0"/>
-              <a:t>6</a:t>
+              <a:t>7</a:t>
             </a:fld>
             <a:endParaRPr lang="en-US"/>
           </a:p>
@@ -2521,7 +2627,7 @@
           <a:p>
             <a:fld id="{54E672D7-8E2D-4611-973D-F4591A707C34}" type="slidenum">
               <a:rPr lang="en-US" smtClean="0"/>
-              <a:t>7</a:t>
+              <a:t>8</a:t>
             </a:fld>
             <a:endParaRPr lang="en-US"/>
           </a:p>
@@ -2757,7 +2863,7 @@
           <a:p>
             <a:fld id="{54E672D7-8E2D-4611-973D-F4591A707C34}" type="slidenum">
               <a:rPr lang="en-US" smtClean="0"/>
-              <a:t>8</a:t>
+              <a:t>9</a:t>
             </a:fld>
             <a:endParaRPr lang="en-US"/>
           </a:p>
@@ -2844,7 +2950,7 @@
           <a:p>
             <a:fld id="{54E672D7-8E2D-4611-973D-F4591A707C34}" type="slidenum">
               <a:rPr lang="en-US" smtClean="0"/>
-              <a:t>9</a:t>
+              <a:t>10</a:t>
             </a:fld>
             <a:endParaRPr lang="en-US"/>
           </a:p>
@@ -2949,7 +3055,7 @@
           <a:p>
             <a:fld id="{54E672D7-8E2D-4611-973D-F4591A707C34}" type="slidenum">
               <a:rPr lang="en-US" smtClean="0"/>
-              <a:t>10</a:t>
+              <a:t>11</a:t>
             </a:fld>
             <a:endParaRPr lang="en-US"/>
           </a:p>
@@ -6845,7 +6951,7 @@
           <p:cNvPr id="2" name="Title 1">
             <a:extLst>
               <a:ext uri="{FF2B5EF4-FFF2-40B4-BE49-F238E27FC236}">
-                <a16:creationId xmlns:a16="http://schemas.microsoft.com/office/drawing/2014/main" id="{E542B024-8735-A0E3-7EDB-ED276763E02D}"/>
+                <a16:creationId xmlns:a16="http://schemas.microsoft.com/office/drawing/2014/main" id="{4B0C36B9-6C84-3FAA-9EB8-F4892CA417F6}"/>
               </a:ext>
             </a:extLst>
           </p:cNvPr>
@@ -6863,8 +6969,12 @@
           <a:p>
             <a:r>
               <a:rPr lang="en-US" dirty="0"/>
-              <a:t>Knowledge Management</a:t>
-            </a:r>
+              <a:t>Sometimes we just want “good enough”</a:t>
+            </a:r>
+            <a:br>
+              <a:rPr lang="en-US" dirty="0"/>
+            </a:br>
+            <a:endParaRPr lang="en-US" dirty="0"/>
           </a:p>
         </p:txBody>
       </p:sp>
@@ -6873,7 +6983,7 @@
           <p:cNvPr id="3" name="Content Placeholder 2">
             <a:extLst>
               <a:ext uri="{FF2B5EF4-FFF2-40B4-BE49-F238E27FC236}">
-                <a16:creationId xmlns:a16="http://schemas.microsoft.com/office/drawing/2014/main" id="{B23602B9-E02D-3978-3DB6-3540696C46F2}"/>
+                <a16:creationId xmlns:a16="http://schemas.microsoft.com/office/drawing/2014/main" id="{91CD74C3-5BD5-8A90-67BE-B26792277680}"/>
               </a:ext>
             </a:extLst>
           </p:cNvPr>
@@ -6891,114 +7001,57 @@
           <a:p>
             <a:r>
               <a:rPr lang="en-US" dirty="0"/>
-              <a:t>DIKUW is about knowledge management.</a:t>
-            </a:r>
-          </a:p>
-          <a:p>
-            <a:r>
-              <a:rPr lang="en-US" dirty="0"/>
-              <a:t>Performing scientific work including developing/maintaining scientific instruments can benefit from knowledge management.</a:t>
-            </a:r>
-          </a:p>
-          <a:p>
-            <a:r>
-              <a:rPr lang="en-US" dirty="0"/>
-              <a:t>We want to</a:t>
+              <a:t>Not every developer needs to be an expert in git</a:t>
+            </a:r>
+          </a:p>
+          <a:p>
+            <a:r>
+              <a:rPr lang="en-US" dirty="0"/>
+              <a:t>We want the people designing the rules of how we use and interact through git to have </a:t>
+            </a:r>
+            <a:r>
+              <a:rPr lang="en-US" b="1" dirty="0"/>
+              <a:t>understanding</a:t>
+            </a:r>
+            <a:r>
+              <a:rPr lang="en-US" dirty="0"/>
+              <a:t> so that collaborating in git requires minimal git </a:t>
+            </a:r>
+            <a:r>
+              <a:rPr lang="en-US" b="1" dirty="0"/>
+              <a:t>knowledge</a:t>
             </a:r>
           </a:p>
           <a:p>
             <a:pPr lvl="1"/>
             <a:r>
-              <a:rPr lang="en-US" b="1" dirty="0"/>
-              <a:t>Recognize</a:t>
-            </a:r>
-            <a:r>
-              <a:rPr lang="en-US" dirty="0"/>
-              <a:t> when we generate knowledge</a:t>
+              <a:rPr lang="en-US" dirty="0"/>
+              <a:t>This workflow should protect code so that we can’t do damage</a:t>
             </a:r>
           </a:p>
           <a:p>
             <a:pPr lvl="1"/>
             <a:r>
-              <a:rPr lang="en-US" b="1" dirty="0"/>
-              <a:t>Capture</a:t>
-            </a:r>
-            <a:r>
-              <a:rPr lang="en-US" dirty="0"/>
-              <a:t> and </a:t>
-            </a:r>
-            <a:r>
-              <a:rPr lang="en-US" b="1" dirty="0"/>
-              <a:t>preserve</a:t>
-            </a:r>
-            <a:r>
-              <a:rPr lang="en-US" dirty="0"/>
-              <a:t> that knowledge</a:t>
+              <a:rPr lang="en-US" dirty="0"/>
+              <a:t>Focus on the development/testing and not on git</a:t>
             </a:r>
           </a:p>
           <a:p>
             <a:pPr lvl="1"/>
             <a:r>
-              <a:rPr lang="en-US" b="1" dirty="0"/>
-              <a:t>Communicate</a:t>
-            </a:r>
-            <a:r>
-              <a:rPr lang="en-US" dirty="0"/>
-              <a:t> that knowledge</a:t>
-            </a:r>
-          </a:p>
-          <a:p>
-            <a:pPr marL="0" indent="0">
-              <a:buNone/>
-            </a:pPr>
+              <a:rPr lang="en-US" dirty="0"/>
+              <a:t>Lower barrier for newcomers</a:t>
+            </a:r>
+          </a:p>
+          <a:p>
             <a:endParaRPr lang="en-US" dirty="0"/>
-          </a:p>
-        </p:txBody>
-      </p:sp>
-      <p:sp>
-        <p:nvSpPr>
-          <p:cNvPr id="4" name="TextBox 3">
-            <a:extLst>
-              <a:ext uri="{FF2B5EF4-FFF2-40B4-BE49-F238E27FC236}">
-                <a16:creationId xmlns:a16="http://schemas.microsoft.com/office/drawing/2014/main" id="{1DF53030-262B-B41C-84EE-E79A5A5F4D5F}"/>
-              </a:ext>
-            </a:extLst>
-          </p:cNvPr>
-          <p:cNvSpPr txBox="1"/>
-          <p:nvPr/>
-        </p:nvSpPr>
-        <p:spPr>
-          <a:xfrm>
-            <a:off x="1437079" y="5085977"/>
-            <a:ext cx="9314666" cy="517065"/>
-          </a:xfrm>
-          <a:prstGeom prst="rect">
-            <a:avLst/>
-          </a:prstGeom>
-          <a:noFill/>
-        </p:spPr>
-        <p:txBody>
-          <a:bodyPr wrap="none" lIns="118872" tIns="91440" rIns="118872" bIns="91440" rtlCol="0" anchor="ctr" anchorCtr="0">
-            <a:spAutoFit/>
-          </a:bodyPr>
-          <a:lstStyle/>
-          <a:p>
-            <a:pPr algn="l">
-              <a:lnSpc>
-                <a:spcPct val="90000"/>
-              </a:lnSpc>
-            </a:pPr>
-            <a:r>
-              <a:rPr lang="en-US" sz="2400" dirty="0"/>
-              <a:t>Is knowledge communication only about communicating to others?</a:t>
-            </a:r>
           </a:p>
         </p:txBody>
       </p:sp>
     </p:spTree>
     <p:extLst>
       <p:ext uri="{BB962C8B-B14F-4D97-AF65-F5344CB8AC3E}">
-        <p14:creationId xmlns:p14="http://schemas.microsoft.com/office/powerpoint/2010/main" val="2964406316"/>
+        <p14:creationId xmlns:p14="http://schemas.microsoft.com/office/powerpoint/2010/main" val="2408602807"/>
       </p:ext>
     </p:extLst>
   </p:cSld>
@@ -7030,6 +7083,191 @@
           <p:cNvPr id="2" name="Title 1">
             <a:extLst>
               <a:ext uri="{FF2B5EF4-FFF2-40B4-BE49-F238E27FC236}">
+                <a16:creationId xmlns:a16="http://schemas.microsoft.com/office/drawing/2014/main" id="{E542B024-8735-A0E3-7EDB-ED276763E02D}"/>
+              </a:ext>
+            </a:extLst>
+          </p:cNvPr>
+          <p:cNvSpPr>
+            <a:spLocks noGrp="1"/>
+          </p:cNvSpPr>
+          <p:nvPr>
+            <p:ph type="title"/>
+          </p:nvPr>
+        </p:nvSpPr>
+        <p:spPr/>
+        <p:txBody>
+          <a:bodyPr/>
+          <a:lstStyle/>
+          <a:p>
+            <a:r>
+              <a:rPr lang="en-US" dirty="0"/>
+              <a:t>Knowledge Management</a:t>
+            </a:r>
+          </a:p>
+        </p:txBody>
+      </p:sp>
+      <p:sp>
+        <p:nvSpPr>
+          <p:cNvPr id="3" name="Content Placeholder 2">
+            <a:extLst>
+              <a:ext uri="{FF2B5EF4-FFF2-40B4-BE49-F238E27FC236}">
+                <a16:creationId xmlns:a16="http://schemas.microsoft.com/office/drawing/2014/main" id="{B23602B9-E02D-3978-3DB6-3540696C46F2}"/>
+              </a:ext>
+            </a:extLst>
+          </p:cNvPr>
+          <p:cNvSpPr>
+            <a:spLocks noGrp="1"/>
+          </p:cNvSpPr>
+          <p:nvPr>
+            <p:ph idx="1"/>
+          </p:nvPr>
+        </p:nvSpPr>
+        <p:spPr/>
+        <p:txBody>
+          <a:bodyPr/>
+          <a:lstStyle/>
+          <a:p>
+            <a:r>
+              <a:rPr lang="en-US" dirty="0"/>
+              <a:t>DIKUW is about knowledge management.</a:t>
+            </a:r>
+          </a:p>
+          <a:p>
+            <a:r>
+              <a:rPr lang="en-US" dirty="0"/>
+              <a:t>Performing scientific work including developing/maintaining scientific instruments can benefit from knowledge management.</a:t>
+            </a:r>
+          </a:p>
+          <a:p>
+            <a:r>
+              <a:rPr lang="en-US" dirty="0"/>
+              <a:t>We want to</a:t>
+            </a:r>
+          </a:p>
+          <a:p>
+            <a:pPr lvl="1"/>
+            <a:r>
+              <a:rPr lang="en-US" b="1" dirty="0"/>
+              <a:t>Recognize</a:t>
+            </a:r>
+            <a:r>
+              <a:rPr lang="en-US" dirty="0"/>
+              <a:t> when we generate knowledge</a:t>
+            </a:r>
+          </a:p>
+          <a:p>
+            <a:pPr lvl="1"/>
+            <a:r>
+              <a:rPr lang="en-US" b="1" dirty="0"/>
+              <a:t>Capture</a:t>
+            </a:r>
+            <a:r>
+              <a:rPr lang="en-US" dirty="0"/>
+              <a:t> and </a:t>
+            </a:r>
+            <a:r>
+              <a:rPr lang="en-US" b="1" dirty="0"/>
+              <a:t>preserve</a:t>
+            </a:r>
+            <a:r>
+              <a:rPr lang="en-US" dirty="0"/>
+              <a:t> that knowledge</a:t>
+            </a:r>
+          </a:p>
+          <a:p>
+            <a:pPr lvl="1"/>
+            <a:r>
+              <a:rPr lang="en-US" b="1" dirty="0"/>
+              <a:t>Communicate</a:t>
+            </a:r>
+            <a:r>
+              <a:rPr lang="en-US" dirty="0"/>
+              <a:t> that knowledge</a:t>
+            </a:r>
+          </a:p>
+          <a:p>
+            <a:pPr marL="0" indent="0">
+              <a:buNone/>
+            </a:pPr>
+            <a:endParaRPr lang="en-US" dirty="0"/>
+          </a:p>
+        </p:txBody>
+      </p:sp>
+      <p:sp>
+        <p:nvSpPr>
+          <p:cNvPr id="4" name="TextBox 3">
+            <a:extLst>
+              <a:ext uri="{FF2B5EF4-FFF2-40B4-BE49-F238E27FC236}">
+                <a16:creationId xmlns:a16="http://schemas.microsoft.com/office/drawing/2014/main" id="{1DF53030-262B-B41C-84EE-E79A5A5F4D5F}"/>
+              </a:ext>
+            </a:extLst>
+          </p:cNvPr>
+          <p:cNvSpPr txBox="1"/>
+          <p:nvPr/>
+        </p:nvSpPr>
+        <p:spPr>
+          <a:xfrm>
+            <a:off x="1437079" y="5085977"/>
+            <a:ext cx="9314666" cy="517065"/>
+          </a:xfrm>
+          <a:prstGeom prst="rect">
+            <a:avLst/>
+          </a:prstGeom>
+          <a:noFill/>
+        </p:spPr>
+        <p:txBody>
+          <a:bodyPr wrap="none" lIns="118872" tIns="91440" rIns="118872" bIns="91440" rtlCol="0" anchor="ctr" anchorCtr="0">
+            <a:spAutoFit/>
+          </a:bodyPr>
+          <a:lstStyle/>
+          <a:p>
+            <a:pPr algn="l">
+              <a:lnSpc>
+                <a:spcPct val="90000"/>
+              </a:lnSpc>
+            </a:pPr>
+            <a:r>
+              <a:rPr lang="en-US" sz="2400" dirty="0"/>
+              <a:t>Is knowledge communication only about communicating to others?</a:t>
+            </a:r>
+          </a:p>
+        </p:txBody>
+      </p:sp>
+    </p:spTree>
+    <p:extLst>
+      <p:ext uri="{BB962C8B-B14F-4D97-AF65-F5344CB8AC3E}">
+        <p14:creationId xmlns:p14="http://schemas.microsoft.com/office/powerpoint/2010/main" val="2964406316"/>
+      </p:ext>
+    </p:extLst>
+  </p:cSld>
+  <p:clrMapOvr>
+    <a:masterClrMapping/>
+  </p:clrMapOvr>
+</p:sld>
+</file>
+
+<file path=ppt/slides/slide12.xml><?xml version="1.0" encoding="utf-8"?>
+<p:sld xmlns:a="http://schemas.openxmlformats.org/drawingml/2006/main" xmlns:r="http://schemas.openxmlformats.org/officeDocument/2006/relationships" xmlns:p="http://schemas.openxmlformats.org/presentationml/2006/main">
+  <p:cSld>
+    <p:spTree>
+      <p:nvGrpSpPr>
+        <p:cNvPr id="1" name=""/>
+        <p:cNvGrpSpPr/>
+        <p:nvPr/>
+      </p:nvGrpSpPr>
+      <p:grpSpPr>
+        <a:xfrm>
+          <a:off x="0" y="0"/>
+          <a:ext cx="0" cy="0"/>
+          <a:chOff x="0" y="0"/>
+          <a:chExt cx="0" cy="0"/>
+        </a:xfrm>
+      </p:grpSpPr>
+      <p:sp>
+        <p:nvSpPr>
+          <p:cNvPr id="2" name="Title 1">
+            <a:extLst>
+              <a:ext uri="{FF2B5EF4-FFF2-40B4-BE49-F238E27FC236}">
                 <a16:creationId xmlns:a16="http://schemas.microsoft.com/office/drawing/2014/main" id="{96AE34BC-5E36-C205-FC77-0BE3BC6B219C}"/>
               </a:ext>
             </a:extLst>
@@ -7187,7 +7425,7 @@
 </p:sld>
 </file>
 
-<file path=ppt/slides/slide12.xml><?xml version="1.0" encoding="utf-8"?>
+<file path=ppt/slides/slide13.xml><?xml version="1.0" encoding="utf-8"?>
 <p:sld xmlns:a="http://schemas.openxmlformats.org/drawingml/2006/main" xmlns:r="http://schemas.openxmlformats.org/officeDocument/2006/relationships" xmlns:p="http://schemas.openxmlformats.org/presentationml/2006/main">
   <p:cSld>
     <p:spTree>
@@ -7553,199 +7791,6 @@
 </p:sld>
 </file>
 
-<file path=ppt/slides/slide13.xml><?xml version="1.0" encoding="utf-8"?>
-<p:sld xmlns:a="http://schemas.openxmlformats.org/drawingml/2006/main" xmlns:r="http://schemas.openxmlformats.org/officeDocument/2006/relationships" xmlns:p="http://schemas.openxmlformats.org/presentationml/2006/main">
-  <p:cSld>
-    <p:spTree>
-      <p:nvGrpSpPr>
-        <p:cNvPr id="1" name=""/>
-        <p:cNvGrpSpPr/>
-        <p:nvPr/>
-      </p:nvGrpSpPr>
-      <p:grpSpPr>
-        <a:xfrm>
-          <a:off x="0" y="0"/>
-          <a:ext cx="0" cy="0"/>
-          <a:chOff x="0" y="0"/>
-          <a:chExt cx="0" cy="0"/>
-        </a:xfrm>
-      </p:grpSpPr>
-      <p:sp>
-        <p:nvSpPr>
-          <p:cNvPr id="2" name="Title 1">
-            <a:extLst>
-              <a:ext uri="{FF2B5EF4-FFF2-40B4-BE49-F238E27FC236}">
-                <a16:creationId xmlns:a16="http://schemas.microsoft.com/office/drawing/2014/main" id="{9CDA5DAC-D638-AA10-5E70-A77E5B69D79E}"/>
-              </a:ext>
-            </a:extLst>
-          </p:cNvPr>
-          <p:cNvSpPr>
-            <a:spLocks noGrp="1"/>
-          </p:cNvSpPr>
-          <p:nvPr>
-            <p:ph type="title"/>
-          </p:nvPr>
-        </p:nvSpPr>
-        <p:spPr/>
-        <p:txBody>
-          <a:bodyPr/>
-          <a:lstStyle/>
-          <a:p>
-            <a:r>
-              <a:rPr lang="en-US" dirty="0"/>
-              <a:t>And finally we reach our destination</a:t>
-            </a:r>
-          </a:p>
-        </p:txBody>
-      </p:sp>
-      <p:sp>
-        <p:nvSpPr>
-          <p:cNvPr id="3" name="Content Placeholder 2">
-            <a:extLst>
-              <a:ext uri="{FF2B5EF4-FFF2-40B4-BE49-F238E27FC236}">
-                <a16:creationId xmlns:a16="http://schemas.microsoft.com/office/drawing/2014/main" id="{5BE9B2DA-E858-1EB6-45DC-E8398F9475E3}"/>
-              </a:ext>
-            </a:extLst>
-          </p:cNvPr>
-          <p:cNvSpPr>
-            <a:spLocks noGrp="1"/>
-          </p:cNvSpPr>
-          <p:nvPr>
-            <p:ph idx="1"/>
-          </p:nvPr>
-        </p:nvSpPr>
-        <p:spPr>
-          <a:xfrm>
-            <a:off x="744239" y="3575491"/>
-            <a:ext cx="10700346" cy="2358779"/>
-          </a:xfrm>
-        </p:spPr>
-        <p:txBody>
-          <a:bodyPr/>
-          <a:lstStyle/>
-          <a:p>
-            <a:pPr marL="0" indent="0">
-              <a:buNone/>
-            </a:pPr>
-            <a:r>
-              <a:rPr lang="en-US" dirty="0"/>
-              <a:t>"...to write with enough detail and clarity that another scientist could pick up the notebook at some time in the future, repeat the work based on the written descriptions, and make the same observations that were originally recorded. If this guideline is followed, even the original author will be able to understand the notes when looking back on them after considerable time has passed!”</a:t>
-            </a:r>
-          </a:p>
-          <a:p>
-            <a:pPr marL="0" indent="0">
-              <a:buNone/>
-            </a:pPr>
-            <a:r>
-              <a:rPr lang="en-US" dirty="0"/>
-              <a:t>	- Howard </a:t>
-            </a:r>
-            <a:r>
-              <a:rPr lang="en-US" dirty="0" err="1"/>
-              <a:t>Kanare</a:t>
-            </a:r>
-            <a:r>
-              <a:rPr lang="en-US" dirty="0"/>
-              <a:t>, “</a:t>
-            </a:r>
-            <a:r>
-              <a:rPr lang="en-US" i="1" dirty="0"/>
-              <a:t>Writing the Laboratory Notebook</a:t>
-            </a:r>
-            <a:r>
-              <a:rPr lang="en-US" dirty="0"/>
-              <a:t>”, 1985</a:t>
-            </a:r>
-          </a:p>
-        </p:txBody>
-      </p:sp>
-      <p:sp>
-        <p:nvSpPr>
-          <p:cNvPr id="4" name="Rectangle 3">
-            <a:extLst>
-              <a:ext uri="{FF2B5EF4-FFF2-40B4-BE49-F238E27FC236}">
-                <a16:creationId xmlns:a16="http://schemas.microsoft.com/office/drawing/2014/main" id="{ABF114B4-557E-6985-4AE3-A655B0543BBC}"/>
-              </a:ext>
-            </a:extLst>
-          </p:cNvPr>
-          <p:cNvSpPr/>
-          <p:nvPr/>
-        </p:nvSpPr>
-        <p:spPr>
-          <a:xfrm>
-            <a:off x="365760" y="1308152"/>
-            <a:ext cx="10536470" cy="1631216"/>
-          </a:xfrm>
-          <a:prstGeom prst="rect">
-            <a:avLst/>
-          </a:prstGeom>
-        </p:spPr>
-        <p:txBody>
-          <a:bodyPr wrap="square">
-            <a:spAutoFit/>
-          </a:bodyPr>
-          <a:lstStyle/>
-          <a:p>
-            <a:r>
-              <a:rPr lang="en-US" sz="2000" dirty="0"/>
-              <a:t>Lab notebooks are</a:t>
-            </a:r>
-          </a:p>
-          <a:p>
-            <a:pPr marL="285750" indent="-285750">
-              <a:buFont typeface="Arial" panose="020B0604020202020204" pitchFamily="34" charset="0"/>
-              <a:buChar char="•"/>
-            </a:pPr>
-            <a:r>
-              <a:rPr lang="en-US" sz="2000" dirty="0"/>
-              <a:t>a fundamental part of communication as well as rigorous, reproducible science in a lab,</a:t>
-            </a:r>
-          </a:p>
-          <a:p>
-            <a:pPr marL="285750" indent="-285750">
-              <a:buFont typeface="Arial" panose="020B0604020202020204" pitchFamily="34" charset="0"/>
-              <a:buChar char="•"/>
-            </a:pPr>
-            <a:r>
-              <a:rPr lang="en-US" sz="2000" dirty="0"/>
-              <a:t>a tool for preventing scientific fraud and for defending against allegations of fraud,</a:t>
-            </a:r>
-          </a:p>
-          <a:p>
-            <a:pPr marL="285750" indent="-285750">
-              <a:buFont typeface="Arial" panose="020B0604020202020204" pitchFamily="34" charset="0"/>
-              <a:buChar char="•"/>
-            </a:pPr>
-            <a:r>
-              <a:rPr lang="en-US" sz="2000" dirty="0"/>
-              <a:t>a common-place or required part of an experimental laboratory, and</a:t>
-            </a:r>
-          </a:p>
-          <a:p>
-            <a:pPr marL="285750" indent="-285750">
-              <a:buFont typeface="Arial" panose="020B0604020202020204" pitchFamily="34" charset="0"/>
-              <a:buChar char="•"/>
-            </a:pPr>
-            <a:r>
-              <a:rPr lang="en-US" sz="2000" dirty="0"/>
-              <a:t>Populating a scientific “lab notebook” was an “automated” process at the observatory.</a:t>
-            </a:r>
-          </a:p>
-        </p:txBody>
-      </p:sp>
-    </p:spTree>
-    <p:extLst>
-      <p:ext uri="{BB962C8B-B14F-4D97-AF65-F5344CB8AC3E}">
-        <p14:creationId xmlns:p14="http://schemas.microsoft.com/office/powerpoint/2010/main" val="1526375668"/>
-      </p:ext>
-    </p:extLst>
-  </p:cSld>
-  <p:clrMapOvr>
-    <a:masterClrMapping/>
-  </p:clrMapOvr>
-</p:sld>
-</file>
-
 <file path=ppt/slides/slide14.xml><?xml version="1.0" encoding="utf-8"?>
 <p:sld xmlns:a="http://schemas.openxmlformats.org/drawingml/2006/main" xmlns:r="http://schemas.openxmlformats.org/officeDocument/2006/relationships" xmlns:p="http://schemas.openxmlformats.org/presentationml/2006/main">
   <p:cSld>
@@ -7768,7 +7813,7 @@
           <p:cNvPr id="2" name="Title 1">
             <a:extLst>
               <a:ext uri="{FF2B5EF4-FFF2-40B4-BE49-F238E27FC236}">
-                <a16:creationId xmlns:a16="http://schemas.microsoft.com/office/drawing/2014/main" id="{D91B3A35-D31B-5202-5327-3F2E4D74433D}"/>
+                <a16:creationId xmlns:a16="http://schemas.microsoft.com/office/drawing/2014/main" id="{9CDA5DAC-D638-AA10-5E70-A77E5B69D79E}"/>
               </a:ext>
             </a:extLst>
           </p:cNvPr>
@@ -7786,104 +7831,152 @@
           <a:p>
             <a:r>
               <a:rPr lang="en-US" dirty="0"/>
-              <a:t>Lab notebooks in the hierarchy</a:t>
-            </a:r>
-          </a:p>
-        </p:txBody>
-      </p:sp>
-      <p:sp>
-        <p:nvSpPr>
-          <p:cNvPr id="3" name="Content Placeholder 2">
+              <a:t>And finally we reach our destination</a:t>
+            </a:r>
+          </a:p>
+        </p:txBody>
+      </p:sp>
+      <p:sp>
+        <p:nvSpPr>
+          <p:cNvPr id="4" name="Rectangle 3">
             <a:extLst>
               <a:ext uri="{FF2B5EF4-FFF2-40B4-BE49-F238E27FC236}">
-                <a16:creationId xmlns:a16="http://schemas.microsoft.com/office/drawing/2014/main" id="{2E4B68F5-6213-73EF-47E8-D46F30CA4597}"/>
+                <a16:creationId xmlns:a16="http://schemas.microsoft.com/office/drawing/2014/main" id="{ABF114B4-557E-6985-4AE3-A655B0543BBC}"/>
               </a:ext>
             </a:extLst>
           </p:cNvPr>
-          <p:cNvSpPr>
-            <a:spLocks noGrp="1"/>
-          </p:cNvSpPr>
-          <p:nvPr>
-            <p:ph idx="1"/>
-          </p:nvPr>
+          <p:cNvSpPr/>
+          <p:nvPr/>
         </p:nvSpPr>
         <p:spPr>
           <a:xfrm>
-            <a:off x="365760" y="1242835"/>
-            <a:ext cx="11369809" cy="4047778"/>
-          </a:xfrm>
-        </p:spPr>
-        <p:txBody>
-          <a:bodyPr/>
-          <a:lstStyle/>
-          <a:p>
-            <a:pPr marL="0" indent="0">
-              <a:buNone/>
-            </a:pPr>
-            <a:r>
-              <a:rPr lang="en-US" dirty="0"/>
-              <a:t>Lab notebooks</a:t>
-            </a:r>
-          </a:p>
-          <a:p>
-            <a:r>
-              <a:rPr lang="en-US" dirty="0"/>
-              <a:t>Should be used regularly,</a:t>
-            </a:r>
-          </a:p>
-          <a:p>
-            <a:r>
-              <a:rPr lang="en-US" dirty="0"/>
-              <a:t>Should be comprehensive and never filtered,</a:t>
-            </a:r>
-          </a:p>
-          <a:p>
-            <a:r>
-              <a:rPr lang="en-US" dirty="0"/>
-              <a:t>Don’t need perfect grammar and full sentences,</a:t>
-            </a:r>
-          </a:p>
-          <a:p>
-            <a:r>
-              <a:rPr lang="en-US" dirty="0"/>
-              <a:t>Content is frozen at creation, and</a:t>
-            </a:r>
-          </a:p>
-          <a:p>
-            <a:r>
-              <a:rPr lang="en-US" dirty="0"/>
-              <a:t>Hopefully contains more than just data (e.g., motivation, reasoning, conclusions).</a:t>
-            </a:r>
-          </a:p>
-        </p:txBody>
-      </p:sp>
-      <p:sp>
-        <p:nvSpPr>
-          <p:cNvPr id="4" name="TextBox 3">
-            <a:extLst>
-              <a:ext uri="{FF2B5EF4-FFF2-40B4-BE49-F238E27FC236}">
-                <a16:creationId xmlns:a16="http://schemas.microsoft.com/office/drawing/2014/main" id="{78DBDA0F-751C-1E3D-AABD-B45E1F71804C}"/>
-              </a:ext>
-            </a:extLst>
-          </p:cNvPr>
-          <p:cNvSpPr txBox="1"/>
-          <p:nvPr/>
-        </p:nvSpPr>
-        <p:spPr>
-          <a:xfrm>
-            <a:off x="1007808" y="4765702"/>
-            <a:ext cx="10085711" cy="849463"/>
+            <a:off x="365760" y="1102412"/>
+            <a:ext cx="10536470" cy="4955203"/>
           </a:xfrm>
           <a:prstGeom prst="rect">
             <a:avLst/>
           </a:prstGeom>
-          <a:noFill/>
         </p:spPr>
         <p:txBody>
-          <a:bodyPr wrap="none" lIns="118872" tIns="91440" rIns="118872" bIns="91440" rtlCol="0" anchor="ctr" anchorCtr="0">
+          <a:bodyPr wrap="square">
             <a:spAutoFit/>
           </a:bodyPr>
           <a:lstStyle/>
+          <a:p>
+            <a:r>
+              <a:rPr lang="en-US" sz="2000" dirty="0"/>
+              <a:t>Lab notebooks are</a:t>
+            </a:r>
+          </a:p>
+          <a:p>
+            <a:pPr marL="285750" indent="-285750">
+              <a:buFont typeface="Arial" panose="020B0604020202020204" pitchFamily="34" charset="0"/>
+              <a:buChar char="•"/>
+            </a:pPr>
+            <a:r>
+              <a:rPr lang="en-US" sz="2000" dirty="0"/>
+              <a:t>a fundamental part of communication as well as rigorous, reproducible science in a lab,</a:t>
+            </a:r>
+          </a:p>
+          <a:p>
+            <a:pPr marL="285750" indent="-285750">
+              <a:buFont typeface="Arial" panose="020B0604020202020204" pitchFamily="34" charset="0"/>
+              <a:buChar char="•"/>
+            </a:pPr>
+            <a:r>
+              <a:rPr lang="en-US" sz="2000" dirty="0"/>
+              <a:t>a common-place or required part of an experimental laboratory,</a:t>
+            </a:r>
+          </a:p>
+          <a:p>
+            <a:pPr marL="285750" indent="-285750">
+              <a:buFont typeface="Arial" panose="020B0604020202020204" pitchFamily="34" charset="0"/>
+              <a:buChar char="•"/>
+            </a:pPr>
+            <a:r>
+              <a:rPr lang="en-US" sz="2000" dirty="0"/>
+              <a:t>populating a scientific “lab notebook” was an “automated” process at the observatory, and</a:t>
+            </a:r>
+          </a:p>
+          <a:p>
+            <a:pPr marL="285750" indent="-285750">
+              <a:buFont typeface="Arial" panose="020B0604020202020204" pitchFamily="34" charset="0"/>
+              <a:buChar char="•"/>
+            </a:pPr>
+            <a:r>
+              <a:rPr lang="en-US" sz="2000" dirty="0"/>
+              <a:t>a tool for preventing scientific fraud and for defending against allegations of fraud.</a:t>
+            </a:r>
+          </a:p>
+          <a:p>
+            <a:endParaRPr lang="en-US" sz="2000" dirty="0"/>
+          </a:p>
+          <a:p>
+            <a:pPr marL="0" indent="0">
+              <a:buNone/>
+            </a:pPr>
+            <a:r>
+              <a:rPr lang="en-US" sz="2000" dirty="0"/>
+              <a:t>Lab notebooks</a:t>
+            </a:r>
+          </a:p>
+          <a:p>
+            <a:pPr marL="342900" indent="-342900">
+              <a:buFont typeface="Arial" panose="020B0604020202020204" pitchFamily="34" charset="0"/>
+              <a:buChar char="•"/>
+            </a:pPr>
+            <a:r>
+              <a:rPr lang="en-US" sz="2000" dirty="0"/>
+              <a:t>Should be used regularly,</a:t>
+            </a:r>
+          </a:p>
+          <a:p>
+            <a:pPr marL="342900" indent="-342900">
+              <a:buFont typeface="Arial" panose="020B0604020202020204" pitchFamily="34" charset="0"/>
+              <a:buChar char="•"/>
+            </a:pPr>
+            <a:r>
+              <a:rPr lang="en-US" sz="2000" dirty="0"/>
+              <a:t>Should be comprehensive and never filtered,</a:t>
+            </a:r>
+          </a:p>
+          <a:p>
+            <a:pPr marL="342900" indent="-342900">
+              <a:buFont typeface="Arial" panose="020B0604020202020204" pitchFamily="34" charset="0"/>
+              <a:buChar char="•"/>
+            </a:pPr>
+            <a:r>
+              <a:rPr lang="en-US" sz="2000" dirty="0"/>
+              <a:t>Don’t need perfect grammar and full sentences,</a:t>
+            </a:r>
+          </a:p>
+          <a:p>
+            <a:pPr marL="342900" indent="-342900">
+              <a:buFont typeface="Arial" panose="020B0604020202020204" pitchFamily="34" charset="0"/>
+              <a:buChar char="•"/>
+            </a:pPr>
+            <a:r>
+              <a:rPr lang="en-US" sz="2000" dirty="0"/>
+              <a:t>Content is frozen at creation, and</a:t>
+            </a:r>
+          </a:p>
+          <a:p>
+            <a:pPr marL="342900" indent="-342900">
+              <a:buFont typeface="Arial" panose="020B0604020202020204" pitchFamily="34" charset="0"/>
+              <a:buChar char="•"/>
+            </a:pPr>
+            <a:r>
+              <a:rPr lang="en-US" sz="2000" dirty="0"/>
+              <a:t>Hopefully contains more than just data (e.g., motivation, reasoning, conclusions).</a:t>
+            </a:r>
+          </a:p>
+          <a:p>
+            <a:pPr marL="342900" indent="-342900">
+              <a:buFont typeface="Arial" panose="020B0604020202020204" pitchFamily="34" charset="0"/>
+              <a:buChar char="•"/>
+            </a:pPr>
+            <a:endParaRPr lang="en-US" sz="2000" dirty="0"/>
+          </a:p>
           <a:p>
             <a:pPr algn="ctr">
               <a:lnSpc>
@@ -7891,11 +7984,11 @@
               </a:lnSpc>
             </a:pPr>
             <a:r>
-              <a:rPr lang="en-US" sz="2400" dirty="0"/>
+              <a:rPr lang="en-US" sz="2000" dirty="0"/>
               <a:t>They aren’t good at communicating knowledge, </a:t>
             </a:r>
             <a:r>
-              <a:rPr lang="en-US" sz="2400" b="1" dirty="0"/>
+              <a:rPr lang="en-US" sz="2000" b="1" dirty="0"/>
               <a:t>but</a:t>
             </a:r>
           </a:p>
@@ -7906,16 +7999,19 @@
               </a:lnSpc>
             </a:pPr>
             <a:r>
-              <a:rPr lang="en-US" sz="2400" dirty="0"/>
+              <a:rPr lang="en-US" sz="2000" dirty="0"/>
               <a:t>people interact, evolve, and grow by collaborating through the notebook.</a:t>
             </a:r>
+          </a:p>
+          <a:p>
+            <a:endParaRPr lang="en-US" sz="2000" dirty="0"/>
           </a:p>
         </p:txBody>
       </p:sp>
     </p:spTree>
     <p:extLst>
       <p:ext uri="{BB962C8B-B14F-4D97-AF65-F5344CB8AC3E}">
-        <p14:creationId xmlns:p14="http://schemas.microsoft.com/office/powerpoint/2010/main" val="3444215669"/>
+        <p14:creationId xmlns:p14="http://schemas.microsoft.com/office/powerpoint/2010/main" val="1526375668"/>
       </p:ext>
     </p:extLst>
   </p:cSld>
@@ -7972,32 +8068,399 @@
       </p:sp>
       <p:sp>
         <p:nvSpPr>
-          <p:cNvPr id="3" name="Content Placeholder 2">
+          <p:cNvPr id="8" name="TextBox 7">
             <a:extLst>
               <a:ext uri="{FF2B5EF4-FFF2-40B4-BE49-F238E27FC236}">
-                <a16:creationId xmlns:a16="http://schemas.microsoft.com/office/drawing/2014/main" id="{FD2BB90A-5F89-FD52-A0CA-88B6C58DE3A3}"/>
+                <a16:creationId xmlns:a16="http://schemas.microsoft.com/office/drawing/2014/main" id="{42B00271-B090-7E98-2613-C5ACE15A4551}"/>
               </a:ext>
             </a:extLst>
           </p:cNvPr>
-          <p:cNvSpPr>
-            <a:spLocks noGrp="1"/>
-          </p:cNvSpPr>
-          <p:nvPr>
-            <p:ph idx="1"/>
-          </p:nvPr>
-        </p:nvSpPr>
-        <p:spPr/>
-        <p:txBody>
-          <a:bodyPr/>
+          <p:cNvSpPr txBox="1"/>
+          <p:nvPr/>
+        </p:nvSpPr>
+        <p:spPr>
+          <a:xfrm>
+            <a:off x="365760" y="2206618"/>
+            <a:ext cx="4955011" cy="1929759"/>
+          </a:xfrm>
+          <a:prstGeom prst="rect">
+            <a:avLst/>
+          </a:prstGeom>
+          <a:noFill/>
+        </p:spPr>
+        <p:txBody>
+          <a:bodyPr wrap="none" lIns="118872" tIns="91440" rIns="118872" bIns="91440" rtlCol="0" anchor="ctr" anchorCtr="0">
+            <a:spAutoFit/>
+          </a:bodyPr>
           <a:lstStyle/>
           <a:p>
+            <a:pPr algn="l">
+              <a:lnSpc>
+                <a:spcPct val="90000"/>
+              </a:lnSpc>
+            </a:pPr>
+            <a:r>
+              <a:rPr lang="en-US" dirty="0"/>
+              <a:t>A bad example</a:t>
+            </a:r>
+          </a:p>
+          <a:p>
+            <a:pPr algn="l">
+              <a:lnSpc>
+                <a:spcPct val="90000"/>
+              </a:lnSpc>
+            </a:pPr>
+            <a:endParaRPr lang="en-US" dirty="0"/>
+          </a:p>
+          <a:p>
+            <a:pPr algn="l">
+              <a:lnSpc>
+                <a:spcPct val="90000"/>
+              </a:lnSpc>
+            </a:pPr>
+            <a:r>
+              <a:rPr lang="en-US" b="1" u="sng" dirty="0"/>
+              <a:t>Monday July 25, 2022</a:t>
+            </a:r>
+          </a:p>
+          <a:p>
+            <a:pPr algn="l">
+              <a:lnSpc>
+                <a:spcPct val="90000"/>
+              </a:lnSpc>
+            </a:pPr>
+            <a:r>
+              <a:rPr lang="en-US" dirty="0"/>
+              <a:t>9:05 am - Need to identify and resolve bug.</a:t>
+            </a:r>
+          </a:p>
+          <a:p>
+            <a:pPr algn="l">
+              <a:lnSpc>
+                <a:spcPct val="90000"/>
+              </a:lnSpc>
+            </a:pPr>
+            <a:r>
+              <a:rPr lang="en-US" dirty="0"/>
+              <a:t>8:47 pm - Solved it!  Problem was with library.</a:t>
+            </a:r>
+          </a:p>
+          <a:p>
+            <a:pPr algn="l">
+              <a:lnSpc>
+                <a:spcPct val="90000"/>
+              </a:lnSpc>
+            </a:pPr>
+            <a:r>
+              <a:rPr lang="en-US" dirty="0"/>
+              <a:t>              - All tests passing again.</a:t>
+            </a:r>
+          </a:p>
+          <a:p>
+            <a:pPr algn="l">
+              <a:lnSpc>
+                <a:spcPct val="90000"/>
+              </a:lnSpc>
+            </a:pPr>
+            <a:endParaRPr lang="en-US" dirty="0"/>
+          </a:p>
+        </p:txBody>
+      </p:sp>
+      <p:sp>
+        <p:nvSpPr>
+          <p:cNvPr id="9" name="TextBox 8">
+            <a:extLst>
+              <a:ext uri="{FF2B5EF4-FFF2-40B4-BE49-F238E27FC236}">
+                <a16:creationId xmlns:a16="http://schemas.microsoft.com/office/drawing/2014/main" id="{EA4853CD-8614-95AA-C341-E49641DA6302}"/>
+              </a:ext>
+            </a:extLst>
+          </p:cNvPr>
+          <p:cNvSpPr txBox="1"/>
+          <p:nvPr/>
+        </p:nvSpPr>
+        <p:spPr>
+          <a:xfrm>
+            <a:off x="5935980" y="283536"/>
+            <a:ext cx="5887085" cy="5669244"/>
+          </a:xfrm>
+          <a:prstGeom prst="rect">
+            <a:avLst/>
+          </a:prstGeom>
+          <a:noFill/>
+        </p:spPr>
+        <p:txBody>
+          <a:bodyPr wrap="square" lIns="118872" tIns="91440" rIns="118872" bIns="91440" rtlCol="0" anchor="ctr" anchorCtr="0">
+            <a:spAutoFit/>
+          </a:bodyPr>
+          <a:lstStyle/>
+          <a:p>
+            <a:pPr algn="l">
+              <a:lnSpc>
+                <a:spcPct val="90000"/>
+              </a:lnSpc>
+            </a:pPr>
+            <a:r>
+              <a:rPr lang="en-US" dirty="0"/>
+              <a:t>A better example</a:t>
+            </a:r>
+          </a:p>
+          <a:p>
+            <a:pPr algn="l">
+              <a:lnSpc>
+                <a:spcPct val="90000"/>
+              </a:lnSpc>
+            </a:pPr>
+            <a:endParaRPr lang="en-US" b="1" u="sng" dirty="0"/>
+          </a:p>
+          <a:p>
+            <a:pPr algn="l">
+              <a:lnSpc>
+                <a:spcPct val="90000"/>
+              </a:lnSpc>
+            </a:pPr>
+            <a:r>
+              <a:rPr lang="en-US" b="1" u="sng" dirty="0"/>
+              <a:t>Monday July 25, 2022</a:t>
+            </a:r>
+          </a:p>
+          <a:p>
+            <a:pPr algn="l">
+              <a:lnSpc>
+                <a:spcPct val="90000"/>
+              </a:lnSpc>
+            </a:pPr>
+            <a:r>
+              <a:rPr lang="en-US" b="1" dirty="0"/>
+              <a:t>9:05 am </a:t>
+            </a:r>
+            <a:r>
+              <a:rPr lang="en-US" dirty="0"/>
+              <a:t>- Continuing work for study ABC.  (See July 7)</a:t>
+            </a:r>
+          </a:p>
+          <a:p>
+            <a:pPr algn="l">
+              <a:lnSpc>
+                <a:spcPct val="90000"/>
+              </a:lnSpc>
+            </a:pPr>
+            <a:r>
+              <a:rPr lang="en-US" dirty="0"/>
+              <a:t>- I presently believe that if A happens, then B must also happen.</a:t>
+            </a:r>
+          </a:p>
+          <a:p>
+            <a:pPr algn="l">
+              <a:lnSpc>
+                <a:spcPct val="90000"/>
+              </a:lnSpc>
+            </a:pPr>
+            <a:r>
+              <a:rPr lang="en-US" dirty="0"/>
+              <a:t>- To verify this, I intend to</a:t>
+            </a:r>
+          </a:p>
+          <a:p>
+            <a:pPr marL="742950" lvl="1" indent="-285750">
+              <a:lnSpc>
+                <a:spcPct val="90000"/>
+              </a:lnSpc>
+              <a:buFont typeface="Arial" panose="020B0604020202020204" pitchFamily="34" charset="0"/>
+              <a:buChar char="•"/>
+            </a:pPr>
+            <a:r>
+              <a:rPr lang="en-US" dirty="0"/>
+              <a:t>…</a:t>
+            </a:r>
+          </a:p>
+          <a:p>
+            <a:pPr marL="742950" lvl="1" indent="-285750">
+              <a:lnSpc>
+                <a:spcPct val="90000"/>
+              </a:lnSpc>
+              <a:buFont typeface="Arial" panose="020B0604020202020204" pitchFamily="34" charset="0"/>
+              <a:buChar char="•"/>
+            </a:pPr>
+            <a:r>
+              <a:rPr lang="en-US" dirty="0"/>
+              <a:t>***</a:t>
+            </a:r>
+          </a:p>
+          <a:p>
+            <a:pPr>
+              <a:lnSpc>
+                <a:spcPct val="90000"/>
+              </a:lnSpc>
+            </a:pPr>
+            <a:r>
+              <a:rPr lang="en-US" b="1" dirty="0"/>
+              <a:t>9:30 am </a:t>
+            </a:r>
+            <a:r>
+              <a:rPr lang="en-US" dirty="0"/>
+              <a:t>- Started executing this experiment on Bebop.</a:t>
+            </a:r>
+          </a:p>
+          <a:p>
+            <a:pPr marL="742950" lvl="1" indent="-285750">
+              <a:lnSpc>
+                <a:spcPct val="90000"/>
+              </a:lnSpc>
+              <a:buFont typeface="Arial" panose="020B0604020202020204" pitchFamily="34" charset="0"/>
+              <a:buChar char="•"/>
+            </a:pPr>
+            <a:r>
+              <a:rPr lang="en-US" dirty="0"/>
+              <a:t>Built debug version of binary with Intel 20.4</a:t>
+            </a:r>
+          </a:p>
+          <a:p>
+            <a:pPr marL="742950" lvl="1" indent="-285750">
+              <a:lnSpc>
+                <a:spcPct val="90000"/>
+              </a:lnSpc>
+              <a:buFont typeface="Arial" panose="020B0604020202020204" pitchFamily="34" charset="0"/>
+              <a:buChar char="•"/>
+            </a:pPr>
+            <a:r>
+              <a:rPr lang="en-US" dirty="0"/>
+              <a:t>Based on </a:t>
+            </a:r>
+            <a:r>
+              <a:rPr lang="en-US" u="sng" dirty="0"/>
+              <a:t>clean</a:t>
+            </a:r>
+            <a:r>
+              <a:rPr lang="en-US" dirty="0"/>
+              <a:t> commit 5a43b21c</a:t>
+            </a:r>
+          </a:p>
+          <a:p>
+            <a:pPr marL="742950" lvl="1" indent="-285750">
+              <a:lnSpc>
+                <a:spcPct val="90000"/>
+              </a:lnSpc>
+              <a:buFont typeface="Arial" panose="020B0604020202020204" pitchFamily="34" charset="0"/>
+              <a:buChar char="•"/>
+            </a:pPr>
+            <a:r>
+              <a:rPr lang="en-US" dirty="0"/>
+              <a:t>Build log saved to </a:t>
+            </a:r>
             <a:r>
               <a:rPr lang="en-US" dirty="0">
-                <a:solidFill>
-                  <a:srgbClr val="FF0000"/>
-                </a:solidFill>
+                <a:latin typeface="American Typewriter" panose="02090604020004020304" pitchFamily="18" charset="77"/>
               </a:rPr>
-              <a:t>TODO: Add in bad and good examples.</a:t>
+              <a:t>my_test_2022.log</a:t>
+            </a:r>
+          </a:p>
+          <a:p>
+            <a:pPr marL="742950" lvl="1" indent="-285750">
+              <a:lnSpc>
+                <a:spcPct val="90000"/>
+              </a:lnSpc>
+              <a:buFont typeface="Arial" panose="020B0604020202020204" pitchFamily="34" charset="0"/>
+              <a:buChar char="•"/>
+            </a:pPr>
+            <a:r>
+              <a:rPr lang="en-US" dirty="0"/>
+              <a:t>No errors or warnings emitted</a:t>
+            </a:r>
+          </a:p>
+          <a:p>
+            <a:pPr marL="742950" lvl="1" indent="-285750">
+              <a:lnSpc>
+                <a:spcPct val="90000"/>
+              </a:lnSpc>
+              <a:buFont typeface="Arial" panose="020B0604020202020204" pitchFamily="34" charset="0"/>
+              <a:buChar char="•"/>
+            </a:pPr>
+            <a:r>
+              <a:rPr lang="en-US" dirty="0"/>
+              <a:t>Used job script </a:t>
+            </a:r>
+            <a:r>
+              <a:rPr lang="en-US" dirty="0" err="1">
+                <a:latin typeface="American Typewriter" panose="02090604020004020304" pitchFamily="18" charset="77"/>
+              </a:rPr>
+              <a:t>run_my_test</a:t>
+            </a:r>
+            <a:r>
+              <a:rPr lang="en-US" dirty="0">
+                <a:latin typeface="American Typewriter" panose="02090604020004020304" pitchFamily="18" charset="77"/>
+              </a:rPr>
+              <a:t> </a:t>
+            </a:r>
+            <a:r>
+              <a:rPr lang="en-US" dirty="0"/>
+              <a:t>with configuration 24 (Job ID 123456)</a:t>
+            </a:r>
+          </a:p>
+          <a:p>
+            <a:pPr marL="742950" lvl="1" indent="-285750">
+              <a:lnSpc>
+                <a:spcPct val="90000"/>
+              </a:lnSpc>
+              <a:buFont typeface="Arial" panose="020B0604020202020204" pitchFamily="34" charset="0"/>
+              <a:buChar char="•"/>
+            </a:pPr>
+            <a:r>
+              <a:rPr lang="en-US" dirty="0" err="1"/>
+              <a:t>Stdout</a:t>
+            </a:r>
+            <a:r>
+              <a:rPr lang="en-US" dirty="0"/>
+              <a:t>/err &amp; results saved in folder ABC</a:t>
+            </a:r>
+          </a:p>
+          <a:p>
+            <a:pPr>
+              <a:lnSpc>
+                <a:spcPct val="90000"/>
+              </a:lnSpc>
+            </a:pPr>
+            <a:r>
+              <a:rPr lang="en-US" b="1" dirty="0"/>
+              <a:t>10:07 am </a:t>
+            </a:r>
+            <a:r>
+              <a:rPr lang="en-US" dirty="0"/>
+              <a:t>- Analysis run with script </a:t>
+            </a:r>
+            <a:r>
+              <a:rPr lang="en-US" dirty="0" err="1">
+                <a:latin typeface="American Typewriter" panose="02090604020004020304" pitchFamily="18" charset="77"/>
+              </a:rPr>
+              <a:t>analyze_my_test.py</a:t>
+            </a:r>
+            <a:r>
+              <a:rPr lang="en-US" dirty="0">
+                <a:latin typeface="American Typewriter" panose="02090604020004020304" pitchFamily="18" charset="77"/>
+              </a:rPr>
+              <a:t> </a:t>
+            </a:r>
+            <a:r>
+              <a:rPr lang="en-US" dirty="0"/>
+              <a:t>and results saved in same folder.</a:t>
+            </a:r>
+          </a:p>
+          <a:p>
+            <a:pPr>
+              <a:lnSpc>
+                <a:spcPct val="90000"/>
+              </a:lnSpc>
+            </a:pPr>
+            <a:r>
+              <a:rPr lang="en-US" dirty="0"/>
+              <a:t>- Since no peak seen around 1.5 MeV, I was wrong.  But based on this, I now </a:t>
+            </a:r>
+            <a:r>
+              <a:rPr lang="en-US" i="1" dirty="0"/>
+              <a:t>believe</a:t>
+            </a:r>
+            <a:r>
+              <a:rPr lang="en-US" dirty="0"/>
+              <a:t> that if A happens, then C must also happen.</a:t>
             </a:r>
           </a:p>
         </p:txBody>
@@ -8882,15 +9345,23 @@
             </a:pPr>
             <a:r>
               <a:rPr lang="en-US" sz="2000" dirty="0"/>
-              <a:t>Carlo Graziani is a Computational Scientist at ANL and author of the BSSW blog article </a:t>
-            </a:r>
-            <a:r>
-              <a:rPr lang="en-US" sz="2000" dirty="0">
-                <a:hlinkClick r:id="rId4"/>
-              </a:rPr>
+              <a:t>Carlo Graziani is a Computational Scientist at ANL</a:t>
+            </a:r>
+          </a:p>
+          <a:p>
+            <a:pPr algn="ctr">
+              <a:lnSpc>
+                <a:spcPct val="90000"/>
+              </a:lnSpc>
+            </a:pPr>
+            <a:r>
+              <a:rPr lang="en-US" sz="2000" dirty="0"/>
+              <a:t>BSSW blog article </a:t>
+            </a:r>
+            <a:r>
+              <a:rPr lang="en-US" sz="2000" i="1" dirty="0"/>
               <a:t>HPC and the Lab Manager</a:t>
             </a:r>
-            <a:endParaRPr lang="en-US" sz="2000" dirty="0"/>
           </a:p>
           <a:p>
             <a:pPr algn="l">
@@ -8994,7 +9465,7 @@
             </a:r>
             <a:r>
               <a:rPr lang="en-US" dirty="0"/>
-              <a:t>’ paper and pencil.</a:t>
+              <a:t>’ paper and pen</a:t>
             </a:r>
           </a:p>
           <a:p>
@@ -9006,7 +9477,7 @@
           <a:p>
             <a:r>
               <a:rPr lang="en-US" dirty="0"/>
-              <a:t>Anyone can use paper and pencil in any situation</a:t>
+              <a:t>Anyone can use paper and pen in any situation</a:t>
             </a:r>
           </a:p>
           <a:p>
@@ -9241,14 +9712,12 @@
               <a:t>Roberta Kwok, </a:t>
             </a:r>
             <a:r>
-              <a:rPr lang="en-US" sz="1800" dirty="0">
-                <a:hlinkClick r:id="rId3"/>
-              </a:rPr>
-              <a:t>“How to pick an electronic laboratory notebook”</a:t>
+              <a:rPr lang="en-US" sz="1800" i="1" dirty="0"/>
+              <a:t>How to pick an electronic laboratory notebook</a:t>
             </a:r>
             <a:r>
               <a:rPr lang="en-US" sz="1800" dirty="0"/>
-              <a:t>, Nature, 2017.</a:t>
+              <a:t>, Nature</a:t>
             </a:r>
           </a:p>
           <a:p>
@@ -9614,13 +10083,118 @@
           <a:lstStyle/>
           <a:p>
             <a:r>
+              <a:rPr lang="en-US" dirty="0"/>
+              <a:t>Carlo Graziani, </a:t>
+            </a:r>
+            <a:r>
+              <a:rPr lang="en-US" i="1" dirty="0"/>
+              <a:t>HPC and the Lab Manager</a:t>
+            </a:r>
+            <a:r>
+              <a:rPr lang="en-US" dirty="0"/>
+              <a:t>.  </a:t>
+            </a:r>
+            <a:r>
+              <a:rPr lang="en-US" b="1" dirty="0"/>
+              <a:t>Better Scientific Software</a:t>
+            </a:r>
+            <a:r>
+              <a:rPr lang="en-US" dirty="0"/>
+              <a:t>. </a:t>
+            </a:r>
+            <a:r>
               <a:rPr lang="en-US" dirty="0">
-                <a:solidFill>
-                  <a:srgbClr val="FF0000"/>
-                </a:solidFill>
+                <a:hlinkClick r:id="rId2"/>
               </a:rPr>
-              <a:t>TODO: Add in all citations</a:t>
-            </a:r>
+              <a:t>https://bssw.io/blog_posts/hpc-and-the-lab-manager</a:t>
+            </a:r>
+            <a:r>
+              <a:rPr lang="en-US" dirty="0"/>
+              <a:t>. Nov 17, 2021.</a:t>
+            </a:r>
+          </a:p>
+          <a:p>
+            <a:r>
+              <a:rPr lang="en-US" dirty="0"/>
+              <a:t>Katherine Riley, </a:t>
+            </a:r>
+            <a:r>
+              <a:rPr lang="en-US" i="1" dirty="0"/>
+              <a:t>What All Codes Should Do: Best Practices</a:t>
+            </a:r>
+            <a:r>
+              <a:rPr lang="en-US" dirty="0"/>
+              <a:t>. ATPESC 2019 presentation.  Retrieved from </a:t>
+            </a:r>
+            <a:r>
+              <a:rPr lang="en-US" dirty="0">
+                <a:hlinkClick r:id="rId3"/>
+              </a:rPr>
+              <a:t>YouTub</a:t>
+            </a:r>
+            <a:r>
+              <a:rPr lang="en-US" dirty="0">
+                <a:hlinkClick r:id="rId3"/>
+              </a:rPr>
+              <a:t>e</a:t>
+            </a:r>
+            <a:r>
+              <a:rPr lang="en-US" dirty="0"/>
+              <a:t>. Nov 5, 2019.</a:t>
+            </a:r>
+          </a:p>
+          <a:p>
+            <a:r>
+              <a:rPr lang="en-US" dirty="0"/>
+              <a:t>Howard M. </a:t>
+            </a:r>
+            <a:r>
+              <a:rPr lang="en-US" dirty="0" err="1"/>
+              <a:t>Kanare</a:t>
+            </a:r>
+            <a:r>
+              <a:rPr lang="en-US" dirty="0"/>
+              <a:t>, </a:t>
+            </a:r>
+            <a:r>
+              <a:rPr lang="en-US" i="1" dirty="0">
+                <a:hlinkClick r:id="rId4"/>
+              </a:rPr>
+              <a:t>Writing the Laboratory Notebook</a:t>
+            </a:r>
+            <a:r>
+              <a:rPr lang="en-US" i="1" dirty="0"/>
+              <a:t>. </a:t>
+            </a:r>
+            <a:r>
+              <a:rPr lang="en-US" dirty="0"/>
+              <a:t>American Chemical Society, Washington, D.C., 1985.</a:t>
+            </a:r>
+          </a:p>
+          <a:p>
+            <a:r>
+              <a:rPr lang="en-US" dirty="0"/>
+              <a:t>Roberta Kwok, </a:t>
+            </a:r>
+            <a:r>
+              <a:rPr lang="en-US" i="1" dirty="0">
+                <a:hlinkClick r:id="rId5"/>
+              </a:rPr>
+              <a:t>How to pick an electronic laboratory notebook</a:t>
+            </a:r>
+            <a:r>
+              <a:rPr lang="en-US" i="1" dirty="0"/>
+              <a:t>.  </a:t>
+            </a:r>
+            <a:r>
+              <a:rPr lang="en-US" b="1" dirty="0"/>
+              <a:t>Nature </a:t>
+            </a:r>
+            <a:r>
+              <a:rPr lang="en-US" dirty="0"/>
+              <a:t>560, pp. 269-270, Aug 6, 2018.</a:t>
+            </a:r>
+            <a:endParaRPr lang="en-US" b="1" dirty="0"/>
           </a:p>
         </p:txBody>
       </p:sp>
@@ -9628,6 +10202,277 @@
     <p:extLst>
       <p:ext uri="{BB962C8B-B14F-4D97-AF65-F5344CB8AC3E}">
         <p14:creationId xmlns:p14="http://schemas.microsoft.com/office/powerpoint/2010/main" val="1016376094"/>
+      </p:ext>
+    </p:extLst>
+  </p:cSld>
+  <p:clrMapOvr>
+    <a:masterClrMapping/>
+  </p:clrMapOvr>
+</p:sld>
+</file>
+
+<file path=ppt/slides/slide23.xml><?xml version="1.0" encoding="utf-8"?>
+<p:sld xmlns:a="http://schemas.openxmlformats.org/drawingml/2006/main" xmlns:r="http://schemas.openxmlformats.org/officeDocument/2006/relationships" xmlns:p="http://schemas.openxmlformats.org/presentationml/2006/main">
+  <p:cSld>
+    <p:spTree>
+      <p:nvGrpSpPr>
+        <p:cNvPr id="1" name=""/>
+        <p:cNvGrpSpPr/>
+        <p:nvPr/>
+      </p:nvGrpSpPr>
+      <p:grpSpPr>
+        <a:xfrm>
+          <a:off x="0" y="0"/>
+          <a:ext cx="0" cy="0"/>
+          <a:chOff x="0" y="0"/>
+          <a:chExt cx="0" cy="0"/>
+        </a:xfrm>
+      </p:grpSpPr>
+      <p:sp>
+        <p:nvSpPr>
+          <p:cNvPr id="2" name="Title 1">
+            <a:extLst>
+              <a:ext uri="{FF2B5EF4-FFF2-40B4-BE49-F238E27FC236}">
+                <a16:creationId xmlns:a16="http://schemas.microsoft.com/office/drawing/2014/main" id="{500318CC-56B3-5319-6130-F67EAC5F1465}"/>
+              </a:ext>
+            </a:extLst>
+          </p:cNvPr>
+          <p:cNvSpPr>
+            <a:spLocks noGrp="1"/>
+          </p:cNvSpPr>
+          <p:nvPr>
+            <p:ph type="title"/>
+          </p:nvPr>
+        </p:nvSpPr>
+        <p:spPr/>
+        <p:txBody>
+          <a:bodyPr/>
+          <a:lstStyle/>
+          <a:p>
+            <a:r>
+              <a:rPr lang="en-US" dirty="0"/>
+              <a:t>Meta Conclusions</a:t>
+            </a:r>
+          </a:p>
+        </p:txBody>
+      </p:sp>
+      <p:sp>
+        <p:nvSpPr>
+          <p:cNvPr id="3" name="Content Placeholder 2">
+            <a:extLst>
+              <a:ext uri="{FF2B5EF4-FFF2-40B4-BE49-F238E27FC236}">
+                <a16:creationId xmlns:a16="http://schemas.microsoft.com/office/drawing/2014/main" id="{A1A03074-7EEE-E717-D988-C8FD1B2561D4}"/>
+              </a:ext>
+            </a:extLst>
+          </p:cNvPr>
+          <p:cNvSpPr>
+            <a:spLocks noGrp="1"/>
+          </p:cNvSpPr>
+          <p:nvPr>
+            <p:ph idx="1"/>
+          </p:nvPr>
+        </p:nvSpPr>
+        <p:spPr/>
+        <p:txBody>
+          <a:bodyPr/>
+          <a:lstStyle/>
+          <a:p>
+            <a:pPr marL="0" indent="0">
+              <a:buNone/>
+            </a:pPr>
+            <a:r>
+              <a:rPr lang="en-US" dirty="0"/>
+              <a:t>This discussion</a:t>
+            </a:r>
+          </a:p>
+          <a:p>
+            <a:r>
+              <a:rPr lang="en-US" dirty="0"/>
+              <a:t>Was</a:t>
+            </a:r>
+            <a:r>
+              <a:rPr lang="en-US" b="1" dirty="0"/>
+              <a:t> not</a:t>
+            </a:r>
+            <a:r>
+              <a:rPr lang="en-US" dirty="0"/>
+              <a:t> about sharing knowledge, but</a:t>
+            </a:r>
+          </a:p>
+          <a:p>
+            <a:r>
+              <a:rPr lang="en-US" dirty="0"/>
+              <a:t>Was about (hopefully) building </a:t>
+            </a:r>
+            <a:r>
+              <a:rPr lang="en-US" b="1" dirty="0"/>
+              <a:t>understanding</a:t>
+            </a:r>
+          </a:p>
+          <a:p>
+            <a:endParaRPr lang="en-US" b="1" dirty="0"/>
+          </a:p>
+          <a:p>
+            <a:pPr marL="0" indent="0">
+              <a:buNone/>
+            </a:pPr>
+            <a:endParaRPr lang="en-US" b="1" dirty="0"/>
+          </a:p>
+        </p:txBody>
+      </p:sp>
+    </p:spTree>
+    <p:extLst>
+      <p:ext uri="{BB962C8B-B14F-4D97-AF65-F5344CB8AC3E}">
+        <p14:creationId xmlns:p14="http://schemas.microsoft.com/office/powerpoint/2010/main" val="4279419405"/>
+      </p:ext>
+    </p:extLst>
+  </p:cSld>
+  <p:clrMapOvr>
+    <a:masterClrMapping/>
+  </p:clrMapOvr>
+</p:sld>
+</file>
+
+<file path=ppt/slides/slide24.xml><?xml version="1.0" encoding="utf-8"?>
+<p:sld xmlns:a="http://schemas.openxmlformats.org/drawingml/2006/main" xmlns:r="http://schemas.openxmlformats.org/officeDocument/2006/relationships" xmlns:p="http://schemas.openxmlformats.org/presentationml/2006/main">
+  <p:cSld>
+    <p:spTree>
+      <p:nvGrpSpPr>
+        <p:cNvPr id="1" name=""/>
+        <p:cNvGrpSpPr/>
+        <p:nvPr/>
+      </p:nvGrpSpPr>
+      <p:grpSpPr>
+        <a:xfrm>
+          <a:off x="0" y="0"/>
+          <a:ext cx="0" cy="0"/>
+          <a:chOff x="0" y="0"/>
+          <a:chExt cx="0" cy="0"/>
+        </a:xfrm>
+      </p:grpSpPr>
+      <p:sp>
+        <p:nvSpPr>
+          <p:cNvPr id="2" name="Title 1">
+            <a:extLst>
+              <a:ext uri="{FF2B5EF4-FFF2-40B4-BE49-F238E27FC236}">
+                <a16:creationId xmlns:a16="http://schemas.microsoft.com/office/drawing/2014/main" id="{1FAC2A80-D3DC-977C-1FB0-0763FA18DCA5}"/>
+              </a:ext>
+            </a:extLst>
+          </p:cNvPr>
+          <p:cNvSpPr>
+            <a:spLocks noGrp="1"/>
+          </p:cNvSpPr>
+          <p:nvPr>
+            <p:ph type="title"/>
+          </p:nvPr>
+        </p:nvSpPr>
+        <p:spPr/>
+        <p:txBody>
+          <a:bodyPr/>
+          <a:lstStyle/>
+          <a:p>
+            <a:r>
+              <a:rPr lang="en-US" dirty="0"/>
+              <a:t>From my perspective</a:t>
+            </a:r>
+            <a:br>
+              <a:rPr lang="en-US" dirty="0"/>
+            </a:br>
+            <a:endParaRPr lang="en-US" dirty="0"/>
+          </a:p>
+        </p:txBody>
+      </p:sp>
+      <p:sp>
+        <p:nvSpPr>
+          <p:cNvPr id="3" name="Content Placeholder 2">
+            <a:extLst>
+              <a:ext uri="{FF2B5EF4-FFF2-40B4-BE49-F238E27FC236}">
+                <a16:creationId xmlns:a16="http://schemas.microsoft.com/office/drawing/2014/main" id="{9EF6A4B5-7EA5-6DFC-5EAB-6002CEA1765C}"/>
+              </a:ext>
+            </a:extLst>
+          </p:cNvPr>
+          <p:cNvSpPr>
+            <a:spLocks noGrp="1"/>
+          </p:cNvSpPr>
+          <p:nvPr>
+            <p:ph idx="1"/>
+          </p:nvPr>
+        </p:nvSpPr>
+        <p:spPr>
+          <a:xfrm>
+            <a:off x="365760" y="1325880"/>
+            <a:ext cx="11369809" cy="4047778"/>
+          </a:xfrm>
+        </p:spPr>
+        <p:txBody>
+          <a:bodyPr/>
+          <a:lstStyle/>
+          <a:p>
+            <a:r>
+              <a:rPr lang="en-US" dirty="0"/>
+              <a:t>Software best practices are foundational science &amp; are mandatory</a:t>
+            </a:r>
+          </a:p>
+          <a:p>
+            <a:r>
+              <a:rPr lang="en-US" dirty="0"/>
+              <a:t>Knowledge management can improve science &amp; productivity</a:t>
+            </a:r>
+          </a:p>
+          <a:p>
+            <a:r>
+              <a:rPr lang="en-US" dirty="0"/>
+              <a:t>Productivity can benefit from selflessness</a:t>
+            </a:r>
+          </a:p>
+          <a:p>
+            <a:r>
+              <a:rPr lang="en-US" dirty="0"/>
+              <a:t>Not all documents are alike</a:t>
+            </a:r>
+          </a:p>
+          <a:p>
+            <a:r>
+              <a:rPr lang="en-US" dirty="0"/>
+              <a:t>Lab notebooks are mandatory</a:t>
+            </a:r>
+          </a:p>
+          <a:p>
+            <a:r>
+              <a:rPr lang="en-US" dirty="0"/>
+              <a:t>Lab notebooks allow for learning</a:t>
+            </a:r>
+          </a:p>
+          <a:p>
+            <a:r>
+              <a:rPr lang="en-US" dirty="0"/>
+              <a:t>Lab notebooks for CMSE are hard</a:t>
+            </a:r>
+          </a:p>
+          <a:p>
+            <a:endParaRPr lang="en-US" dirty="0"/>
+          </a:p>
+          <a:p>
+            <a:pPr marL="0" indent="0" algn="ctr">
+              <a:buNone/>
+            </a:pPr>
+            <a:r>
+              <a:rPr lang="en-US" b="1" dirty="0"/>
+              <a:t>To be continued…</a:t>
+            </a:r>
+          </a:p>
+          <a:p>
+            <a:endParaRPr lang="en-US" dirty="0"/>
+          </a:p>
+          <a:p>
+            <a:endParaRPr lang="en-US" dirty="0"/>
+          </a:p>
+        </p:txBody>
+      </p:sp>
+    </p:spTree>
+    <p:extLst>
+      <p:ext uri="{BB962C8B-B14F-4D97-AF65-F5344CB8AC3E}">
+        <p14:creationId xmlns:p14="http://schemas.microsoft.com/office/powerpoint/2010/main" val="1043221574"/>
       </p:ext>
     </p:extLst>
   </p:cSld>
@@ -9713,7 +10558,7 @@
             </a:pPr>
             <a:r>
               <a:rPr lang="en-US" dirty="0"/>
-              <a:t>“… practicing the scientific method properly requires good software practices.  This is understood in the experimental community…The computational science side has had a historic problem with it.  As we can see, it’s getting better.”</a:t>
+              <a:t>Scientific HPC is several young fields that “on close examination, have not really stabilized or optimized their collaborative processes in a manner analogous to that of more mature, ‘classical’ sciences. As a consequence, valuable science is often needlessly lost, or left uncollected.”</a:t>
             </a:r>
           </a:p>
           <a:p>
@@ -9726,14 +10571,18 @@
             </a:r>
             <a:r>
               <a:rPr lang="en-US" sz="2000" dirty="0"/>
-              <a:t>Katherine Riley, Director of Science at ALCF, ATPESC 2019</a:t>
+              <a:t>Carlo Graziani, Computational Scientist at ANL, </a:t>
+            </a:r>
+            <a:r>
+              <a:rPr lang="en-US" sz="2000" i="1" dirty="0"/>
+              <a:t>HPC and the Lab Manager</a:t>
             </a:r>
           </a:p>
           <a:p>
             <a:pPr marL="0" indent="0">
               <a:buNone/>
             </a:pPr>
-            <a:endParaRPr lang="en-US" sz="2000" dirty="0"/>
+            <a:endParaRPr lang="en-US" dirty="0"/>
           </a:p>
           <a:p>
             <a:pPr marL="0" indent="0">
@@ -9741,7 +10590,7 @@
             </a:pPr>
             <a:r>
               <a:rPr lang="en-US" dirty="0"/>
-              <a:t>Scientific HPC is several young fields that “on close examination, have not really stabilized or optimized their collaborative processes in a manner analogous to that of more mature, ‘classical’ sciences. As a consequence, valuable science is often needlessly lost, or left uncollected.”</a:t>
+              <a:t>“… practicing the scientific method properly requires good software practices.  This is understood in the experimental community…The computational science side has had a historic problem with it.  As we can see, it’s getting better.”</a:t>
             </a:r>
           </a:p>
           <a:p>
@@ -9754,34 +10603,7 @@
             </a:r>
             <a:r>
               <a:rPr lang="en-US" sz="2000" dirty="0"/>
-              <a:t>Carlo Graziani, Computational Scientist at ANL, </a:t>
-            </a:r>
-            <a:r>
-              <a:rPr lang="en-US" sz="2000" dirty="0">
-                <a:hlinkClick r:id="rId3"/>
-              </a:rPr>
-              <a:t>BSSW blog article </a:t>
-            </a:r>
-            <a:endParaRPr lang="en-US" sz="2000" dirty="0"/>
-          </a:p>
-          <a:p>
-            <a:r>
-              <a:rPr lang="en-US" dirty="0">
-                <a:solidFill>
-                  <a:srgbClr val="FF0000"/>
-                </a:solidFill>
-              </a:rPr>
-              <a:t>Find Mike’s quote</a:t>
-            </a:r>
-          </a:p>
-          <a:p>
-            <a:r>
-              <a:rPr lang="en-US" dirty="0">
-                <a:solidFill>
-                  <a:srgbClr val="FF0000"/>
-                </a:solidFill>
-              </a:rPr>
-              <a:t>Refer back to content in Intro?</a:t>
+              <a:t>Katherine Riley, Director of Science at ALCF, ATPESC 2019</a:t>
             </a:r>
           </a:p>
           <a:p>
@@ -10023,7 +10845,7 @@
           <p:cNvPr id="2" name="Title 1">
             <a:extLst>
               <a:ext uri="{FF2B5EF4-FFF2-40B4-BE49-F238E27FC236}">
-                <a16:creationId xmlns:a16="http://schemas.microsoft.com/office/drawing/2014/main" id="{8880C00D-F409-2FF4-8FF6-C940EB9DAD4D}"/>
+                <a16:creationId xmlns:a16="http://schemas.microsoft.com/office/drawing/2014/main" id="{F35627EA-0A9D-2FF7-2CBF-461CD73F1D60}"/>
               </a:ext>
             </a:extLst>
           </p:cNvPr>
@@ -10041,17 +10863,17 @@
           <a:p>
             <a:r>
               <a:rPr lang="en-US" dirty="0"/>
-              <a:t>DIKUW</a:t>
-            </a:r>
-          </a:p>
-        </p:txBody>
-      </p:sp>
-      <p:sp>
-        <p:nvSpPr>
-          <p:cNvPr id="3" name="Content Placeholder 2">
+              <a:t>A minimal definition</a:t>
+            </a:r>
+          </a:p>
+        </p:txBody>
+      </p:sp>
+      <p:sp>
+        <p:nvSpPr>
+          <p:cNvPr id="4" name="Content Placeholder 2">
             <a:extLst>
               <a:ext uri="{FF2B5EF4-FFF2-40B4-BE49-F238E27FC236}">
-                <a16:creationId xmlns:a16="http://schemas.microsoft.com/office/drawing/2014/main" id="{0B114E63-4B3C-C54B-FFCC-78B019BD23C1}"/>
+                <a16:creationId xmlns:a16="http://schemas.microsoft.com/office/drawing/2014/main" id="{5A1F561D-C93C-67C0-49AE-92C353A04E25}"/>
               </a:ext>
             </a:extLst>
           </p:cNvPr>
@@ -10072,45 +10894,37 @@
             </a:pPr>
             <a:r>
               <a:rPr lang="en-US" dirty="0"/>
-              <a:t>A classification scheme that overloads every day words so that we can use the same language and understand each other.</a:t>
-            </a:r>
-          </a:p>
-          <a:p>
-            <a:r>
-              <a:rPr lang="en-US" dirty="0"/>
-              <a:t>Data</a:t>
-            </a:r>
-          </a:p>
-          <a:p>
-            <a:r>
-              <a:rPr lang="en-US" dirty="0"/>
-              <a:t>Information</a:t>
-            </a:r>
-          </a:p>
-          <a:p>
-            <a:r>
-              <a:rPr lang="en-US" dirty="0"/>
-              <a:t>Knowledge</a:t>
-            </a:r>
-          </a:p>
-          <a:p>
-            <a:r>
-              <a:rPr lang="en-US" dirty="0"/>
-              <a:t>Understanding</a:t>
-            </a:r>
-          </a:p>
-          <a:p>
-            <a:r>
-              <a:rPr lang="en-US" dirty="0"/>
-              <a:t>Wisdom</a:t>
-            </a:r>
+              <a:t>A goal of keeping a lab notebook is "...to write with enough detail and clarity that another scientist could pick up the notebook at some time in the future, repeat the work based on the written descriptions, and make the same observations that were originally recorded. If this guideline is followed, even the original author will be able to understand the notes when looking back on them after considerable time has passed!”</a:t>
+            </a:r>
+          </a:p>
+          <a:p>
+            <a:pPr marL="0" indent="0">
+              <a:buNone/>
+            </a:pPr>
+            <a:r>
+              <a:rPr lang="en-US" dirty="0"/>
+              <a:t>	- Howard </a:t>
+            </a:r>
+            <a:r>
+              <a:rPr lang="en-US" dirty="0" err="1"/>
+              <a:t>Kanare</a:t>
+            </a:r>
+            <a:r>
+              <a:rPr lang="en-US" dirty="0"/>
+              <a:t>, </a:t>
+            </a:r>
+            <a:r>
+              <a:rPr lang="en-US" i="1" dirty="0"/>
+              <a:t>Writing the Laboratory Notebook</a:t>
+            </a:r>
+            <a:endParaRPr lang="en-US" dirty="0"/>
           </a:p>
         </p:txBody>
       </p:sp>
     </p:spTree>
     <p:extLst>
       <p:ext uri="{BB962C8B-B14F-4D97-AF65-F5344CB8AC3E}">
-        <p14:creationId xmlns:p14="http://schemas.microsoft.com/office/powerpoint/2010/main" val="1041287334"/>
+        <p14:creationId xmlns:p14="http://schemas.microsoft.com/office/powerpoint/2010/main" val="3036165320"/>
       </p:ext>
     </p:extLst>
   </p:cSld>
@@ -10142,7 +10956,7 @@
           <p:cNvPr id="2" name="Title 1">
             <a:extLst>
               <a:ext uri="{FF2B5EF4-FFF2-40B4-BE49-F238E27FC236}">
-                <a16:creationId xmlns:a16="http://schemas.microsoft.com/office/drawing/2014/main" id="{9D3BEC0D-AF53-6375-54A6-F89A29585952}"/>
+                <a16:creationId xmlns:a16="http://schemas.microsoft.com/office/drawing/2014/main" id="{8880C00D-F409-2FF4-8FF6-C940EB9DAD4D}"/>
               </a:ext>
             </a:extLst>
           </p:cNvPr>
@@ -10160,7 +10974,7 @@
           <a:p>
             <a:r>
               <a:rPr lang="en-US" dirty="0"/>
-              <a:t>Data &amp; Information</a:t>
+              <a:t>DIKUW</a:t>
             </a:r>
           </a:p>
         </p:txBody>
@@ -10170,7 +10984,7 @@
           <p:cNvPr id="3" name="Content Placeholder 2">
             <a:extLst>
               <a:ext uri="{FF2B5EF4-FFF2-40B4-BE49-F238E27FC236}">
-                <a16:creationId xmlns:a16="http://schemas.microsoft.com/office/drawing/2014/main" id="{D86BEDF2-C3A6-598C-A740-C9E1F393C048}"/>
+                <a16:creationId xmlns:a16="http://schemas.microsoft.com/office/drawing/2014/main" id="{0B114E63-4B3C-C54B-FFCC-78B019BD23C1}"/>
               </a:ext>
             </a:extLst>
           </p:cNvPr>
@@ -10181,79 +10995,47 @@
             <p:ph idx="1"/>
           </p:nvPr>
         </p:nvSpPr>
-        <p:spPr>
-          <a:xfrm>
-            <a:off x="365760" y="1325880"/>
-            <a:ext cx="11369809" cy="4047778"/>
-          </a:xfrm>
-        </p:spPr>
+        <p:spPr/>
         <p:txBody>
           <a:bodyPr/>
           <a:lstStyle/>
           <a:p>
+            <a:pPr marL="0" indent="0">
+              <a:buNone/>
+            </a:pPr>
+            <a:r>
+              <a:rPr lang="en-US" dirty="0"/>
+              <a:t>A classification scheme that overloads every day words so that we can use the same language and understand each other.</a:t>
+            </a:r>
+          </a:p>
+          <a:p>
             <a:r>
               <a:rPr lang="en-US" dirty="0"/>
               <a:t>Data</a:t>
             </a:r>
           </a:p>
           <a:p>
-            <a:pPr lvl="1"/>
-            <a:r>
-              <a:rPr lang="en-US" dirty="0"/>
-              <a:t>Collection of numbers, symbols, text, </a:t>
-            </a:r>
-            <a:r>
-              <a:rPr lang="en-US" i="1" dirty="0"/>
-              <a:t>etc.</a:t>
-            </a:r>
-          </a:p>
-          <a:p>
-            <a:pPr lvl="1"/>
-            <a:r>
-              <a:rPr lang="en-US" dirty="0"/>
-              <a:t>It has value only because it was recorded and exists.</a:t>
-            </a:r>
-          </a:p>
-          <a:p>
-            <a:pPr lvl="1"/>
-            <a:r>
-              <a:rPr lang="en-US" dirty="0"/>
-              <a:t>Example: Timeseries data of temperature, relative humidity, and precipitation.</a:t>
-            </a:r>
-          </a:p>
-          <a:p>
             <a:r>
               <a:rPr lang="en-US" dirty="0"/>
               <a:t>Information</a:t>
             </a:r>
           </a:p>
           <a:p>
-            <a:pPr lvl="1"/>
-            <a:r>
-              <a:rPr lang="en-US" dirty="0"/>
-              <a:t>Facts gleaned from data</a:t>
-            </a:r>
-          </a:p>
-          <a:p>
-            <a:pPr lvl="1"/>
-            <a:r>
-              <a:rPr lang="en-US" dirty="0"/>
-              <a:t>Answers questions such as who, what, when, how much, how long, </a:t>
-            </a:r>
-            <a:r>
-              <a:rPr lang="en-US" i="1" dirty="0"/>
-              <a:t>etc</a:t>
-            </a:r>
-            <a:r>
-              <a:rPr lang="en-US" dirty="0"/>
-              <a:t>.</a:t>
-            </a:r>
-          </a:p>
-          <a:p>
-            <a:pPr lvl="1"/>
-            <a:r>
-              <a:rPr lang="en-US" dirty="0"/>
-              <a:t>Example: Starting at 2pm the temperature dropped by 5ºF over 15 minutes.  At 2:05 pm it started to rain and 0.25” of rain was accumulated over the next 30 minutes.</a:t>
+            <a:r>
+              <a:rPr lang="en-US" dirty="0"/>
+              <a:t>Knowledge</a:t>
+            </a:r>
+          </a:p>
+          <a:p>
+            <a:r>
+              <a:rPr lang="en-US" dirty="0"/>
+              <a:t>Understanding</a:t>
+            </a:r>
+          </a:p>
+          <a:p>
+            <a:r>
+              <a:rPr lang="en-US" dirty="0"/>
+              <a:t>Wisdom</a:t>
             </a:r>
           </a:p>
         </p:txBody>
@@ -10261,7 +11043,7 @@
     </p:spTree>
     <p:extLst>
       <p:ext uri="{BB962C8B-B14F-4D97-AF65-F5344CB8AC3E}">
-        <p14:creationId xmlns:p14="http://schemas.microsoft.com/office/powerpoint/2010/main" val="2193434764"/>
+        <p14:creationId xmlns:p14="http://schemas.microsoft.com/office/powerpoint/2010/main" val="1041287334"/>
       </p:ext>
     </p:extLst>
   </p:cSld>
@@ -10293,7 +11075,7 @@
           <p:cNvPr id="2" name="Title 1">
             <a:extLst>
               <a:ext uri="{FF2B5EF4-FFF2-40B4-BE49-F238E27FC236}">
-                <a16:creationId xmlns:a16="http://schemas.microsoft.com/office/drawing/2014/main" id="{D058ED4F-BC78-0A36-F75C-E4005B3DFBAE}"/>
+                <a16:creationId xmlns:a16="http://schemas.microsoft.com/office/drawing/2014/main" id="{9D3BEC0D-AF53-6375-54A6-F89A29585952}"/>
               </a:ext>
             </a:extLst>
           </p:cNvPr>
@@ -10311,7 +11093,7 @@
           <a:p>
             <a:r>
               <a:rPr lang="en-US" dirty="0"/>
-              <a:t>Knowledge &amp; Understanding</a:t>
+              <a:t>Data &amp; Information</a:t>
             </a:r>
           </a:p>
         </p:txBody>
@@ -10321,7 +11103,7 @@
           <p:cNvPr id="3" name="Content Placeholder 2">
             <a:extLst>
               <a:ext uri="{FF2B5EF4-FFF2-40B4-BE49-F238E27FC236}">
-                <a16:creationId xmlns:a16="http://schemas.microsoft.com/office/drawing/2014/main" id="{3EC7F33F-88DD-3100-7BF9-E8C247CEEC72}"/>
+                <a16:creationId xmlns:a16="http://schemas.microsoft.com/office/drawing/2014/main" id="{D86BEDF2-C3A6-598C-A740-C9E1F393C048}"/>
               </a:ext>
             </a:extLst>
           </p:cNvPr>
@@ -10334,7 +11116,7 @@
         </p:nvSpPr>
         <p:spPr>
           <a:xfrm>
-            <a:off x="365760" y="1196184"/>
+            <a:off x="365760" y="1325880"/>
             <a:ext cx="11369809" cy="4047778"/>
           </a:xfrm>
         </p:spPr>
@@ -10344,18 +11126,56 @@
           <a:p>
             <a:r>
               <a:rPr lang="en-US" dirty="0"/>
-              <a:t>Knowledge</a:t>
+              <a:t>Data</a:t>
             </a:r>
           </a:p>
           <a:p>
             <a:pPr lvl="1"/>
             <a:r>
               <a:rPr lang="en-US" dirty="0"/>
-              <a:t>Derived from information, experience, and </a:t>
-            </a:r>
-            <a:r>
-              <a:rPr lang="en-US" b="1" dirty="0"/>
-              <a:t>understanding</a:t>
+              <a:t>Collection of numbers, symbols, text, </a:t>
+            </a:r>
+            <a:r>
+              <a:rPr lang="en-US" i="1" dirty="0"/>
+              <a:t>etc.</a:t>
+            </a:r>
+          </a:p>
+          <a:p>
+            <a:pPr lvl="1"/>
+            <a:r>
+              <a:rPr lang="en-US" dirty="0"/>
+              <a:t>It has value only because it was recorded and exists.</a:t>
+            </a:r>
+          </a:p>
+          <a:p>
+            <a:pPr lvl="1"/>
+            <a:r>
+              <a:rPr lang="en-US" dirty="0"/>
+              <a:t>Example: Timeseries representation of temperature, relative humidity, and precipitation.</a:t>
+            </a:r>
+          </a:p>
+          <a:p>
+            <a:r>
+              <a:rPr lang="en-US" dirty="0"/>
+              <a:t>Information</a:t>
+            </a:r>
+          </a:p>
+          <a:p>
+            <a:pPr lvl="1"/>
+            <a:r>
+              <a:rPr lang="en-US" dirty="0"/>
+              <a:t>Facts gleaned from data</a:t>
+            </a:r>
+          </a:p>
+          <a:p>
+            <a:pPr lvl="1"/>
+            <a:r>
+              <a:rPr lang="en-US" dirty="0"/>
+              <a:t>Answers questions such as who, what, when, how much, how long, </a:t>
+            </a:r>
+            <a:r>
+              <a:rPr lang="en-US" i="1" dirty="0"/>
+              <a:t>etc</a:t>
             </a:r>
             <a:r>
               <a:rPr lang="en-US" dirty="0"/>
@@ -10365,104 +11185,8 @@
           <a:p>
             <a:pPr lvl="1"/>
             <a:r>
-              <a:rPr lang="en-US" b="1" dirty="0"/>
-              <a:t>Example</a:t>
-            </a:r>
-            <a:r>
-              <a:rPr lang="en-US" dirty="0"/>
-              <a:t>: When relative humidity levels are high and the temperature drops, there is an increased probability of precipitation. </a:t>
-            </a:r>
-            <a:r>
-              <a:rPr lang="en-US" dirty="0">
-                <a:solidFill>
-                  <a:srgbClr val="FF0000"/>
-                </a:solidFill>
-              </a:rPr>
-              <a:t>TODO: Add in better paragraph.</a:t>
-            </a:r>
-          </a:p>
-          <a:p>
-            <a:r>
-              <a:rPr lang="en-US" dirty="0"/>
-              <a:t>Understanding</a:t>
-            </a:r>
-          </a:p>
-          <a:p>
-            <a:pPr lvl="1"/>
-            <a:r>
-              <a:rPr lang="en-US" dirty="0"/>
-              <a:t>A deep theoretical background in and practical experience with the system whose data was acquired and studied?</a:t>
-            </a:r>
-          </a:p>
-          <a:p>
-            <a:pPr lvl="1"/>
-            <a:r>
-              <a:rPr lang="en-US" dirty="0"/>
-              <a:t>The ability to explain why?</a:t>
-            </a:r>
-          </a:p>
-          <a:p>
-            <a:pPr lvl="1"/>
-            <a:r>
-              <a:rPr lang="en-US" dirty="0"/>
-              <a:t>“Understanding is a kind of ecstasy” – Carl Sagan </a:t>
-            </a:r>
-          </a:p>
-          <a:p>
-            <a:pPr lvl="1"/>
-            <a:r>
-              <a:rPr lang="en-US" b="1" dirty="0"/>
-              <a:t>Example</a:t>
-            </a:r>
-            <a:r>
-              <a:rPr lang="en-US" dirty="0"/>
-              <a:t>: A meteorologist could explain at different levels of detail how the atmosphere works to justify the knowledge.</a:t>
-            </a:r>
-          </a:p>
-          <a:p>
-            <a:pPr marL="0" indent="0">
-              <a:buNone/>
-            </a:pPr>
-            <a:endParaRPr lang="en-US" dirty="0"/>
-          </a:p>
-        </p:txBody>
-      </p:sp>
-      <p:sp>
-        <p:nvSpPr>
-          <p:cNvPr id="4" name="TextBox 3">
-            <a:extLst>
-              <a:ext uri="{FF2B5EF4-FFF2-40B4-BE49-F238E27FC236}">
-                <a16:creationId xmlns:a16="http://schemas.microsoft.com/office/drawing/2014/main" id="{F55B5B07-2D57-D639-458E-BFF94A99FE7A}"/>
-              </a:ext>
-            </a:extLst>
-          </p:cNvPr>
-          <p:cNvSpPr txBox="1"/>
-          <p:nvPr/>
-        </p:nvSpPr>
-        <p:spPr>
-          <a:xfrm>
-            <a:off x="2057954" y="5311200"/>
-            <a:ext cx="8072916" cy="517065"/>
-          </a:xfrm>
-          <a:prstGeom prst="rect">
-            <a:avLst/>
-          </a:prstGeom>
-          <a:noFill/>
-        </p:spPr>
-        <p:txBody>
-          <a:bodyPr wrap="none" lIns="118872" tIns="91440" rIns="118872" bIns="91440" rtlCol="0" anchor="ctr" anchorCtr="0">
-            <a:spAutoFit/>
-          </a:bodyPr>
-          <a:lstStyle/>
-          <a:p>
-            <a:pPr algn="l">
-              <a:lnSpc>
-                <a:spcPct val="90000"/>
-              </a:lnSpc>
-            </a:pPr>
-            <a:r>
-              <a:rPr lang="en-US" sz="2400" dirty="0"/>
-              <a:t>You can share knowledge, can you share understanding?</a:t>
+              <a:rPr lang="en-US" dirty="0"/>
+              <a:t>Example: Starting at 2pm the temperature dropped by 5ºF over 15 minutes.  At 2:05 pm it started to rain and 0.25” of rain was accumulated over the next 30 minutes.</a:t>
             </a:r>
           </a:p>
         </p:txBody>
@@ -10470,7 +11194,7 @@
     </p:spTree>
     <p:extLst>
       <p:ext uri="{BB962C8B-B14F-4D97-AF65-F5344CB8AC3E}">
-        <p14:creationId xmlns:p14="http://schemas.microsoft.com/office/powerpoint/2010/main" val="2366589001"/>
+        <p14:creationId xmlns:p14="http://schemas.microsoft.com/office/powerpoint/2010/main" val="2193434764"/>
       </p:ext>
     </p:extLst>
   </p:cSld>
@@ -10502,7 +11226,7 @@
           <p:cNvPr id="2" name="Title 1">
             <a:extLst>
               <a:ext uri="{FF2B5EF4-FFF2-40B4-BE49-F238E27FC236}">
-                <a16:creationId xmlns:a16="http://schemas.microsoft.com/office/drawing/2014/main" id="{923FF528-4ADA-DA4E-A959-E1EFEAD4DC5A}"/>
+                <a16:creationId xmlns:a16="http://schemas.microsoft.com/office/drawing/2014/main" id="{D058ED4F-BC78-0A36-F75C-E4005B3DFBAE}"/>
               </a:ext>
             </a:extLst>
           </p:cNvPr>
@@ -10520,12 +11244,8 @@
           <a:p>
             <a:r>
               <a:rPr lang="en-US" dirty="0"/>
-              <a:t>Obligatory Einstein Quote</a:t>
-            </a:r>
-            <a:br>
-              <a:rPr lang="en-US" dirty="0"/>
-            </a:br>
-            <a:endParaRPr lang="en-US" dirty="0"/>
+              <a:t>Knowledge &amp; Understanding</a:t>
+            </a:r>
           </a:p>
         </p:txBody>
       </p:sp>
@@ -10534,7 +11254,7 @@
           <p:cNvPr id="3" name="Content Placeholder 2">
             <a:extLst>
               <a:ext uri="{FF2B5EF4-FFF2-40B4-BE49-F238E27FC236}">
-                <a16:creationId xmlns:a16="http://schemas.microsoft.com/office/drawing/2014/main" id="{B1C4588A-E6F1-E870-2F2D-600085D93BB1}"/>
+                <a16:creationId xmlns:a16="http://schemas.microsoft.com/office/drawing/2014/main" id="{3EC7F33F-88DD-3100-7BF9-E8C247CEEC72}"/>
               </a:ext>
             </a:extLst>
           </p:cNvPr>
@@ -10547,33 +11267,86 @@
         </p:nvSpPr>
         <p:spPr>
           <a:xfrm>
-            <a:off x="1167009" y="1602040"/>
-            <a:ext cx="10028971" cy="4047778"/>
+            <a:off x="365760" y="1196184"/>
+            <a:ext cx="11369809" cy="4047778"/>
           </a:xfrm>
         </p:spPr>
         <p:txBody>
           <a:bodyPr/>
           <a:lstStyle/>
           <a:p>
-            <a:pPr marL="0" indent="0">
-              <a:buNone/>
-            </a:pPr>
-            <a:r>
-              <a:rPr lang="en-US" sz="3600" dirty="0"/>
-              <a:t>“Any fool can know. The point is to understand.” </a:t>
-            </a:r>
-          </a:p>
-          <a:p>
-            <a:pPr marL="0" indent="0">
-              <a:buNone/>
-            </a:pPr>
-            <a:r>
-              <a:rPr lang="en-US" dirty="0"/>
-              <a:t>	- </a:t>
-            </a:r>
-            <a:r>
-              <a:rPr lang="en-US" sz="2800" dirty="0"/>
-              <a:t>Albert Einstein</a:t>
+            <a:r>
+              <a:rPr lang="en-US" dirty="0"/>
+              <a:t>Knowledge</a:t>
+            </a:r>
+          </a:p>
+          <a:p>
+            <a:pPr lvl="1"/>
+            <a:r>
+              <a:rPr lang="en-US" dirty="0"/>
+              <a:t>Derived from information, experience, and </a:t>
+            </a:r>
+            <a:r>
+              <a:rPr lang="en-US" b="1" dirty="0"/>
+              <a:t>understanding</a:t>
+            </a:r>
+            <a:r>
+              <a:rPr lang="en-US" dirty="0"/>
+              <a:t>.</a:t>
+            </a:r>
+          </a:p>
+          <a:p>
+            <a:pPr lvl="1"/>
+            <a:r>
+              <a:rPr lang="en-US" b="1" dirty="0"/>
+              <a:t>Example</a:t>
+            </a:r>
+            <a:r>
+              <a:rPr lang="en-US" dirty="0"/>
+              <a:t>: When relative humidity levels are high and the temperature drops substantially, there is an increased probability of precipitation.</a:t>
+            </a:r>
+            <a:endParaRPr lang="en-US" dirty="0">
+              <a:solidFill>
+                <a:srgbClr val="FF0000"/>
+              </a:solidFill>
+            </a:endParaRPr>
+          </a:p>
+          <a:p>
+            <a:r>
+              <a:rPr lang="en-US" dirty="0"/>
+              <a:t>Understanding</a:t>
+            </a:r>
+          </a:p>
+          <a:p>
+            <a:pPr lvl="1"/>
+            <a:r>
+              <a:rPr lang="en-US" dirty="0"/>
+              <a:t>“Understanding is a kind of ecstasy” – Carl Sagan </a:t>
+            </a:r>
+          </a:p>
+          <a:p>
+            <a:pPr lvl="1"/>
+            <a:r>
+              <a:rPr lang="en-US" dirty="0"/>
+              <a:t>A deep theoretical background in and practical experience with the system whose data was acquired and studied?</a:t>
+            </a:r>
+          </a:p>
+          <a:p>
+            <a:pPr lvl="1"/>
+            <a:r>
+              <a:rPr lang="en-US" dirty="0"/>
+              <a:t>The ability to explain why?</a:t>
+            </a:r>
+          </a:p>
+          <a:p>
+            <a:pPr lvl="1"/>
+            <a:r>
+              <a:rPr lang="en-US" b="1" dirty="0"/>
+              <a:t>Example</a:t>
+            </a:r>
+            <a:r>
+              <a:rPr lang="en-US" dirty="0"/>
+              <a:t>: A meteorologist could explain at different levels of detail how the atmosphere works to justify the knowledge.</a:t>
             </a:r>
           </a:p>
           <a:p>
@@ -10589,7 +11362,7 @@
           <p:cNvPr id="4" name="TextBox 3">
             <a:extLst>
               <a:ext uri="{FF2B5EF4-FFF2-40B4-BE49-F238E27FC236}">
-                <a16:creationId xmlns:a16="http://schemas.microsoft.com/office/drawing/2014/main" id="{DCA5C706-847F-F402-A9B0-751B368A165A}"/>
+                <a16:creationId xmlns:a16="http://schemas.microsoft.com/office/drawing/2014/main" id="{F55B5B07-2D57-D639-458E-BFF94A99FE7A}"/>
               </a:ext>
             </a:extLst>
           </p:cNvPr>
@@ -10598,8 +11371,8 @@
         </p:nvSpPr>
         <p:spPr>
           <a:xfrm>
-            <a:off x="992845" y="3391983"/>
-            <a:ext cx="9707880" cy="3093154"/>
+            <a:off x="2057954" y="5341680"/>
+            <a:ext cx="8072916" cy="517065"/>
           </a:xfrm>
           <a:prstGeom prst="rect">
             <a:avLst/>
@@ -10607,87 +11380,27 @@
           <a:noFill/>
         </p:spPr>
         <p:txBody>
-          <a:bodyPr wrap="square" lIns="118872" tIns="91440" rIns="118872" bIns="91440" rtlCol="0" anchor="ctr" anchorCtr="0">
+          <a:bodyPr wrap="none" lIns="118872" tIns="91440" rIns="118872" bIns="91440" rtlCol="0" anchor="ctr" anchorCtr="0">
             <a:spAutoFit/>
           </a:bodyPr>
           <a:lstStyle/>
-          <a:p>
-            <a:pPr marL="285750" indent="-285750">
-              <a:lnSpc>
-                <a:spcPct val="90000"/>
-              </a:lnSpc>
-              <a:buFont typeface="Arial" panose="020B0604020202020204" pitchFamily="34" charset="0"/>
-              <a:buChar char="•"/>
-            </a:pPr>
-            <a:r>
-              <a:rPr lang="en-US" sz="2400" dirty="0"/>
-              <a:t>Is understanding always the ultimate goal?</a:t>
-            </a:r>
-          </a:p>
-          <a:p>
-            <a:pPr marL="285750" indent="-285750">
-              <a:lnSpc>
-                <a:spcPct val="90000"/>
-              </a:lnSpc>
-              <a:buFont typeface="Arial" panose="020B0604020202020204" pitchFamily="34" charset="0"/>
-              <a:buChar char="•"/>
-            </a:pPr>
-            <a:r>
-              <a:rPr lang="en-US" sz="2400" dirty="0"/>
-              <a:t>Are there times when mere knowledge is sufficient?</a:t>
-            </a:r>
-          </a:p>
-          <a:p>
-            <a:pPr marL="285750" indent="-285750">
-              <a:lnSpc>
-                <a:spcPct val="90000"/>
-              </a:lnSpc>
-              <a:buFont typeface="Arial" panose="020B0604020202020204" pitchFamily="34" charset="0"/>
-              <a:buChar char="•"/>
-            </a:pPr>
-            <a:endParaRPr lang="en-US" sz="2400" dirty="0"/>
-          </a:p>
-          <a:p>
-            <a:pPr>
-              <a:lnSpc>
-                <a:spcPct val="90000"/>
-              </a:lnSpc>
-            </a:pPr>
-            <a:endParaRPr lang="en-US" sz="2400" dirty="0"/>
-          </a:p>
-          <a:p>
-            <a:pPr algn="ctr">
-              <a:lnSpc>
-                <a:spcPct val="90000"/>
-              </a:lnSpc>
-            </a:pPr>
-            <a:r>
-              <a:rPr lang="en-US" sz="2400" dirty="0"/>
-              <a:t>I don’t need to understand atmospheric science or weather prediction.  I just need basic knowledge to determine if I should take an umbrella with me.</a:t>
-            </a:r>
-          </a:p>
-          <a:p>
-            <a:pPr>
-              <a:lnSpc>
-                <a:spcPct val="90000"/>
-              </a:lnSpc>
-            </a:pPr>
-            <a:endParaRPr lang="en-US" sz="2400" dirty="0"/>
-          </a:p>
           <a:p>
             <a:pPr algn="l">
               <a:lnSpc>
                 <a:spcPct val="90000"/>
               </a:lnSpc>
             </a:pPr>
-            <a:endParaRPr lang="en-US" dirty="0"/>
+            <a:r>
+              <a:rPr lang="en-US" sz="2400" dirty="0"/>
+              <a:t>You can share knowledge, can you share understanding?</a:t>
+            </a:r>
           </a:p>
         </p:txBody>
       </p:sp>
     </p:spTree>
     <p:extLst>
       <p:ext uri="{BB962C8B-B14F-4D97-AF65-F5344CB8AC3E}">
-        <p14:creationId xmlns:p14="http://schemas.microsoft.com/office/powerpoint/2010/main" val="3553658350"/>
+        <p14:creationId xmlns:p14="http://schemas.microsoft.com/office/powerpoint/2010/main" val="2366589001"/>
       </p:ext>
     </p:extLst>
   </p:cSld>
@@ -10719,7 +11432,7 @@
           <p:cNvPr id="2" name="Title 1">
             <a:extLst>
               <a:ext uri="{FF2B5EF4-FFF2-40B4-BE49-F238E27FC236}">
-                <a16:creationId xmlns:a16="http://schemas.microsoft.com/office/drawing/2014/main" id="{4B0C36B9-6C84-3FAA-9EB8-F4892CA417F6}"/>
+                <a16:creationId xmlns:a16="http://schemas.microsoft.com/office/drawing/2014/main" id="{923FF528-4ADA-DA4E-A959-E1EFEAD4DC5A}"/>
               </a:ext>
             </a:extLst>
           </p:cNvPr>
@@ -10737,7 +11450,7 @@
           <a:p>
             <a:r>
               <a:rPr lang="en-US" dirty="0"/>
-              <a:t>Sometimes we just want “good enough”</a:t>
+              <a:t>Obligatory Einstein Quote</a:t>
             </a:r>
             <a:br>
               <a:rPr lang="en-US" dirty="0"/>
@@ -10751,7 +11464,7 @@
           <p:cNvPr id="3" name="Content Placeholder 2">
             <a:extLst>
               <a:ext uri="{FF2B5EF4-FFF2-40B4-BE49-F238E27FC236}">
-                <a16:creationId xmlns:a16="http://schemas.microsoft.com/office/drawing/2014/main" id="{91CD74C3-5BD5-8A90-67BE-B26792277680}"/>
+                <a16:creationId xmlns:a16="http://schemas.microsoft.com/office/drawing/2014/main" id="{B1C4588A-E6F1-E870-2F2D-600085D93BB1}"/>
               </a:ext>
             </a:extLst>
           </p:cNvPr>
@@ -10762,56 +11475,141 @@
             <p:ph idx="1"/>
           </p:nvPr>
         </p:nvSpPr>
-        <p:spPr/>
+        <p:spPr>
+          <a:xfrm>
+            <a:off x="1167009" y="1602040"/>
+            <a:ext cx="10028971" cy="4047778"/>
+          </a:xfrm>
+        </p:spPr>
         <p:txBody>
           <a:bodyPr/>
           <a:lstStyle/>
           <a:p>
-            <a:r>
-              <a:rPr lang="en-US" dirty="0"/>
-              <a:t>Not every developer needs to be an expert in git</a:t>
-            </a:r>
-          </a:p>
-          <a:p>
-            <a:r>
-              <a:rPr lang="en-US" dirty="0"/>
-              <a:t>We want the people designing the rules of how we use and interact through git to have </a:t>
-            </a:r>
-            <a:r>
-              <a:rPr lang="en-US" b="1" dirty="0"/>
-              <a:t>understanding</a:t>
-            </a:r>
-            <a:r>
-              <a:rPr lang="en-US" dirty="0"/>
-              <a:t> so that collaborating in git requires minimal git </a:t>
-            </a:r>
-            <a:r>
-              <a:rPr lang="en-US" b="1" dirty="0"/>
-              <a:t>knowledge</a:t>
-            </a:r>
-          </a:p>
-          <a:p>
-            <a:pPr lvl="1"/>
-            <a:r>
-              <a:rPr lang="en-US" dirty="0"/>
-              <a:t>This workflow should protect code so that we can’t do damage</a:t>
-            </a:r>
-          </a:p>
-          <a:p>
-            <a:pPr lvl="1"/>
-            <a:r>
-              <a:rPr lang="en-US" dirty="0"/>
-              <a:t>Focus on the development/testing and not on git</a:t>
-            </a:r>
-          </a:p>
-          <a:p>
-            <a:pPr lvl="1"/>
-            <a:r>
-              <a:rPr lang="en-US" dirty="0"/>
-              <a:t>Lower barrier for newcomers</a:t>
-            </a:r>
-          </a:p>
-          <a:p>
+            <a:pPr marL="0" indent="0">
+              <a:buNone/>
+            </a:pPr>
+            <a:r>
+              <a:rPr lang="en-US" sz="3600" dirty="0"/>
+              <a:t>“Any fool can know. The point is to understand.” </a:t>
+            </a:r>
+          </a:p>
+          <a:p>
+            <a:pPr marL="0" indent="0">
+              <a:buNone/>
+            </a:pPr>
+            <a:r>
+              <a:rPr lang="en-US" dirty="0"/>
+              <a:t>	- </a:t>
+            </a:r>
+            <a:r>
+              <a:rPr lang="en-US" sz="2800" dirty="0"/>
+              <a:t>Albert Einstein</a:t>
+            </a:r>
+          </a:p>
+          <a:p>
+            <a:pPr marL="0" indent="0">
+              <a:buNone/>
+            </a:pPr>
+            <a:endParaRPr lang="en-US" dirty="0"/>
+          </a:p>
+        </p:txBody>
+      </p:sp>
+      <p:sp>
+        <p:nvSpPr>
+          <p:cNvPr id="4" name="TextBox 3">
+            <a:extLst>
+              <a:ext uri="{FF2B5EF4-FFF2-40B4-BE49-F238E27FC236}">
+                <a16:creationId xmlns:a16="http://schemas.microsoft.com/office/drawing/2014/main" id="{DCA5C706-847F-F402-A9B0-751B368A165A}"/>
+              </a:ext>
+            </a:extLst>
+          </p:cNvPr>
+          <p:cNvSpPr txBox="1"/>
+          <p:nvPr/>
+        </p:nvSpPr>
+        <p:spPr>
+          <a:xfrm>
+            <a:off x="992845" y="3391983"/>
+            <a:ext cx="9707880" cy="3093154"/>
+          </a:xfrm>
+          <a:prstGeom prst="rect">
+            <a:avLst/>
+          </a:prstGeom>
+          <a:noFill/>
+        </p:spPr>
+        <p:txBody>
+          <a:bodyPr wrap="square" lIns="118872" tIns="91440" rIns="118872" bIns="91440" rtlCol="0" anchor="ctr" anchorCtr="0">
+            <a:spAutoFit/>
+          </a:bodyPr>
+          <a:lstStyle/>
+          <a:p>
+            <a:pPr marL="285750" indent="-285750">
+              <a:lnSpc>
+                <a:spcPct val="90000"/>
+              </a:lnSpc>
+              <a:buFont typeface="Arial" panose="020B0604020202020204" pitchFamily="34" charset="0"/>
+              <a:buChar char="•"/>
+            </a:pPr>
+            <a:r>
+              <a:rPr lang="en-US" sz="2400" dirty="0"/>
+              <a:t>Is understanding always the ultimate goal?</a:t>
+            </a:r>
+          </a:p>
+          <a:p>
+            <a:pPr marL="285750" indent="-285750">
+              <a:lnSpc>
+                <a:spcPct val="90000"/>
+              </a:lnSpc>
+              <a:buFont typeface="Arial" panose="020B0604020202020204" pitchFamily="34" charset="0"/>
+              <a:buChar char="•"/>
+            </a:pPr>
+            <a:r>
+              <a:rPr lang="en-US" sz="2400" dirty="0"/>
+              <a:t>Are there times when mere knowledge is sufficient?</a:t>
+            </a:r>
+          </a:p>
+          <a:p>
+            <a:pPr marL="285750" indent="-285750">
+              <a:lnSpc>
+                <a:spcPct val="90000"/>
+              </a:lnSpc>
+              <a:buFont typeface="Arial" panose="020B0604020202020204" pitchFamily="34" charset="0"/>
+              <a:buChar char="•"/>
+            </a:pPr>
+            <a:endParaRPr lang="en-US" sz="2400" dirty="0"/>
+          </a:p>
+          <a:p>
+            <a:pPr>
+              <a:lnSpc>
+                <a:spcPct val="90000"/>
+              </a:lnSpc>
+            </a:pPr>
+            <a:endParaRPr lang="en-US" sz="2400" dirty="0"/>
+          </a:p>
+          <a:p>
+            <a:pPr algn="ctr">
+              <a:lnSpc>
+                <a:spcPct val="90000"/>
+              </a:lnSpc>
+            </a:pPr>
+            <a:r>
+              <a:rPr lang="en-US" sz="2400" dirty="0"/>
+              <a:t>I don’t need to understand atmospheric science or weather prediction.  I just need basic knowledge to determine if I should take an umbrella with me.</a:t>
+            </a:r>
+          </a:p>
+          <a:p>
+            <a:pPr>
+              <a:lnSpc>
+                <a:spcPct val="90000"/>
+              </a:lnSpc>
+            </a:pPr>
+            <a:endParaRPr lang="en-US" sz="2400" dirty="0"/>
+          </a:p>
+          <a:p>
+            <a:pPr algn="l">
+              <a:lnSpc>
+                <a:spcPct val="90000"/>
+              </a:lnSpc>
+            </a:pPr>
             <a:endParaRPr lang="en-US" dirty="0"/>
           </a:p>
         </p:txBody>
@@ -10819,7 +11617,7 @@
     </p:spTree>
     <p:extLst>
       <p:ext uri="{BB962C8B-B14F-4D97-AF65-F5344CB8AC3E}">
-        <p14:creationId xmlns:p14="http://schemas.microsoft.com/office/powerpoint/2010/main" val="2408602807"/>
+        <p14:creationId xmlns:p14="http://schemas.microsoft.com/office/powerpoint/2010/main" val="3553658350"/>
       </p:ext>
     </p:extLst>
   </p:cSld>

</xml_diff>

<commit_message>
(Issue #133) Last tweaks for the day.
</commit_message>
<xml_diff>
--- a/lab-notebooks.pptx
+++ b/lab-notebooks.pptx
@@ -788,6 +788,41 @@
             <a:endParaRPr lang="en-US" dirty="0"/>
           </a:p>
           <a:p>
+            <a:pPr marL="0" marR="0" lvl="0" indent="0" algn="l" defTabSz="914400" rtl="0" eaLnBrk="1" fontAlgn="auto" latinLnBrk="0" hangingPunct="1">
+              <a:lnSpc>
+                <a:spcPct val="100000"/>
+              </a:lnSpc>
+              <a:spcBef>
+                <a:spcPts val="0"/>
+              </a:spcBef>
+              <a:spcAft>
+                <a:spcPts val="0"/>
+              </a:spcAft>
+              <a:buClrTx/>
+              <a:buSzTx/>
+              <a:buFontTx/>
+              <a:buNone/>
+              <a:tabLst/>
+              <a:defRPr/>
+            </a:pPr>
+            <a:r>
+              <a:rPr lang="en-US" sz="1200" kern="1200" dirty="0">
+                <a:solidFill>
+                  <a:schemeClr val="tx1"/>
+                </a:solidFill>
+                <a:effectLst/>
+                <a:latin typeface="+mn-lt"/>
+                <a:ea typeface="+mn-ea"/>
+                <a:cs typeface="+mn-cs"/>
+              </a:rPr>
+              <a:t>This talk has grown from many interesting conversations that I have had with a variety of different computational sciences.  This includes different disciplines and different experience levels.  When I have these conversations, all parties generally tend to learn something.  This module will continue along those lines.  I am not here to convince anyone of anything.  I am not here to preach.  I am just here to present a novel experience. </a:t>
+            </a:r>
+            <a:endParaRPr lang="en-US" dirty="0"/>
+          </a:p>
+          <a:p>
+            <a:endParaRPr lang="en-US" dirty="0"/>
+          </a:p>
+          <a:p>
             <a:r>
               <a:rPr lang="en-US" dirty="0"/>
               <a:t>If you look at the content of this </a:t>
@@ -905,7 +940,7 @@
           <a:p>
             <a:r>
               <a:rPr lang="en-US" dirty="0"/>
-              <a:t>I believe that this is also known as debriefing.</a:t>
+              <a:t>Really most any project benefits from some sort of knowledge management.  </a:t>
             </a:r>
           </a:p>
           <a:p>
@@ -914,7 +949,16 @@
           <a:p>
             <a:r>
               <a:rPr lang="en-US" dirty="0"/>
-              <a:t>When we go through experiences we can grow and improve.  But processes exist to help us maximize that growth and improvement.</a:t>
+              <a:t>The key is first to recognize when knowledge is generated.  Once I became aware of this classification and began to think in terms of it, it became easier for me to recognize knowledge generation.  It’s as if a bell goes off in my brain that indicates we need to record what was just said.</a:t>
+            </a:r>
+          </a:p>
+          <a:p>
+            <a:endParaRPr lang="en-US" dirty="0"/>
+          </a:p>
+          <a:p>
+            <a:r>
+              <a:rPr lang="en-US" dirty="0"/>
+              <a:t>The answer to the question is ”clearly no”,  We need to communicate to our future selves for the sake of productivity and reproducible research.</a:t>
             </a:r>
           </a:p>
         </p:txBody>
@@ -936,7 +980,7 @@
           <a:p>
             <a:fld id="{54E672D7-8E2D-4611-973D-F4591A707C34}" type="slidenum">
               <a:rPr lang="en-US" smtClean="0"/>
-              <a:t>12</a:t>
+              <a:t>11</a:t>
             </a:fld>
             <a:endParaRPr lang="en-US"/>
           </a:p>
@@ -945,7 +989,7 @@
     </p:spTree>
     <p:extLst>
       <p:ext uri="{BB962C8B-B14F-4D97-AF65-F5344CB8AC3E}">
-        <p14:creationId xmlns:p14="http://schemas.microsoft.com/office/powerpoint/2010/main" val="3152359200"/>
+        <p14:creationId xmlns:p14="http://schemas.microsoft.com/office/powerpoint/2010/main" val="1399277158"/>
       </p:ext>
     </p:extLst>
   </p:cSld>
@@ -1001,7 +1045,16 @@
           <a:p>
             <a:r>
               <a:rPr lang="en-US" dirty="0"/>
-              <a:t>Not all documents are alike.</a:t>
+              <a:t>I believe that this is also known as debriefing.</a:t>
+            </a:r>
+          </a:p>
+          <a:p>
+            <a:endParaRPr lang="en-US" dirty="0"/>
+          </a:p>
+          <a:p>
+            <a:r>
+              <a:rPr lang="en-US" dirty="0"/>
+              <a:t>When we go through experiences we can grow and improve.  But processes exist to help us maximize that growth and improvement.</a:t>
             </a:r>
           </a:p>
         </p:txBody>
@@ -1023,7 +1076,7 @@
           <a:p>
             <a:fld id="{54E672D7-8E2D-4611-973D-F4591A707C34}" type="slidenum">
               <a:rPr lang="en-US" smtClean="0"/>
-              <a:t>13</a:t>
+              <a:t>12</a:t>
             </a:fld>
             <a:endParaRPr lang="en-US"/>
           </a:p>
@@ -1032,7 +1085,7 @@
     </p:spTree>
     <p:extLst>
       <p:ext uri="{BB962C8B-B14F-4D97-AF65-F5344CB8AC3E}">
-        <p14:creationId xmlns:p14="http://schemas.microsoft.com/office/powerpoint/2010/main" val="4157260062"/>
+        <p14:creationId xmlns:p14="http://schemas.microsoft.com/office/powerpoint/2010/main" val="3152359200"/>
       </p:ext>
     </p:extLst>
   </p:cSld>
@@ -1088,7 +1141,7 @@
           <a:p>
             <a:r>
               <a:rPr lang="en-US" dirty="0"/>
-              <a:t>Automated is in quotes because the TIOs and astronomers still needed to input information into a system.  But there was a process for them to input such data into tools that aggregated their input with other notes.</a:t>
+              <a:t>Not all documents are alike.</a:t>
             </a:r>
           </a:p>
         </p:txBody>
@@ -1110,7 +1163,7 @@
           <a:p>
             <a:fld id="{54E672D7-8E2D-4611-973D-F4591A707C34}" type="slidenum">
               <a:rPr lang="en-US" smtClean="0"/>
-              <a:t>14</a:t>
+              <a:t>13</a:t>
             </a:fld>
             <a:endParaRPr lang="en-US"/>
           </a:p>
@@ -1119,7 +1172,7 @@
     </p:spTree>
     <p:extLst>
       <p:ext uri="{BB962C8B-B14F-4D97-AF65-F5344CB8AC3E}">
-        <p14:creationId xmlns:p14="http://schemas.microsoft.com/office/powerpoint/2010/main" val="2141150432"/>
+        <p14:creationId xmlns:p14="http://schemas.microsoft.com/office/powerpoint/2010/main" val="4157260062"/>
       </p:ext>
     </p:extLst>
   </p:cSld>
@@ -1175,124 +1228,7 @@
           <a:p>
             <a:r>
               <a:rPr lang="en-US" dirty="0"/>
-              <a:t>Reasons why the bad is indeed bad.</a:t>
-            </a:r>
-          </a:p>
-          <a:p>
-            <a:pPr marL="171450" indent="-171450">
-              <a:buFont typeface="Arial" panose="020B0604020202020204" pitchFamily="34" charset="0"/>
-              <a:buChar char="•"/>
-            </a:pPr>
-            <a:r>
-              <a:rPr lang="en-US" dirty="0"/>
-              <a:t>Not at all comprehensive.</a:t>
-            </a:r>
-          </a:p>
-          <a:p>
-            <a:pPr marL="171450" indent="-171450">
-              <a:buFont typeface="Arial" panose="020B0604020202020204" pitchFamily="34" charset="0"/>
-              <a:buChar char="•"/>
-            </a:pPr>
-            <a:r>
-              <a:rPr lang="en-US" dirty="0"/>
-              <a:t>Don’t explain what the bug is.</a:t>
-            </a:r>
-          </a:p>
-          <a:p>
-            <a:pPr marL="171450" indent="-171450">
-              <a:buFont typeface="Arial" panose="020B0604020202020204" pitchFamily="34" charset="0"/>
-              <a:buChar char="•"/>
-            </a:pPr>
-            <a:r>
-              <a:rPr lang="en-US" dirty="0"/>
-              <a:t>Didn’t explain what library nor what the issue was with the bug.</a:t>
-            </a:r>
-          </a:p>
-          <a:p>
-            <a:pPr marL="171450" indent="-171450">
-              <a:buFont typeface="Arial" panose="020B0604020202020204" pitchFamily="34" charset="0"/>
-              <a:buChar char="•"/>
-            </a:pPr>
-            <a:r>
-              <a:rPr lang="en-US" dirty="0"/>
-              <a:t>Didn’t explain if tests were failing before and if so, which and how.</a:t>
-            </a:r>
-          </a:p>
-          <a:p>
-            <a:pPr marL="171450" indent="-171450">
-              <a:buFont typeface="Arial" panose="020B0604020202020204" pitchFamily="34" charset="0"/>
-              <a:buChar char="•"/>
-            </a:pPr>
-            <a:r>
-              <a:rPr lang="en-US" dirty="0"/>
-              <a:t>It was a lot of work.  Some details about how the debugging progressed my be useful for others or for future me.  If we had done this well, such notes might serve as a procedure for finding similar bugs in the future.</a:t>
-            </a:r>
-          </a:p>
-          <a:p>
-            <a:pPr marL="171450" indent="-171450">
-              <a:buFont typeface="Arial" panose="020B0604020202020204" pitchFamily="34" charset="0"/>
-              <a:buChar char="•"/>
-            </a:pPr>
-            <a:endParaRPr lang="en-US" dirty="0"/>
-          </a:p>
-          <a:p>
-            <a:pPr marL="171450" indent="-171450">
-              <a:buFont typeface="Arial" panose="020B0604020202020204" pitchFamily="34" charset="0"/>
-              <a:buChar char="•"/>
-            </a:pPr>
-            <a:r>
-              <a:rPr lang="en-US" dirty="0"/>
-              <a:t>Doesn’t need to be exhaustive.  I can just leave myself some bread crumbs with the expectation that writing notes is easier, but recreating notes could be time consuming should I ever need to do so.</a:t>
-            </a:r>
-          </a:p>
-          <a:p>
-            <a:pPr marL="171450" indent="-171450">
-              <a:buFont typeface="Arial" panose="020B0604020202020204" pitchFamily="34" charset="0"/>
-              <a:buChar char="•"/>
-            </a:pPr>
-            <a:r>
-              <a:rPr lang="en-US" dirty="0"/>
-              <a:t>Are the bread crumbs enough?  Can they determine what flags are implied by debug version?  What about the full SW stack?  What about the SW stack for the analysis?  Is such detail needed for this stage of work and if not, is that filtering?</a:t>
-            </a:r>
-          </a:p>
-          <a:p>
-            <a:pPr marL="171450" indent="-171450">
-              <a:buFont typeface="Arial" panose="020B0604020202020204" pitchFamily="34" charset="0"/>
-              <a:buChar char="•"/>
-            </a:pPr>
-            <a:r>
-              <a:rPr lang="en-US" dirty="0"/>
-              <a:t>Note that the build logs are acting as lab notes.</a:t>
-            </a:r>
-          </a:p>
-          <a:p>
-            <a:pPr marL="171450" indent="-171450">
-              <a:buFont typeface="Arial" panose="020B0604020202020204" pitchFamily="34" charset="0"/>
-              <a:buChar char="•"/>
-            </a:pPr>
-            <a:r>
-              <a:rPr lang="en-US" dirty="0"/>
-              <a:t>Note also, that we could have included git information in the build logs to make things simpler.</a:t>
-            </a:r>
-          </a:p>
-          <a:p>
-            <a:pPr marL="171450" indent="-171450">
-              <a:buFont typeface="Arial" panose="020B0604020202020204" pitchFamily="34" charset="0"/>
-              <a:buChar char="•"/>
-            </a:pPr>
-            <a:r>
-              <a:rPr lang="en-US" dirty="0"/>
-              <a:t>We likely should have included a graphic that points out missing peak.  Annotating the graphic with what was expected would be nice.</a:t>
-            </a:r>
-          </a:p>
-          <a:p>
-            <a:pPr marL="171450" indent="-171450">
-              <a:buFont typeface="Arial" panose="020B0604020202020204" pitchFamily="34" charset="0"/>
-              <a:buChar char="•"/>
-            </a:pPr>
-            <a:r>
-              <a:rPr lang="en-US" dirty="0"/>
-              <a:t>The better example is also not great.</a:t>
+              <a:t>Automated is in quotes because the TIOs and astronomers still needed to input information into a system.  But there was a process for them to input such data into tools that aggregated their input with other notes.</a:t>
             </a:r>
           </a:p>
         </p:txBody>
@@ -1314,7 +1250,7 @@
           <a:p>
             <a:fld id="{54E672D7-8E2D-4611-973D-F4591A707C34}" type="slidenum">
               <a:rPr lang="en-US" smtClean="0"/>
-              <a:t>15</a:t>
+              <a:t>14</a:t>
             </a:fld>
             <a:endParaRPr lang="en-US"/>
           </a:p>
@@ -1323,7 +1259,7 @@
     </p:spTree>
     <p:extLst>
       <p:ext uri="{BB962C8B-B14F-4D97-AF65-F5344CB8AC3E}">
-        <p14:creationId xmlns:p14="http://schemas.microsoft.com/office/powerpoint/2010/main" val="1636867555"/>
+        <p14:creationId xmlns:p14="http://schemas.microsoft.com/office/powerpoint/2010/main" val="2141150432"/>
       </p:ext>
     </p:extLst>
   </p:cSld>
@@ -1379,16 +1315,124 @@
           <a:p>
             <a:r>
               <a:rPr lang="en-US" dirty="0"/>
-              <a:t>The filtered lab notebook is from the instrument CRIRES+.  You have a team that has worked on the science verification and interfacing with public (user manual, tools), a team that works on data analysis pipelines (pipeline changes), a distributed team that works on the hardware.  We can imagine that each team maintained a true lab notebook for their work.  These were then filtered and merged for the consumption by public.  </a:t>
-            </a:r>
-          </a:p>
-          <a:p>
+              <a:t>Reasons why the bad is indeed bad.</a:t>
+            </a:r>
+          </a:p>
+          <a:p>
+            <a:pPr marL="171450" indent="-171450">
+              <a:buFont typeface="Arial" panose="020B0604020202020204" pitchFamily="34" charset="0"/>
+              <a:buChar char="•"/>
+            </a:pPr>
+            <a:r>
+              <a:rPr lang="en-US" dirty="0"/>
+              <a:t>Not at all comprehensive.</a:t>
+            </a:r>
+          </a:p>
+          <a:p>
+            <a:pPr marL="171450" indent="-171450">
+              <a:buFont typeface="Arial" panose="020B0604020202020204" pitchFamily="34" charset="0"/>
+              <a:buChar char="•"/>
+            </a:pPr>
+            <a:r>
+              <a:rPr lang="en-US" dirty="0"/>
+              <a:t>Don’t explain what the bug is.</a:t>
+            </a:r>
+          </a:p>
+          <a:p>
+            <a:pPr marL="171450" indent="-171450">
+              <a:buFont typeface="Arial" panose="020B0604020202020204" pitchFamily="34" charset="0"/>
+              <a:buChar char="•"/>
+            </a:pPr>
+            <a:r>
+              <a:rPr lang="en-US" dirty="0"/>
+              <a:t>Didn’t explain what library nor what the issue was with the bug.</a:t>
+            </a:r>
+          </a:p>
+          <a:p>
+            <a:pPr marL="171450" indent="-171450">
+              <a:buFont typeface="Arial" panose="020B0604020202020204" pitchFamily="34" charset="0"/>
+              <a:buChar char="•"/>
+            </a:pPr>
+            <a:r>
+              <a:rPr lang="en-US" dirty="0"/>
+              <a:t>Didn’t explain if tests were failing before and if so, which and how.</a:t>
+            </a:r>
+          </a:p>
+          <a:p>
+            <a:pPr marL="171450" indent="-171450">
+              <a:buFont typeface="Arial" panose="020B0604020202020204" pitchFamily="34" charset="0"/>
+              <a:buChar char="•"/>
+            </a:pPr>
+            <a:r>
+              <a:rPr lang="en-US" dirty="0"/>
+              <a:t>It was a lot of work.  Some details about how the debugging progressed my be useful for others or for future me.  If we had done this well, such notes might serve as a procedure for finding similar bugs in the future.</a:t>
+            </a:r>
+          </a:p>
+          <a:p>
+            <a:pPr marL="171450" indent="-171450">
+              <a:buFont typeface="Arial" panose="020B0604020202020204" pitchFamily="34" charset="0"/>
+              <a:buChar char="•"/>
+            </a:pPr>
             <a:endParaRPr lang="en-US" dirty="0"/>
           </a:p>
           <a:p>
-            <a:r>
-              <a:rPr lang="en-US" dirty="0"/>
-              <a:t>The filtering should not be too strong as one cannot know what details are necessary for all the public scientists to do their work.</a:t>
+            <a:pPr marL="171450" indent="-171450">
+              <a:buFont typeface="Arial" panose="020B0604020202020204" pitchFamily="34" charset="0"/>
+              <a:buChar char="•"/>
+            </a:pPr>
+            <a:r>
+              <a:rPr lang="en-US" dirty="0"/>
+              <a:t>Doesn’t need to be exhaustive.  I can just leave myself some bread crumbs with the expectation that writing notes is easier, but recreating notes could be time consuming should I ever need to do so.</a:t>
+            </a:r>
+          </a:p>
+          <a:p>
+            <a:pPr marL="171450" indent="-171450">
+              <a:buFont typeface="Arial" panose="020B0604020202020204" pitchFamily="34" charset="0"/>
+              <a:buChar char="•"/>
+            </a:pPr>
+            <a:r>
+              <a:rPr lang="en-US" dirty="0"/>
+              <a:t>Are the bread crumbs enough?  Can they determine what flags are implied by debug version?  What about the full SW stack?  What about the SW stack for the analysis?  Is such detail needed for this stage of work and if not, is that filtering?</a:t>
+            </a:r>
+          </a:p>
+          <a:p>
+            <a:pPr marL="171450" indent="-171450">
+              <a:buFont typeface="Arial" panose="020B0604020202020204" pitchFamily="34" charset="0"/>
+              <a:buChar char="•"/>
+            </a:pPr>
+            <a:r>
+              <a:rPr lang="en-US" dirty="0"/>
+              <a:t>Note that the build logs are acting as lab notes.</a:t>
+            </a:r>
+          </a:p>
+          <a:p>
+            <a:pPr marL="171450" indent="-171450">
+              <a:buFont typeface="Arial" panose="020B0604020202020204" pitchFamily="34" charset="0"/>
+              <a:buChar char="•"/>
+            </a:pPr>
+            <a:r>
+              <a:rPr lang="en-US" dirty="0"/>
+              <a:t>Note also, that we could have included git information in the build logs to make things simpler.</a:t>
+            </a:r>
+          </a:p>
+          <a:p>
+            <a:pPr marL="171450" indent="-171450">
+              <a:buFont typeface="Arial" panose="020B0604020202020204" pitchFamily="34" charset="0"/>
+              <a:buChar char="•"/>
+            </a:pPr>
+            <a:r>
+              <a:rPr lang="en-US" dirty="0"/>
+              <a:t>We likely should have included a graphic that points out missing peak.  Annotating the graphic with what was expected would be nice.</a:t>
+            </a:r>
+          </a:p>
+          <a:p>
+            <a:pPr marL="171450" indent="-171450">
+              <a:buFont typeface="Arial" panose="020B0604020202020204" pitchFamily="34" charset="0"/>
+              <a:buChar char="•"/>
+            </a:pPr>
+            <a:r>
+              <a:rPr lang="en-US" dirty="0"/>
+              <a:t>The better example is also not great.</a:t>
             </a:r>
           </a:p>
         </p:txBody>
@@ -1410,7 +1454,7 @@
           <a:p>
             <a:fld id="{54E672D7-8E2D-4611-973D-F4591A707C34}" type="slidenum">
               <a:rPr lang="en-US" smtClean="0"/>
-              <a:t>16</a:t>
+              <a:t>15</a:t>
             </a:fld>
             <a:endParaRPr lang="en-US"/>
           </a:p>
@@ -1419,7 +1463,7 @@
     </p:spTree>
     <p:extLst>
       <p:ext uri="{BB962C8B-B14F-4D97-AF65-F5344CB8AC3E}">
-        <p14:creationId xmlns:p14="http://schemas.microsoft.com/office/powerpoint/2010/main" val="2213378732"/>
+        <p14:creationId xmlns:p14="http://schemas.microsoft.com/office/powerpoint/2010/main" val="1636867555"/>
       </p:ext>
     </p:extLst>
   </p:cSld>
@@ -1475,7 +1519,7 @@
           <a:p>
             <a:r>
               <a:rPr lang="en-US" dirty="0"/>
-              <a:t>Ask if any of the attendees ever sensed in their gut that things were not being done sufficiently cleanly or well.  Does this notion of inventing techniques resonate with them?  Have you reinvented the wheel?</a:t>
+              <a:t>The filtered lab notebook is from the instrument CRIRES+.  You have a team that has worked on the science verification and interfacing with public (user manual, tools), a team that works on data analysis pipelines (pipeline changes), a distributed team that works on the hardware.  We can imagine that each team maintained a true lab notebook for their work.  These were then filtered and merged for the consumption by public.  </a:t>
             </a:r>
           </a:p>
           <a:p>
@@ -1484,7 +1528,7 @@
           <a:p>
             <a:r>
               <a:rPr lang="en-US" dirty="0"/>
-              <a:t>Is this surprising to anyone?  Does anyone already use something akin to a lab notebook?</a:t>
+              <a:t>The filtering should not be too strong as one cannot know what details are necessary for all the public scientists to do their work.</a:t>
             </a:r>
           </a:p>
         </p:txBody>
@@ -1506,7 +1550,7 @@
           <a:p>
             <a:fld id="{54E672D7-8E2D-4611-973D-F4591A707C34}" type="slidenum">
               <a:rPr lang="en-US" smtClean="0"/>
-              <a:t>18</a:t>
+              <a:t>16</a:t>
             </a:fld>
             <a:endParaRPr lang="en-US"/>
           </a:p>
@@ -1515,7 +1559,7 @@
     </p:spTree>
     <p:extLst>
       <p:ext uri="{BB962C8B-B14F-4D97-AF65-F5344CB8AC3E}">
-        <p14:creationId xmlns:p14="http://schemas.microsoft.com/office/powerpoint/2010/main" val="3785804979"/>
+        <p14:creationId xmlns:p14="http://schemas.microsoft.com/office/powerpoint/2010/main" val="2213378732"/>
       </p:ext>
     </p:extLst>
   </p:cSld>
@@ -1571,7 +1615,16 @@
           <a:p>
             <a:r>
               <a:rPr lang="en-US" dirty="0"/>
-              <a:t>Mention that the next three slides are a review of what is done and what could be done.  The point is to start to understand what we want and what we don’t want.  It’s also to understand some of the difficulties that we face.</a:t>
+              <a:t>Ask if any of the attendees ever sensed in their gut that things were not being done sufficiently cleanly or well.  Does this notion of inventing techniques resonate with them?  Have you reinvented the wheel?</a:t>
+            </a:r>
+          </a:p>
+          <a:p>
+            <a:endParaRPr lang="en-US" dirty="0"/>
+          </a:p>
+          <a:p>
+            <a:r>
+              <a:rPr lang="en-US" dirty="0"/>
+              <a:t>Is this surprising to anyone?  Does anyone already use something akin to a lab notebook?</a:t>
             </a:r>
           </a:p>
         </p:txBody>
@@ -1593,7 +1646,7 @@
           <a:p>
             <a:fld id="{54E672D7-8E2D-4611-973D-F4591A707C34}" type="slidenum">
               <a:rPr lang="en-US" smtClean="0"/>
-              <a:t>19</a:t>
+              <a:t>18</a:t>
             </a:fld>
             <a:endParaRPr lang="en-US"/>
           </a:p>
@@ -1602,7 +1655,7 @@
     </p:spTree>
     <p:extLst>
       <p:ext uri="{BB962C8B-B14F-4D97-AF65-F5344CB8AC3E}">
-        <p14:creationId xmlns:p14="http://schemas.microsoft.com/office/powerpoint/2010/main" val="2021161080"/>
+        <p14:creationId xmlns:p14="http://schemas.microsoft.com/office/powerpoint/2010/main" val="3785804979"/>
       </p:ext>
     </p:extLst>
   </p:cSld>
@@ -1658,6 +1711,93 @@
           <a:p>
             <a:r>
               <a:rPr lang="en-US" dirty="0"/>
+              <a:t>Mention that the next three slides are a review of what is done and what could be done.  The point is to start to understand what we want and what we don’t want.  It’s also to understand some of the difficulties that we face.</a:t>
+            </a:r>
+          </a:p>
+        </p:txBody>
+      </p:sp>
+      <p:sp>
+        <p:nvSpPr>
+          <p:cNvPr id="4" name="Slide Number Placeholder 3"/>
+          <p:cNvSpPr>
+            <a:spLocks noGrp="1"/>
+          </p:cNvSpPr>
+          <p:nvPr>
+            <p:ph type="sldNum" sz="quarter" idx="5"/>
+          </p:nvPr>
+        </p:nvSpPr>
+        <p:spPr/>
+        <p:txBody>
+          <a:bodyPr/>
+          <a:lstStyle/>
+          <a:p>
+            <a:fld id="{54E672D7-8E2D-4611-973D-F4591A707C34}" type="slidenum">
+              <a:rPr lang="en-US" smtClean="0"/>
+              <a:t>19</a:t>
+            </a:fld>
+            <a:endParaRPr lang="en-US"/>
+          </a:p>
+        </p:txBody>
+      </p:sp>
+    </p:spTree>
+    <p:extLst>
+      <p:ext uri="{BB962C8B-B14F-4D97-AF65-F5344CB8AC3E}">
+        <p14:creationId xmlns:p14="http://schemas.microsoft.com/office/powerpoint/2010/main" val="2021161080"/>
+      </p:ext>
+    </p:extLst>
+  </p:cSld>
+  <p:clrMapOvr>
+    <a:masterClrMapping/>
+  </p:clrMapOvr>
+</p:notes>
+</file>
+
+<file path=ppt/notesSlides/notesSlide18.xml><?xml version="1.0" encoding="utf-8"?>
+<p:notes xmlns:a="http://schemas.openxmlformats.org/drawingml/2006/main" xmlns:r="http://schemas.openxmlformats.org/officeDocument/2006/relationships" xmlns:p="http://schemas.openxmlformats.org/presentationml/2006/main">
+  <p:cSld>
+    <p:spTree>
+      <p:nvGrpSpPr>
+        <p:cNvPr id="1" name=""/>
+        <p:cNvGrpSpPr/>
+        <p:nvPr/>
+      </p:nvGrpSpPr>
+      <p:grpSpPr>
+        <a:xfrm>
+          <a:off x="0" y="0"/>
+          <a:ext cx="0" cy="0"/>
+          <a:chOff x="0" y="0"/>
+          <a:chExt cx="0" cy="0"/>
+        </a:xfrm>
+      </p:grpSpPr>
+      <p:sp>
+        <p:nvSpPr>
+          <p:cNvPr id="2" name="Slide Image Placeholder 1"/>
+          <p:cNvSpPr>
+            <a:spLocks noGrp="1" noRot="1" noChangeAspect="1"/>
+          </p:cNvSpPr>
+          <p:nvPr>
+            <p:ph type="sldImg"/>
+          </p:nvPr>
+        </p:nvSpPr>
+        <p:spPr/>
+      </p:sp>
+      <p:sp>
+        <p:nvSpPr>
+          <p:cNvPr id="3" name="Notes Placeholder 2"/>
+          <p:cNvSpPr>
+            <a:spLocks noGrp="1"/>
+          </p:cNvSpPr>
+          <p:nvPr>
+            <p:ph type="body" idx="1"/>
+          </p:nvPr>
+        </p:nvSpPr>
+        <p:spPr/>
+        <p:txBody>
+          <a:bodyPr/>
+          <a:lstStyle/>
+          <a:p>
+            <a:r>
+              <a:rPr lang="en-US" dirty="0"/>
               <a:t>I have tried playing around with multiple different non-ELN tools to adapt them to my needs.  To date, Microsoft OneNote was the closest to what I expect and need, but still fell short.</a:t>
             </a:r>
           </a:p>
@@ -1708,7 +1848,7 @@
 </p:notes>
 </file>
 
-<file path=ppt/notesSlides/notesSlide18.xml><?xml version="1.0" encoding="utf-8"?>
+<file path=ppt/notesSlides/notesSlide19.xml><?xml version="1.0" encoding="utf-8"?>
 <p:notes xmlns:a="http://schemas.openxmlformats.org/drawingml/2006/main" xmlns:r="http://schemas.openxmlformats.org/officeDocument/2006/relationships" xmlns:p="http://schemas.openxmlformats.org/presentationml/2006/main">
   <p:cSld>
     <p:spTree>
@@ -2012,7 +2152,7 @@
           <a:p>
             <a:r>
               <a:rPr lang="en-US" dirty="0"/>
-              <a:t>Many people refer to this as “software engineering”.  I whole-heartedly disagree with this.  I understand this work to be foundational, bedrock science that is required to do high-quality trustworthy high-level science.  But, we need not reinvent the wheel.  We can learn from the SW </a:t>
+              <a:t>Many people refer to software practices as “software engineering”.  I whole-heartedly disagree with this.  I understand this work to be foundational, bedrock science that is required to do high-quality trustworthy high-level science.  But, we need not reinvent the wheel.  We can learn from the SW </a:t>
             </a:r>
             <a:r>
               <a:rPr lang="en-US" dirty="0" err="1"/>
@@ -2052,6 +2192,90 @@
     <p:extLst>
       <p:ext uri="{BB962C8B-B14F-4D97-AF65-F5344CB8AC3E}">
         <p14:creationId xmlns:p14="http://schemas.microsoft.com/office/powerpoint/2010/main" val="1936705258"/>
+      </p:ext>
+    </p:extLst>
+  </p:cSld>
+  <p:clrMapOvr>
+    <a:masterClrMapping/>
+  </p:clrMapOvr>
+</p:notes>
+</file>
+
+<file path=ppt/notesSlides/notesSlide20.xml><?xml version="1.0" encoding="utf-8"?>
+<p:notes xmlns:a="http://schemas.openxmlformats.org/drawingml/2006/main" xmlns:r="http://schemas.openxmlformats.org/officeDocument/2006/relationships" xmlns:p="http://schemas.openxmlformats.org/presentationml/2006/main">
+  <p:cSld>
+    <p:spTree>
+      <p:nvGrpSpPr>
+        <p:cNvPr id="1" name=""/>
+        <p:cNvGrpSpPr/>
+        <p:nvPr/>
+      </p:nvGrpSpPr>
+      <p:grpSpPr>
+        <a:xfrm>
+          <a:off x="0" y="0"/>
+          <a:ext cx="0" cy="0"/>
+          <a:chOff x="0" y="0"/>
+          <a:chExt cx="0" cy="0"/>
+        </a:xfrm>
+      </p:grpSpPr>
+      <p:sp>
+        <p:nvSpPr>
+          <p:cNvPr id="2" name="Slide Image Placeholder 1"/>
+          <p:cNvSpPr>
+            <a:spLocks noGrp="1" noRot="1" noChangeAspect="1"/>
+          </p:cNvSpPr>
+          <p:nvPr>
+            <p:ph type="sldImg"/>
+          </p:nvPr>
+        </p:nvSpPr>
+        <p:spPr/>
+      </p:sp>
+      <p:sp>
+        <p:nvSpPr>
+          <p:cNvPr id="3" name="Notes Placeholder 2"/>
+          <p:cNvSpPr>
+            <a:spLocks noGrp="1"/>
+          </p:cNvSpPr>
+          <p:nvPr>
+            <p:ph type="body" idx="1"/>
+          </p:nvPr>
+        </p:nvSpPr>
+        <p:spPr/>
+        <p:txBody>
+          <a:bodyPr/>
+          <a:lstStyle/>
+          <a:p>
+            <a:endParaRPr lang="en-US" dirty="0"/>
+          </a:p>
+        </p:txBody>
+      </p:sp>
+      <p:sp>
+        <p:nvSpPr>
+          <p:cNvPr id="4" name="Slide Number Placeholder 3"/>
+          <p:cNvSpPr>
+            <a:spLocks noGrp="1"/>
+          </p:cNvSpPr>
+          <p:nvPr>
+            <p:ph type="sldNum" sz="quarter" idx="5"/>
+          </p:nvPr>
+        </p:nvSpPr>
+        <p:spPr/>
+        <p:txBody>
+          <a:bodyPr/>
+          <a:lstStyle/>
+          <a:p>
+            <a:fld id="{54E672D7-8E2D-4611-973D-F4591A707C34}" type="slidenum">
+              <a:rPr lang="en-US" smtClean="0"/>
+              <a:t>23</a:t>
+            </a:fld>
+            <a:endParaRPr lang="en-US"/>
+          </a:p>
+        </p:txBody>
+      </p:sp>
+    </p:spTree>
+    <p:extLst>
+      <p:ext uri="{BB962C8B-B14F-4D97-AF65-F5344CB8AC3E}">
+        <p14:creationId xmlns:p14="http://schemas.microsoft.com/office/powerpoint/2010/main" val="2226181781"/>
       </p:ext>
     </p:extLst>
   </p:cSld>
@@ -2323,53 +2547,18 @@
           <a:bodyPr/>
           <a:lstStyle/>
           <a:p>
-            <a:pPr marL="0" marR="0" lvl="0" indent="0" algn="l" defTabSz="914400" rtl="0" eaLnBrk="1" fontAlgn="auto" latinLnBrk="0" hangingPunct="1">
-              <a:lnSpc>
-                <a:spcPct val="100000"/>
-              </a:lnSpc>
-              <a:spcBef>
-                <a:spcPts val="0"/>
-              </a:spcBef>
-              <a:spcAft>
-                <a:spcPts val="0"/>
-              </a:spcAft>
-              <a:buClrTx/>
-              <a:buSzTx/>
-              <a:buFontTx/>
-              <a:buNone/>
-              <a:tabLst/>
-              <a:defRPr/>
-            </a:pPr>
-            <a:r>
-              <a:rPr lang="en-US" sz="1200" kern="1200" dirty="0">
-                <a:solidFill>
-                  <a:schemeClr val="tx1"/>
-                </a:solidFill>
-                <a:effectLst/>
-                <a:latin typeface="+mn-lt"/>
-                <a:ea typeface="+mn-ea"/>
-                <a:cs typeface="+mn-cs"/>
-              </a:rPr>
-              <a:t>This talk has grown from many interesting conversations that I have had with a variety of different computational sciences.  This includes different disciplines and different experience levels.  When I have these conversations, all parties generally tend to learn something.  This module will continue along those lines.  I am not here to convince anyone of anything.  I am not here to preach.  I am just here to present a novel experience.  Please ask me questions.  I will be direct and state strong opinions.  Therefore, please be direct and push back on some of these.</a:t>
-            </a:r>
+            <a:r>
+              <a:rPr lang="en-US" dirty="0"/>
+              <a:t>Module designed with the expectation that attendees have a basic idea of what a lab notebook is as well as some experience (e.g., in university lab classes).</a:t>
+            </a:r>
+          </a:p>
+          <a:p>
             <a:endParaRPr lang="en-US" dirty="0"/>
           </a:p>
           <a:p>
-            <a:endParaRPr lang="en-US" dirty="0"/>
-          </a:p>
-          <a:p>
-            <a:r>
-              <a:rPr lang="en-US" dirty="0"/>
-              <a:t>Point out that if they search for this, they will find many pages.  Those pages have changed over time – it used to be DIKUW, not it’s the DIKW pyramid.  For instance, I often times no longer see understanding included.  I don’t know much beyond this classification, but find the classification to be quite useful.</a:t>
-            </a:r>
-          </a:p>
-          <a:p>
-            <a:endParaRPr lang="en-US" dirty="0"/>
-          </a:p>
-          <a:p>
-            <a:r>
-              <a:rPr lang="en-US" dirty="0"/>
-              <a:t>We won’t be defining these terms exactly as that is likely quite hard.  We will go through examples to gain an intuitive understanding of these concepts.</a:t>
+            <a:r>
+              <a:rPr lang="en-US" dirty="0"/>
+              <a:t>This is just a moment to confirm this and understand the bare minimum of what a lab notebook should do.  Put this up front so that people can relate slides to what they understand of lab notes.</a:t>
             </a:r>
           </a:p>
         </p:txBody>
@@ -2391,7 +2580,7 @@
           <a:p>
             <a:fld id="{54E672D7-8E2D-4611-973D-F4591A707C34}" type="slidenum">
               <a:rPr lang="en-US" smtClean="0"/>
-              <a:t>6</a:t>
+              <a:t>5</a:t>
             </a:fld>
             <a:endParaRPr lang="en-US"/>
           </a:p>
@@ -2400,7 +2589,7 @@
     </p:spTree>
     <p:extLst>
       <p:ext uri="{BB962C8B-B14F-4D97-AF65-F5344CB8AC3E}">
-        <p14:creationId xmlns:p14="http://schemas.microsoft.com/office/powerpoint/2010/main" val="2958482426"/>
+        <p14:creationId xmlns:p14="http://schemas.microsoft.com/office/powerpoint/2010/main" val="95302566"/>
       </p:ext>
     </p:extLst>
   </p:cSld>
@@ -2456,7 +2645,7 @@
           <a:p>
             <a:r>
               <a:rPr lang="en-US" dirty="0"/>
-              <a:t>My understanding is that data is *not* facts, as some claim.  Rather, data can be flawed and noisy.  Information is facts that are true relative to the potentially flawed data.</a:t>
+              <a:t>Point out that if they search for this, they will find many pages.  Those pages have changed over time – it used to be DIKUW, not it’s the DIKW pyramid.  For instance, I often times no longer see understanding included.  I don’t know much beyond this classification, but find the classification to be quite useful.</a:t>
             </a:r>
           </a:p>
           <a:p>
@@ -2465,16 +2654,7 @@
           <a:p>
             <a:r>
               <a:rPr lang="en-US" dirty="0"/>
-              <a:t>Data is valuable because it helps us make decisions.</a:t>
-            </a:r>
-          </a:p>
-          <a:p>
-            <a:endParaRPr lang="en-US" dirty="0"/>
-          </a:p>
-          <a:p>
-            <a:r>
-              <a:rPr lang="en-US" dirty="0"/>
-              <a:t>Information is data made (hopefully) useful.</a:t>
+              <a:t>We won’t be defining these terms exactly as that is likely quite hard.  We will go through examples to gain an intuitive understanding of these concepts.</a:t>
             </a:r>
           </a:p>
         </p:txBody>
@@ -2496,7 +2676,7 @@
           <a:p>
             <a:fld id="{54E672D7-8E2D-4611-973D-F4591A707C34}" type="slidenum">
               <a:rPr lang="en-US" smtClean="0"/>
-              <a:t>7</a:t>
+              <a:t>6</a:t>
             </a:fld>
             <a:endParaRPr lang="en-US"/>
           </a:p>
@@ -2505,7 +2685,7 @@
     </p:spTree>
     <p:extLst>
       <p:ext uri="{BB962C8B-B14F-4D97-AF65-F5344CB8AC3E}">
-        <p14:creationId xmlns:p14="http://schemas.microsoft.com/office/powerpoint/2010/main" val="720366741"/>
+        <p14:creationId xmlns:p14="http://schemas.microsoft.com/office/powerpoint/2010/main" val="2958482426"/>
       </p:ext>
     </p:extLst>
   </p:cSld>
@@ -2561,7 +2741,7 @@
           <a:p>
             <a:r>
               <a:rPr lang="en-US" dirty="0"/>
-              <a:t>Knowledge is generated by a process in such a way that it is an educated best guess.  But, it should be a solid and justifiable educated guess.  In this sense, it is not true but our best current guess at what is true.</a:t>
+              <a:t>My understanding is that data is *not* facts, as some claim.  Rather, data can be flawed and noisy.  Information is facts that are true relative to the potentially flawed data.</a:t>
             </a:r>
           </a:p>
           <a:p>
@@ -2570,7 +2750,7 @@
           <a:p>
             <a:r>
               <a:rPr lang="en-US" dirty="0"/>
-              <a:t>It’s hard to define understanding.  I have just written down my best guesses.</a:t>
+              <a:t>Data is valuable because it helps us make decisions.</a:t>
             </a:r>
           </a:p>
           <a:p>
@@ -2579,33 +2759,7 @@
           <a:p>
             <a:r>
               <a:rPr lang="en-US" dirty="0"/>
-              <a:t>I didn’t use the given timeseries information to derive this knowledge.  Someone with understanding of meteorology did. </a:t>
-            </a:r>
-            <a:r>
-              <a:rPr lang="en-US" dirty="0" err="1"/>
-              <a:t>Tthey</a:t>
-            </a:r>
-            <a:r>
-              <a:rPr lang="en-US" dirty="0"/>
-              <a:t> have a deep understanding derived from years of study and experience. However, that person presented and communicated the knowledge for consumption by those without understanding.</a:t>
-            </a:r>
-          </a:p>
-          <a:p>
-            <a:endParaRPr lang="en-US" dirty="0"/>
-          </a:p>
-          <a:p>
-            <a:r>
-              <a:rPr lang="en-US" dirty="0"/>
-              <a:t>When you go to school, are your teachers and professors putting understanding in your head or do they share knowledge and create an environment in which one can generate understanding?</a:t>
-            </a:r>
-          </a:p>
-          <a:p>
-            <a:endParaRPr lang="en-US" dirty="0"/>
-          </a:p>
-          <a:p>
-            <a:r>
-              <a:rPr lang="en-US" dirty="0"/>
-              <a:t>Understanding is built on the shoulders of giants.  You read an article that helps you generate understanding.  But the author of that article generated it from understanding he developed from taking classes with other </a:t>
+              <a:t>Information is data made (hopefully) useful.</a:t>
             </a:r>
           </a:p>
         </p:txBody>
@@ -2627,7 +2781,7 @@
           <a:p>
             <a:fld id="{54E672D7-8E2D-4611-973D-F4591A707C34}" type="slidenum">
               <a:rPr lang="en-US" smtClean="0"/>
-              <a:t>8</a:t>
+              <a:t>7</a:t>
             </a:fld>
             <a:endParaRPr lang="en-US"/>
           </a:p>
@@ -2636,7 +2790,7 @@
     </p:spTree>
     <p:extLst>
       <p:ext uri="{BB962C8B-B14F-4D97-AF65-F5344CB8AC3E}">
-        <p14:creationId xmlns:p14="http://schemas.microsoft.com/office/powerpoint/2010/main" val="2638889168"/>
+        <p14:creationId xmlns:p14="http://schemas.microsoft.com/office/powerpoint/2010/main" val="720366741"/>
       </p:ext>
     </p:extLst>
   </p:cSld>
@@ -2690,158 +2844,53 @@
           <a:bodyPr/>
           <a:lstStyle/>
           <a:p>
-            <a:pPr marL="0" marR="0" lvl="0" indent="0" algn="l" defTabSz="914400" rtl="0" eaLnBrk="1" fontAlgn="auto" latinLnBrk="0" hangingPunct="1">
-              <a:lnSpc>
-                <a:spcPct val="100000"/>
-              </a:lnSpc>
-              <a:spcBef>
-                <a:spcPts val="0"/>
-              </a:spcBef>
-              <a:spcAft>
-                <a:spcPts val="0"/>
-              </a:spcAft>
-              <a:buClrTx/>
-              <a:buSzTx/>
-              <a:buFontTx/>
-              <a:buNone/>
-              <a:tabLst/>
-              <a:defRPr/>
-            </a:pPr>
-            <a:r>
-              <a:rPr lang="en-US" dirty="0"/>
-              <a:t>One extreme is trying to understand all aspects of the work that we do.  Is that feasible or even achievable?</a:t>
-            </a:r>
-          </a:p>
-          <a:p>
-            <a:pPr marL="0" marR="0" lvl="0" indent="0" algn="l" defTabSz="914400" rtl="0" eaLnBrk="1" fontAlgn="auto" latinLnBrk="0" hangingPunct="1">
-              <a:lnSpc>
-                <a:spcPct val="100000"/>
-              </a:lnSpc>
-              <a:spcBef>
-                <a:spcPts val="0"/>
-              </a:spcBef>
-              <a:spcAft>
-                <a:spcPts val="0"/>
-              </a:spcAft>
-              <a:buClrTx/>
-              <a:buSzTx/>
-              <a:buFontTx/>
-              <a:buNone/>
-              <a:tabLst/>
-              <a:defRPr/>
-            </a:pPr>
+            <a:r>
+              <a:rPr lang="en-US" dirty="0"/>
+              <a:t>Knowledge is generated by a process in such a way that it is an educated best guess.  But, it should be a solid and justifiable educated guess.  In this sense, it is not true but our best current guess at what is true.</a:t>
+            </a:r>
+          </a:p>
+          <a:p>
             <a:endParaRPr lang="en-US" dirty="0"/>
           </a:p>
           <a:p>
-            <a:pPr marL="0" marR="0" lvl="0" indent="0" algn="l" defTabSz="914400" rtl="0" eaLnBrk="1" fontAlgn="auto" latinLnBrk="0" hangingPunct="1">
-              <a:lnSpc>
-                <a:spcPct val="100000"/>
-              </a:lnSpc>
-              <a:spcBef>
-                <a:spcPts val="0"/>
-              </a:spcBef>
-              <a:spcAft>
-                <a:spcPts val="0"/>
-              </a:spcAft>
-              <a:buClrTx/>
-              <a:buSzTx/>
-              <a:buFontTx/>
-              <a:buNone/>
-              <a:tabLst/>
-              <a:defRPr/>
-            </a:pPr>
-            <a:r>
-              <a:rPr lang="en-US" dirty="0"/>
-              <a:t>The other extreme is in choosing how we use the internet:</a:t>
-            </a:r>
-          </a:p>
-          <a:p>
-            <a:pPr marL="0" marR="0" lvl="0" indent="0" algn="l" defTabSz="914400" rtl="0" eaLnBrk="1" fontAlgn="auto" latinLnBrk="0" hangingPunct="1">
-              <a:lnSpc>
-                <a:spcPct val="100000"/>
-              </a:lnSpc>
-              <a:spcBef>
-                <a:spcPts val="0"/>
-              </a:spcBef>
-              <a:spcAft>
-                <a:spcPts val="0"/>
-              </a:spcAft>
-              <a:buClrTx/>
-              <a:buSzTx/>
-              <a:buFontTx/>
-              <a:buNone/>
-              <a:tabLst/>
-              <a:defRPr/>
-            </a:pPr>
-            <a:r>
-              <a:rPr lang="en-US" dirty="0"/>
-              <a:t>When you read the internet are you gaining knowledge of understanding?  Is it possible to build understanding by only accessing bits of knowledge scattered across the internet?  I believe that Elaine’s work would say no.  You need someone with understanding to collect knowledge sources across the internet, organize these, and present them in such a way that the novice can generate understanding.</a:t>
-            </a:r>
-          </a:p>
-          <a:p>
-            <a:pPr marL="0" marR="0" lvl="0" indent="0" algn="l" defTabSz="914400" rtl="0" eaLnBrk="1" fontAlgn="auto" latinLnBrk="0" hangingPunct="1">
-              <a:lnSpc>
-                <a:spcPct val="100000"/>
-              </a:lnSpc>
-              <a:spcBef>
-                <a:spcPts val="0"/>
-              </a:spcBef>
-              <a:spcAft>
-                <a:spcPts val="0"/>
-              </a:spcAft>
-              <a:buClrTx/>
-              <a:buSzTx/>
-              <a:buFontTx/>
-              <a:buNone/>
-              <a:tabLst/>
-              <a:defRPr/>
-            </a:pPr>
+            <a:r>
+              <a:rPr lang="en-US" dirty="0"/>
+              <a:t>It’s hard to define understanding.  I have just written down my best guesses.</a:t>
+            </a:r>
+          </a:p>
+          <a:p>
             <a:endParaRPr lang="en-US" dirty="0"/>
           </a:p>
           <a:p>
-            <a:pPr marL="0" marR="0" lvl="0" indent="0" algn="l" defTabSz="914400" rtl="0" eaLnBrk="1" fontAlgn="auto" latinLnBrk="0" hangingPunct="1">
-              <a:lnSpc>
-                <a:spcPct val="100000"/>
-              </a:lnSpc>
-              <a:spcBef>
-                <a:spcPts val="0"/>
-              </a:spcBef>
-              <a:spcAft>
-                <a:spcPts val="0"/>
-              </a:spcAft>
-              <a:buClrTx/>
-              <a:buSzTx/>
-              <a:buFontTx/>
-              <a:buNone/>
-              <a:tabLst/>
-              <a:defRPr/>
-            </a:pPr>
-            <a:r>
-              <a:rPr lang="en-US" dirty="0"/>
-              <a:t>A different, modern way to approach this same question:</a:t>
-            </a:r>
-          </a:p>
-          <a:p>
-            <a:pPr marL="0" marR="0" lvl="0" indent="0" algn="l" defTabSz="914400" rtl="0" eaLnBrk="1" fontAlgn="auto" latinLnBrk="0" hangingPunct="1">
-              <a:lnSpc>
-                <a:spcPct val="100000"/>
-              </a:lnSpc>
-              <a:spcBef>
-                <a:spcPts val="0"/>
-              </a:spcBef>
-              <a:spcAft>
-                <a:spcPts val="0"/>
-              </a:spcAft>
-              <a:buClrTx/>
-              <a:buSzTx/>
-              <a:buFontTx/>
-              <a:buNone/>
-              <a:tabLst/>
-              <a:defRPr/>
-            </a:pPr>
-            <a:r>
-              <a:rPr lang="en-US" dirty="0"/>
-              <a:t>If an ML/DL code had generated the knowledge given in the example but in such a way that interpretability is low, are we OK with inexpressible or inaccessible understanding?</a:t>
+            <a:r>
+              <a:rPr lang="en-US" dirty="0"/>
+              <a:t>I didn’t use the given timeseries information to derive this knowledge.  Someone with understanding of meteorology did. </a:t>
+            </a:r>
+            <a:r>
+              <a:rPr lang="en-US" dirty="0" err="1"/>
+              <a:t>Tthey</a:t>
+            </a:r>
+            <a:r>
+              <a:rPr lang="en-US" dirty="0"/>
+              <a:t> have a deep understanding derived from years of study and experience. However, that person presented and communicated the knowledge for consumption by those without understanding.</a:t>
+            </a:r>
+          </a:p>
+          <a:p>
+            <a:endParaRPr lang="en-US" dirty="0"/>
+          </a:p>
+          <a:p>
+            <a:r>
+              <a:rPr lang="en-US" dirty="0"/>
+              <a:t>When you go to school, are your teachers and professors putting understanding in your head or do they share knowledge and create an environment in which one can generate understanding?</a:t>
+            </a:r>
+          </a:p>
+          <a:p>
+            <a:endParaRPr lang="en-US" dirty="0"/>
+          </a:p>
+          <a:p>
+            <a:r>
+              <a:rPr lang="en-US" dirty="0"/>
+              <a:t>Understanding is built on the shoulders of giants.  You read an article that helps you generate understanding.  But the author of that article generated it from understanding he developed from taking classes with other </a:t>
             </a:r>
           </a:p>
         </p:txBody>
@@ -2863,7 +2912,7 @@
           <a:p>
             <a:fld id="{54E672D7-8E2D-4611-973D-F4591A707C34}" type="slidenum">
               <a:rPr lang="en-US" smtClean="0"/>
-              <a:t>9</a:t>
+              <a:t>8</a:t>
             </a:fld>
             <a:endParaRPr lang="en-US"/>
           </a:p>
@@ -2872,7 +2921,7 @@
     </p:spTree>
     <p:extLst>
       <p:ext uri="{BB962C8B-B14F-4D97-AF65-F5344CB8AC3E}">
-        <p14:creationId xmlns:p14="http://schemas.microsoft.com/office/powerpoint/2010/main" val="29386948"/>
+        <p14:creationId xmlns:p14="http://schemas.microsoft.com/office/powerpoint/2010/main" val="2638889168"/>
       </p:ext>
     </p:extLst>
   </p:cSld>
@@ -2926,9 +2975,158 @@
           <a:bodyPr/>
           <a:lstStyle/>
           <a:p>
-            <a:r>
-              <a:rPr lang="en-US" dirty="0"/>
-              <a:t>This can explain some of the difficulties that occur when a git expert is forced to use a workflow designed for a team with only git knowledge.  They aren’t allowed to work in a more powerful, efficient, and effective way.  If they do work in their powerful, they can upset all those with insufficient understanding.</a:t>
+            <a:pPr marL="0" marR="0" lvl="0" indent="0" algn="l" defTabSz="914400" rtl="0" eaLnBrk="1" fontAlgn="auto" latinLnBrk="0" hangingPunct="1">
+              <a:lnSpc>
+                <a:spcPct val="100000"/>
+              </a:lnSpc>
+              <a:spcBef>
+                <a:spcPts val="0"/>
+              </a:spcBef>
+              <a:spcAft>
+                <a:spcPts val="0"/>
+              </a:spcAft>
+              <a:buClrTx/>
+              <a:buSzTx/>
+              <a:buFontTx/>
+              <a:buNone/>
+              <a:tabLst/>
+              <a:defRPr/>
+            </a:pPr>
+            <a:r>
+              <a:rPr lang="en-US" dirty="0"/>
+              <a:t>One extreme is trying to understand all aspects of the work that we do.  Is that feasible or even achievable?</a:t>
+            </a:r>
+          </a:p>
+          <a:p>
+            <a:pPr marL="0" marR="0" lvl="0" indent="0" algn="l" defTabSz="914400" rtl="0" eaLnBrk="1" fontAlgn="auto" latinLnBrk="0" hangingPunct="1">
+              <a:lnSpc>
+                <a:spcPct val="100000"/>
+              </a:lnSpc>
+              <a:spcBef>
+                <a:spcPts val="0"/>
+              </a:spcBef>
+              <a:spcAft>
+                <a:spcPts val="0"/>
+              </a:spcAft>
+              <a:buClrTx/>
+              <a:buSzTx/>
+              <a:buFontTx/>
+              <a:buNone/>
+              <a:tabLst/>
+              <a:defRPr/>
+            </a:pPr>
+            <a:endParaRPr lang="en-US" dirty="0"/>
+          </a:p>
+          <a:p>
+            <a:pPr marL="0" marR="0" lvl="0" indent="0" algn="l" defTabSz="914400" rtl="0" eaLnBrk="1" fontAlgn="auto" latinLnBrk="0" hangingPunct="1">
+              <a:lnSpc>
+                <a:spcPct val="100000"/>
+              </a:lnSpc>
+              <a:spcBef>
+                <a:spcPts val="0"/>
+              </a:spcBef>
+              <a:spcAft>
+                <a:spcPts val="0"/>
+              </a:spcAft>
+              <a:buClrTx/>
+              <a:buSzTx/>
+              <a:buFontTx/>
+              <a:buNone/>
+              <a:tabLst/>
+              <a:defRPr/>
+            </a:pPr>
+            <a:r>
+              <a:rPr lang="en-US" dirty="0"/>
+              <a:t>The other extreme is in choosing how we use the internet:</a:t>
+            </a:r>
+          </a:p>
+          <a:p>
+            <a:pPr marL="0" marR="0" lvl="0" indent="0" algn="l" defTabSz="914400" rtl="0" eaLnBrk="1" fontAlgn="auto" latinLnBrk="0" hangingPunct="1">
+              <a:lnSpc>
+                <a:spcPct val="100000"/>
+              </a:lnSpc>
+              <a:spcBef>
+                <a:spcPts val="0"/>
+              </a:spcBef>
+              <a:spcAft>
+                <a:spcPts val="0"/>
+              </a:spcAft>
+              <a:buClrTx/>
+              <a:buSzTx/>
+              <a:buFontTx/>
+              <a:buNone/>
+              <a:tabLst/>
+              <a:defRPr/>
+            </a:pPr>
+            <a:r>
+              <a:rPr lang="en-US" dirty="0"/>
+              <a:t>When you read the internet are you gaining knowledge of understanding?  Is it possible to build understanding by only accessing bits of knowledge scattered across the internet?  I believe that Elaine’s work would say no.  You need someone with understanding to collect knowledge sources across the internet, organize these, and present them in such a way that the novice can generate understanding.</a:t>
+            </a:r>
+          </a:p>
+          <a:p>
+            <a:pPr marL="0" marR="0" lvl="0" indent="0" algn="l" defTabSz="914400" rtl="0" eaLnBrk="1" fontAlgn="auto" latinLnBrk="0" hangingPunct="1">
+              <a:lnSpc>
+                <a:spcPct val="100000"/>
+              </a:lnSpc>
+              <a:spcBef>
+                <a:spcPts val="0"/>
+              </a:spcBef>
+              <a:spcAft>
+                <a:spcPts val="0"/>
+              </a:spcAft>
+              <a:buClrTx/>
+              <a:buSzTx/>
+              <a:buFontTx/>
+              <a:buNone/>
+              <a:tabLst/>
+              <a:defRPr/>
+            </a:pPr>
+            <a:endParaRPr lang="en-US" dirty="0"/>
+          </a:p>
+          <a:p>
+            <a:pPr marL="0" marR="0" lvl="0" indent="0" algn="l" defTabSz="914400" rtl="0" eaLnBrk="1" fontAlgn="auto" latinLnBrk="0" hangingPunct="1">
+              <a:lnSpc>
+                <a:spcPct val="100000"/>
+              </a:lnSpc>
+              <a:spcBef>
+                <a:spcPts val="0"/>
+              </a:spcBef>
+              <a:spcAft>
+                <a:spcPts val="0"/>
+              </a:spcAft>
+              <a:buClrTx/>
+              <a:buSzTx/>
+              <a:buFontTx/>
+              <a:buNone/>
+              <a:tabLst/>
+              <a:defRPr/>
+            </a:pPr>
+            <a:r>
+              <a:rPr lang="en-US" dirty="0"/>
+              <a:t>A different, modern way to approach this same question:</a:t>
+            </a:r>
+          </a:p>
+          <a:p>
+            <a:pPr marL="0" marR="0" lvl="0" indent="0" algn="l" defTabSz="914400" rtl="0" eaLnBrk="1" fontAlgn="auto" latinLnBrk="0" hangingPunct="1">
+              <a:lnSpc>
+                <a:spcPct val="100000"/>
+              </a:lnSpc>
+              <a:spcBef>
+                <a:spcPts val="0"/>
+              </a:spcBef>
+              <a:spcAft>
+                <a:spcPts val="0"/>
+              </a:spcAft>
+              <a:buClrTx/>
+              <a:buSzTx/>
+              <a:buFontTx/>
+              <a:buNone/>
+              <a:tabLst/>
+              <a:defRPr/>
+            </a:pPr>
+            <a:r>
+              <a:rPr lang="en-US" dirty="0"/>
+              <a:t>If an ML/DL code had generated the knowledge given in the example but in such a way that interpretability is low, are we OK with inexpressible or inaccessible understanding?</a:t>
             </a:r>
           </a:p>
         </p:txBody>
@@ -2950,7 +3148,7 @@
           <a:p>
             <a:fld id="{54E672D7-8E2D-4611-973D-F4591A707C34}" type="slidenum">
               <a:rPr lang="en-US" smtClean="0"/>
-              <a:t>10</a:t>
+              <a:t>9</a:t>
             </a:fld>
             <a:endParaRPr lang="en-US"/>
           </a:p>
@@ -2959,7 +3157,7 @@
     </p:spTree>
     <p:extLst>
       <p:ext uri="{BB962C8B-B14F-4D97-AF65-F5344CB8AC3E}">
-        <p14:creationId xmlns:p14="http://schemas.microsoft.com/office/powerpoint/2010/main" val="153949558"/>
+        <p14:creationId xmlns:p14="http://schemas.microsoft.com/office/powerpoint/2010/main" val="29386948"/>
       </p:ext>
     </p:extLst>
   </p:cSld>
@@ -3015,25 +3213,7 @@
           <a:p>
             <a:r>
               <a:rPr lang="en-US" dirty="0"/>
-              <a:t>Really most any project benefits from some sort of knowledge management.  </a:t>
-            </a:r>
-          </a:p>
-          <a:p>
-            <a:endParaRPr lang="en-US" dirty="0"/>
-          </a:p>
-          <a:p>
-            <a:r>
-              <a:rPr lang="en-US" dirty="0"/>
-              <a:t>The key is first to recognize when knowledge is generated.  Once I became aware of this classification and began to think in terms of it, it became easier for me to recognize knowledge generation.  It’s as if a bell goes off in my brain that indicates we need to record what was just said.</a:t>
-            </a:r>
-          </a:p>
-          <a:p>
-            <a:endParaRPr lang="en-US" dirty="0"/>
-          </a:p>
-          <a:p>
-            <a:r>
-              <a:rPr lang="en-US" dirty="0"/>
-              <a:t>The answer to the question is ”clearly no”,  We need to communicate to our future selves for the sake of productivity and reproducible research.</a:t>
+              <a:t>This can explain some of the difficulties that occur when a git expert is forced to use a workflow designed for a team with only git knowledge.  They aren’t allowed to work in a more powerful, efficient, and effective way.  If they do work in their powerful, they can upset all those with insufficient understanding.</a:t>
             </a:r>
           </a:p>
         </p:txBody>
@@ -3055,7 +3235,7 @@
           <a:p>
             <a:fld id="{54E672D7-8E2D-4611-973D-F4591A707C34}" type="slidenum">
               <a:rPr lang="en-US" smtClean="0"/>
-              <a:t>11</a:t>
+              <a:t>10</a:t>
             </a:fld>
             <a:endParaRPr lang="en-US"/>
           </a:p>
@@ -3064,7 +3244,7 @@
     </p:spTree>
     <p:extLst>
       <p:ext uri="{BB962C8B-B14F-4D97-AF65-F5344CB8AC3E}">
-        <p14:creationId xmlns:p14="http://schemas.microsoft.com/office/powerpoint/2010/main" val="1399277158"/>
+        <p14:creationId xmlns:p14="http://schemas.microsoft.com/office/powerpoint/2010/main" val="153949558"/>
       </p:ext>
     </p:extLst>
   </p:cSld>
@@ -8652,6 +8832,247 @@
           </a:p>
         </p:txBody>
       </p:sp>
+      <p:cxnSp>
+        <p:nvCxnSpPr>
+          <p:cNvPr id="7" name="Straight Arrow Connector 6">
+            <a:extLst>
+              <a:ext uri="{FF2B5EF4-FFF2-40B4-BE49-F238E27FC236}">
+                <a16:creationId xmlns:a16="http://schemas.microsoft.com/office/drawing/2014/main" id="{C63BC0F0-6574-B496-52C2-E4D872815F5D}"/>
+              </a:ext>
+            </a:extLst>
+          </p:cNvPr>
+          <p:cNvCxnSpPr>
+            <a:cxnSpLocks/>
+          </p:cNvCxnSpPr>
+          <p:nvPr/>
+        </p:nvCxnSpPr>
+        <p:spPr>
+          <a:xfrm flipH="1" flipV="1">
+            <a:off x="5166360" y="6050280"/>
+            <a:ext cx="220980" cy="312420"/>
+          </a:xfrm>
+          <a:prstGeom prst="straightConnector1">
+            <a:avLst/>
+          </a:prstGeom>
+          <a:ln>
+            <a:tailEnd type="triangle"/>
+          </a:ln>
+        </p:spPr>
+        <p:style>
+          <a:lnRef idx="1">
+            <a:schemeClr val="accent1"/>
+          </a:lnRef>
+          <a:fillRef idx="0">
+            <a:schemeClr val="accent1"/>
+          </a:fillRef>
+          <a:effectRef idx="0">
+            <a:schemeClr val="accent1"/>
+          </a:effectRef>
+          <a:fontRef idx="minor">
+            <a:schemeClr val="tx1"/>
+          </a:fontRef>
+        </p:style>
+      </p:cxnSp>
+      <p:sp>
+        <p:nvSpPr>
+          <p:cNvPr id="8" name="TextBox 7">
+            <a:extLst>
+              <a:ext uri="{FF2B5EF4-FFF2-40B4-BE49-F238E27FC236}">
+                <a16:creationId xmlns:a16="http://schemas.microsoft.com/office/drawing/2014/main" id="{B24FB57D-760B-1116-DD61-3CD63BFC4E82}"/>
+              </a:ext>
+            </a:extLst>
+          </p:cNvPr>
+          <p:cNvSpPr txBox="1"/>
+          <p:nvPr/>
+        </p:nvSpPr>
+        <p:spPr>
+          <a:xfrm>
+            <a:off x="4856368" y="6281804"/>
+            <a:ext cx="1169807" cy="350865"/>
+          </a:xfrm>
+          <a:prstGeom prst="rect">
+            <a:avLst/>
+          </a:prstGeom>
+          <a:noFill/>
+        </p:spPr>
+        <p:txBody>
+          <a:bodyPr wrap="none" lIns="118872" tIns="91440" rIns="118872" bIns="91440" rtlCol="0" anchor="ctr" anchorCtr="0">
+            <a:spAutoFit/>
+          </a:bodyPr>
+          <a:lstStyle/>
+          <a:p>
+            <a:pPr algn="l">
+              <a:lnSpc>
+                <a:spcPct val="90000"/>
+              </a:lnSpc>
+            </a:pPr>
+            <a:r>
+              <a:rPr lang="en-US" sz="1200" dirty="0"/>
+              <a:t>Science team</a:t>
+            </a:r>
+          </a:p>
+        </p:txBody>
+      </p:sp>
+      <p:sp>
+        <p:nvSpPr>
+          <p:cNvPr id="10" name="TextBox 9">
+            <a:extLst>
+              <a:ext uri="{FF2B5EF4-FFF2-40B4-BE49-F238E27FC236}">
+                <a16:creationId xmlns:a16="http://schemas.microsoft.com/office/drawing/2014/main" id="{F948E01E-207D-4CAE-A083-779CA543001C}"/>
+              </a:ext>
+            </a:extLst>
+          </p:cNvPr>
+          <p:cNvSpPr txBox="1"/>
+          <p:nvPr/>
+        </p:nvSpPr>
+        <p:spPr>
+          <a:xfrm>
+            <a:off x="6250828" y="5460249"/>
+            <a:ext cx="1544910" cy="350865"/>
+          </a:xfrm>
+          <a:prstGeom prst="rect">
+            <a:avLst/>
+          </a:prstGeom>
+          <a:noFill/>
+        </p:spPr>
+        <p:txBody>
+          <a:bodyPr wrap="none" lIns="118872" tIns="91440" rIns="118872" bIns="91440" rtlCol="0" anchor="ctr" anchorCtr="0">
+            <a:spAutoFit/>
+          </a:bodyPr>
+          <a:lstStyle/>
+          <a:p>
+            <a:pPr algn="l">
+              <a:lnSpc>
+                <a:spcPct val="90000"/>
+              </a:lnSpc>
+            </a:pPr>
+            <a:r>
+              <a:rPr lang="en-US" sz="1200" dirty="0"/>
+              <a:t>Data analysis team</a:t>
+            </a:r>
+          </a:p>
+        </p:txBody>
+      </p:sp>
+      <p:cxnSp>
+        <p:nvCxnSpPr>
+          <p:cNvPr id="12" name="Straight Arrow Connector 11">
+            <a:extLst>
+              <a:ext uri="{FF2B5EF4-FFF2-40B4-BE49-F238E27FC236}">
+                <a16:creationId xmlns:a16="http://schemas.microsoft.com/office/drawing/2014/main" id="{A63E753B-D971-7587-F389-5E0840348E99}"/>
+              </a:ext>
+            </a:extLst>
+          </p:cNvPr>
+          <p:cNvCxnSpPr>
+            <a:stCxn id="10" idx="1"/>
+          </p:cNvCxnSpPr>
+          <p:nvPr/>
+        </p:nvCxnSpPr>
+        <p:spPr>
+          <a:xfrm flipH="1">
+            <a:off x="4145280" y="5635682"/>
+            <a:ext cx="2105548" cy="102178"/>
+          </a:xfrm>
+          <a:prstGeom prst="straightConnector1">
+            <a:avLst/>
+          </a:prstGeom>
+          <a:ln>
+            <a:tailEnd type="triangle"/>
+          </a:ln>
+        </p:spPr>
+        <p:style>
+          <a:lnRef idx="1">
+            <a:schemeClr val="accent1"/>
+          </a:lnRef>
+          <a:fillRef idx="0">
+            <a:schemeClr val="accent1"/>
+          </a:fillRef>
+          <a:effectRef idx="0">
+            <a:schemeClr val="accent1"/>
+          </a:effectRef>
+          <a:fontRef idx="minor">
+            <a:schemeClr val="tx1"/>
+          </a:fontRef>
+        </p:style>
+      </p:cxnSp>
+      <p:sp>
+        <p:nvSpPr>
+          <p:cNvPr id="13" name="TextBox 12">
+            <a:extLst>
+              <a:ext uri="{FF2B5EF4-FFF2-40B4-BE49-F238E27FC236}">
+                <a16:creationId xmlns:a16="http://schemas.microsoft.com/office/drawing/2014/main" id="{689D75E1-B860-6118-599A-F0AAB770B8DF}"/>
+              </a:ext>
+            </a:extLst>
+          </p:cNvPr>
+          <p:cNvSpPr txBox="1"/>
+          <p:nvPr/>
+        </p:nvSpPr>
+        <p:spPr>
+          <a:xfrm>
+            <a:off x="8392048" y="3197109"/>
+            <a:ext cx="1288430" cy="350865"/>
+          </a:xfrm>
+          <a:prstGeom prst="rect">
+            <a:avLst/>
+          </a:prstGeom>
+          <a:noFill/>
+        </p:spPr>
+        <p:txBody>
+          <a:bodyPr wrap="none" lIns="118872" tIns="91440" rIns="118872" bIns="91440" rtlCol="0" anchor="ctr" anchorCtr="0">
+            <a:spAutoFit/>
+          </a:bodyPr>
+          <a:lstStyle/>
+          <a:p>
+            <a:pPr algn="l">
+              <a:lnSpc>
+                <a:spcPct val="90000"/>
+              </a:lnSpc>
+            </a:pPr>
+            <a:r>
+              <a:rPr lang="en-US" sz="1200" dirty="0"/>
+              <a:t>Hardware team</a:t>
+            </a:r>
+          </a:p>
+        </p:txBody>
+      </p:sp>
+      <p:cxnSp>
+        <p:nvCxnSpPr>
+          <p:cNvPr id="15" name="Straight Arrow Connector 14">
+            <a:extLst>
+              <a:ext uri="{FF2B5EF4-FFF2-40B4-BE49-F238E27FC236}">
+                <a16:creationId xmlns:a16="http://schemas.microsoft.com/office/drawing/2014/main" id="{A2691F45-CE5F-B888-B980-642EEFDB88A8}"/>
+              </a:ext>
+            </a:extLst>
+          </p:cNvPr>
+          <p:cNvCxnSpPr/>
+          <p:nvPr/>
+        </p:nvCxnSpPr>
+        <p:spPr>
+          <a:xfrm flipH="1">
+            <a:off x="7673340" y="3372541"/>
+            <a:ext cx="718708" cy="0"/>
+          </a:xfrm>
+          <a:prstGeom prst="straightConnector1">
+            <a:avLst/>
+          </a:prstGeom>
+          <a:ln>
+            <a:tailEnd type="triangle"/>
+          </a:ln>
+        </p:spPr>
+        <p:style>
+          <a:lnRef idx="1">
+            <a:schemeClr val="accent1"/>
+          </a:lnRef>
+          <a:fillRef idx="0">
+            <a:schemeClr val="accent1"/>
+          </a:fillRef>
+          <a:effectRef idx="0">
+            <a:schemeClr val="accent1"/>
+          </a:effectRef>
+          <a:fontRef idx="minor">
+            <a:schemeClr val="tx1"/>
+          </a:fontRef>
+        </p:style>
+      </p:cxnSp>
     </p:spTree>
     <p:extLst>
       <p:ext uri="{BB962C8B-B14F-4D97-AF65-F5344CB8AC3E}">
@@ -10422,7 +10843,7 @@
           <a:p>
             <a:r>
               <a:rPr lang="en-US" dirty="0"/>
-              <a:t>Productivity can benefit from selflessness</a:t>
+              <a:t>Productivity can arise from selflessness</a:t>
             </a:r>
           </a:p>
           <a:p>

</xml_diff>

<commit_message>
(Issue #133) More tweaks.
</commit_message>
<xml_diff>
--- a/lab-notebooks.pptx
+++ b/lab-notebooks.pptx
@@ -13,8 +13,8 @@
   <p:sldIdLst>
     <p:sldId id="256" r:id="rId5"/>
     <p:sldId id="321" r:id="rId6"/>
-    <p:sldId id="322" r:id="rId7"/>
-    <p:sldId id="323" r:id="rId8"/>
+    <p:sldId id="323" r:id="rId7"/>
+    <p:sldId id="322" r:id="rId8"/>
     <p:sldId id="349" r:id="rId9"/>
     <p:sldId id="325" r:id="rId10"/>
     <p:sldId id="326" r:id="rId11"/>
@@ -278,7 +278,7 @@
           <a:p>
             <a:fld id="{0B842F42-2CE9-4E35-95C1-410DC08A50B1}" type="datetimeFigureOut">
               <a:rPr lang="en-US" smtClean="0"/>
-              <a:t>7/25/22</a:t>
+              <a:t>8/2/22</a:t>
             </a:fld>
             <a:endParaRPr lang="en-US"/>
           </a:p>
@@ -443,7 +443,7 @@
           <a:p>
             <a:fld id="{6F282904-F315-4730-8D91-37D99E141A6F}" type="datetimeFigureOut">
               <a:rPr lang="en-US" smtClean="0"/>
-              <a:t>7/25/22</a:t>
+              <a:t>8/2/22</a:t>
             </a:fld>
             <a:endParaRPr lang="en-US"/>
           </a:p>
@@ -2052,19 +2052,13 @@
           <a:bodyPr/>
           <a:lstStyle/>
           <a:p>
-            <a:r>
-              <a:rPr lang="en-US" dirty="0"/>
-              <a:t>Emphasize that Katherine’s quote has three main points, each of which resonates with me.</a:t>
-            </a:r>
-          </a:p>
-          <a:p>
             <a:pPr marL="171450" indent="-171450">
               <a:buFont typeface="Arial" panose="020B0604020202020204" pitchFamily="34" charset="0"/>
               <a:buChar char="•"/>
             </a:pPr>
             <a:r>
               <a:rPr lang="en-US" dirty="0"/>
-              <a:t>low-level science practices are required to do rigorous, reproducible science</a:t>
+              <a:t>This slide should give them context for understanding my point of view.  Emphasize that one main point of this talk is to maintain an open mind when talking to people whose work is slightly different.  Therefore, if role is different from yours, don’t assume that what I will say is useless.  Rather, search out similarities rather than differences.</a:t>
             </a:r>
           </a:p>
           <a:p>
@@ -2072,10 +2066,7 @@
               <a:buFont typeface="Arial" panose="020B0604020202020204" pitchFamily="34" charset="0"/>
               <a:buChar char="•"/>
             </a:pPr>
-            <a:r>
-              <a:rPr lang="en-US" dirty="0"/>
-              <a:t>Experimentalists do understand this</a:t>
-            </a:r>
+            <a:endParaRPr lang="en-US" dirty="0"/>
           </a:p>
           <a:p>
             <a:pPr marL="171450" indent="-171450">
@@ -2084,16 +2075,7 @@
             </a:pPr>
             <a:r>
               <a:rPr lang="en-US" dirty="0"/>
-              <a:t>Computational science not so much</a:t>
-            </a:r>
-          </a:p>
-          <a:p>
-            <a:endParaRPr lang="en-US" dirty="0"/>
-          </a:p>
-          <a:p>
-            <a:r>
-              <a:rPr lang="en-US" dirty="0"/>
-              <a:t>What does she mean by software practices</a:t>
+              <a:t>Physics was mostly about designing, constructing, all aspects of scientific data including data analysis.</a:t>
             </a:r>
           </a:p>
           <a:p>
@@ -2101,10 +2083,33 @@
               <a:buFont typeface="Arial" panose="020B0604020202020204" pitchFamily="34" charset="0"/>
               <a:buChar char="•"/>
             </a:pPr>
-            <a:r>
-              <a:rPr lang="en-US" dirty="0"/>
-              <a:t>Design and implement software following best practices</a:t>
-            </a:r>
+            <a:endParaRPr lang="en-US" dirty="0"/>
+          </a:p>
+          <a:p>
+            <a:pPr marL="0" marR="0" lvl="0" indent="0" algn="l" defTabSz="914400" rtl="0" eaLnBrk="1" fontAlgn="auto" latinLnBrk="0" hangingPunct="1">
+              <a:lnSpc>
+                <a:spcPct val="100000"/>
+              </a:lnSpc>
+              <a:spcBef>
+                <a:spcPts val="0"/>
+              </a:spcBef>
+              <a:spcAft>
+                <a:spcPts val="0"/>
+              </a:spcAft>
+              <a:buClrTx/>
+              <a:buSzTx/>
+              <a:buFontTx/>
+              <a:buNone/>
+              <a:tabLst/>
+              <a:defRPr/>
+            </a:pPr>
+            <a:r>
+              <a:rPr lang="en-US" dirty="0"/>
+              <a:t>* Observatory was working to ensure high-quality results with full context so that public can do science</a:t>
+            </a:r>
+          </a:p>
+          <a:p>
+            <a:endParaRPr lang="en-US" dirty="0"/>
           </a:p>
           <a:p>
             <a:pPr marL="171450" indent="-171450">
@@ -2113,7 +2118,7 @@
             </a:pPr>
             <a:r>
               <a:rPr lang="en-US" dirty="0"/>
-              <a:t>Test your code</a:t>
+              <a:t>While my experimental background was closer to R&amp;D, the laboratory work was clearly more about operations - Paranal is a science factory.  This is different in some ways, very rigorous, and at a very large scale.  To adapt ideas/tips/tricks/tools for observatory, there needs to be some simplification.</a:t>
             </a:r>
           </a:p>
           <a:p>
@@ -2121,9 +2126,29 @@
               <a:buFont typeface="Arial" panose="020B0604020202020204" pitchFamily="34" charset="0"/>
               <a:buChar char="•"/>
             </a:pPr>
-            <a:r>
-              <a:rPr lang="en-US" dirty="0"/>
-              <a:t>Use version control and use it well</a:t>
+            <a:endParaRPr lang="en-US" dirty="0"/>
+          </a:p>
+          <a:p>
+            <a:pPr marL="171450" marR="0" lvl="0" indent="-171450" algn="l" defTabSz="914400" rtl="0" eaLnBrk="1" fontAlgn="auto" latinLnBrk="0" hangingPunct="1">
+              <a:lnSpc>
+                <a:spcPct val="100000"/>
+              </a:lnSpc>
+              <a:spcBef>
+                <a:spcPts val="0"/>
+              </a:spcBef>
+              <a:spcAft>
+                <a:spcPts val="0"/>
+              </a:spcAft>
+              <a:buClrTx/>
+              <a:buSzTx/>
+              <a:buFont typeface="Arial" panose="020B0604020202020204" pitchFamily="34" charset="0"/>
+              <a:buChar char="•"/>
+              <a:tabLst/>
+              <a:defRPr/>
+            </a:pPr>
+            <a:r>
+              <a:rPr lang="en-US" dirty="0"/>
+              <a:t>Part of working on scientific instrumentation is understanding how the data is generated and therefore understanding how to correctly and rigorously analyze data and draw conclusions from data.</a:t>
             </a:r>
           </a:p>
           <a:p>
@@ -2131,9 +2156,29 @@
               <a:buFont typeface="Arial" panose="020B0604020202020204" pitchFamily="34" charset="0"/>
               <a:buChar char="•"/>
             </a:pPr>
-            <a:r>
-              <a:rPr lang="en-US" dirty="0"/>
-              <a:t>Code reviews</a:t>
+            <a:endParaRPr lang="en-US" dirty="0"/>
+          </a:p>
+          <a:p>
+            <a:pPr marL="171450" marR="0" lvl="0" indent="-171450" algn="l" defTabSz="914400" rtl="0" eaLnBrk="1" fontAlgn="auto" latinLnBrk="0" hangingPunct="1">
+              <a:lnSpc>
+                <a:spcPct val="100000"/>
+              </a:lnSpc>
+              <a:spcBef>
+                <a:spcPts val="0"/>
+              </a:spcBef>
+              <a:spcAft>
+                <a:spcPts val="0"/>
+              </a:spcAft>
+              <a:buClrTx/>
+              <a:buSzTx/>
+              <a:buFont typeface="Arial" panose="020B0604020202020204" pitchFamily="34" charset="0"/>
+              <a:buChar char="•"/>
+              <a:tabLst/>
+              <a:defRPr/>
+            </a:pPr>
+            <a:r>
+              <a:rPr lang="en-US" dirty="0"/>
+              <a:t>Emphasize that implicit in this is my belief that developing scientific software is developing a scientific instrument.  How many people share this view?  If not, how do people view their software and how they use it?</a:t>
             </a:r>
           </a:p>
           <a:p>
@@ -2141,27 +2186,7 @@
               <a:buFont typeface="Arial" panose="020B0604020202020204" pitchFamily="34" charset="0"/>
               <a:buChar char="•"/>
             </a:pPr>
-            <a:r>
-              <a:rPr lang="en-US" dirty="0"/>
-              <a:t>Documentation (e.g., document your assumptions)</a:t>
-            </a:r>
-          </a:p>
-          <a:p>
             <a:endParaRPr lang="en-US" dirty="0"/>
-          </a:p>
-          <a:p>
-            <a:r>
-              <a:rPr lang="en-US" dirty="0"/>
-              <a:t>Many people refer to software practices as “software engineering”.  I whole-heartedly disagree with this.  I understand this work to be foundational, bedrock science that is required to do high-quality trustworthy high-level science.  But, we need not reinvent the wheel.  We can learn from the SW </a:t>
-            </a:r>
-            <a:r>
-              <a:rPr lang="en-US" dirty="0" err="1"/>
-              <a:t>Eng</a:t>
-            </a:r>
-            <a:r>
-              <a:rPr lang="en-US" dirty="0"/>
-              <a:t> community and adapt what they know and use.</a:t>
-            </a:r>
           </a:p>
         </p:txBody>
       </p:sp>
@@ -2191,7 +2216,7 @@
     </p:spTree>
     <p:extLst>
       <p:ext uri="{BB962C8B-B14F-4D97-AF65-F5344CB8AC3E}">
-        <p14:creationId xmlns:p14="http://schemas.microsoft.com/office/powerpoint/2010/main" val="1936705258"/>
+        <p14:creationId xmlns:p14="http://schemas.microsoft.com/office/powerpoint/2010/main" val="795729674"/>
       </p:ext>
     </p:extLst>
   </p:cSld>
@@ -2329,13 +2354,19 @@
           <a:bodyPr/>
           <a:lstStyle/>
           <a:p>
+            <a:r>
+              <a:rPr lang="en-US" dirty="0"/>
+              <a:t>Emphasize that Katherine’s quote has three main points, each of which resonates with me.</a:t>
+            </a:r>
+          </a:p>
+          <a:p>
             <a:pPr marL="171450" indent="-171450">
               <a:buFont typeface="Arial" panose="020B0604020202020204" pitchFamily="34" charset="0"/>
               <a:buChar char="•"/>
             </a:pPr>
             <a:r>
               <a:rPr lang="en-US" dirty="0"/>
-              <a:t>This slide should give them context for understanding my point of view.  Emphasize that one main point of this talk is to maintain an open mind when talking to people whose work is slightly different.  Therefore, if role is different from yours, don’t assume that what I will say is useless.  Rather, search out similarities rather than differences.</a:t>
+              <a:t>low-level science practices are required to do rigorous, reproducible science</a:t>
             </a:r>
           </a:p>
           <a:p>
@@ -2343,7 +2374,10 @@
               <a:buFont typeface="Arial" panose="020B0604020202020204" pitchFamily="34" charset="0"/>
               <a:buChar char="•"/>
             </a:pPr>
-            <a:endParaRPr lang="en-US" dirty="0"/>
+            <a:r>
+              <a:rPr lang="en-US" dirty="0"/>
+              <a:t>Experimentalists do understand this</a:t>
+            </a:r>
           </a:p>
           <a:p>
             <a:pPr marL="171450" indent="-171450">
@@ -2352,7 +2386,16 @@
             </a:pPr>
             <a:r>
               <a:rPr lang="en-US" dirty="0"/>
-              <a:t>Physics was mostly about designing, constructing, all aspects of scientific data including data analysis.</a:t>
+              <a:t>Computational science not so much</a:t>
+            </a:r>
+          </a:p>
+          <a:p>
+            <a:endParaRPr lang="en-US" dirty="0"/>
+          </a:p>
+          <a:p>
+            <a:r>
+              <a:rPr lang="en-US" dirty="0"/>
+              <a:t>What does she mean by software practices</a:t>
             </a:r>
           </a:p>
           <a:p>
@@ -2360,33 +2403,10 @@
               <a:buFont typeface="Arial" panose="020B0604020202020204" pitchFamily="34" charset="0"/>
               <a:buChar char="•"/>
             </a:pPr>
-            <a:endParaRPr lang="en-US" dirty="0"/>
-          </a:p>
-          <a:p>
-            <a:pPr marL="0" marR="0" lvl="0" indent="0" algn="l" defTabSz="914400" rtl="0" eaLnBrk="1" fontAlgn="auto" latinLnBrk="0" hangingPunct="1">
-              <a:lnSpc>
-                <a:spcPct val="100000"/>
-              </a:lnSpc>
-              <a:spcBef>
-                <a:spcPts val="0"/>
-              </a:spcBef>
-              <a:spcAft>
-                <a:spcPts val="0"/>
-              </a:spcAft>
-              <a:buClrTx/>
-              <a:buSzTx/>
-              <a:buFontTx/>
-              <a:buNone/>
-              <a:tabLst/>
-              <a:defRPr/>
-            </a:pPr>
-            <a:r>
-              <a:rPr lang="en-US" dirty="0"/>
-              <a:t>* Observatory was working to ensure high-quality results with full context so that public can do science</a:t>
-            </a:r>
-          </a:p>
-          <a:p>
-            <a:endParaRPr lang="en-US" dirty="0"/>
+            <a:r>
+              <a:rPr lang="en-US" dirty="0"/>
+              <a:t>Design and implement software following best practices</a:t>
+            </a:r>
           </a:p>
           <a:p>
             <a:pPr marL="171450" indent="-171450">
@@ -2395,7 +2415,7 @@
             </a:pPr>
             <a:r>
               <a:rPr lang="en-US" dirty="0"/>
-              <a:t>While my experimental background was closer to R&amp;D, the laboratory work was clearly more about operations - Paranal is a science factory.  This is different in some ways, very rigorous, and at a very large scale.  To adapt ideas/tips/tricks/tools for observatory, there needs to be some simplification.</a:t>
+              <a:t>Test your code</a:t>
             </a:r>
           </a:p>
           <a:p>
@@ -2403,29 +2423,9 @@
               <a:buFont typeface="Arial" panose="020B0604020202020204" pitchFamily="34" charset="0"/>
               <a:buChar char="•"/>
             </a:pPr>
-            <a:endParaRPr lang="en-US" dirty="0"/>
-          </a:p>
-          <a:p>
-            <a:pPr marL="171450" marR="0" lvl="0" indent="-171450" algn="l" defTabSz="914400" rtl="0" eaLnBrk="1" fontAlgn="auto" latinLnBrk="0" hangingPunct="1">
-              <a:lnSpc>
-                <a:spcPct val="100000"/>
-              </a:lnSpc>
-              <a:spcBef>
-                <a:spcPts val="0"/>
-              </a:spcBef>
-              <a:spcAft>
-                <a:spcPts val="0"/>
-              </a:spcAft>
-              <a:buClrTx/>
-              <a:buSzTx/>
-              <a:buFont typeface="Arial" panose="020B0604020202020204" pitchFamily="34" charset="0"/>
-              <a:buChar char="•"/>
-              <a:tabLst/>
-              <a:defRPr/>
-            </a:pPr>
-            <a:r>
-              <a:rPr lang="en-US" dirty="0"/>
-              <a:t>Part of working on scientific instrumentation is understanding how the data is generated and therefore understanding how to correctly and rigorously analyze data and draw conclusions from data.</a:t>
+            <a:r>
+              <a:rPr lang="en-US" dirty="0"/>
+              <a:t>Use version control and use it well</a:t>
             </a:r>
           </a:p>
           <a:p>
@@ -2433,29 +2433,9 @@
               <a:buFont typeface="Arial" panose="020B0604020202020204" pitchFamily="34" charset="0"/>
               <a:buChar char="•"/>
             </a:pPr>
-            <a:endParaRPr lang="en-US" dirty="0"/>
-          </a:p>
-          <a:p>
-            <a:pPr marL="171450" marR="0" lvl="0" indent="-171450" algn="l" defTabSz="914400" rtl="0" eaLnBrk="1" fontAlgn="auto" latinLnBrk="0" hangingPunct="1">
-              <a:lnSpc>
-                <a:spcPct val="100000"/>
-              </a:lnSpc>
-              <a:spcBef>
-                <a:spcPts val="0"/>
-              </a:spcBef>
-              <a:spcAft>
-                <a:spcPts val="0"/>
-              </a:spcAft>
-              <a:buClrTx/>
-              <a:buSzTx/>
-              <a:buFont typeface="Arial" panose="020B0604020202020204" pitchFamily="34" charset="0"/>
-              <a:buChar char="•"/>
-              <a:tabLst/>
-              <a:defRPr/>
-            </a:pPr>
-            <a:r>
-              <a:rPr lang="en-US" dirty="0"/>
-              <a:t>Emphasize that implicit in this is my belief that developing scientific software is developing a scientific instrument.  How many people share this view?  If not, how do people view their software and how they use it?</a:t>
+            <a:r>
+              <a:rPr lang="en-US" dirty="0"/>
+              <a:t>Code reviews</a:t>
             </a:r>
           </a:p>
           <a:p>
@@ -2463,7 +2443,27 @@
               <a:buFont typeface="Arial" panose="020B0604020202020204" pitchFamily="34" charset="0"/>
               <a:buChar char="•"/>
             </a:pPr>
+            <a:r>
+              <a:rPr lang="en-US" dirty="0"/>
+              <a:t>Documentation (e.g., document your assumptions)</a:t>
+            </a:r>
+          </a:p>
+          <a:p>
             <a:endParaRPr lang="en-US" dirty="0"/>
+          </a:p>
+          <a:p>
+            <a:r>
+              <a:rPr lang="en-US" dirty="0"/>
+              <a:t>Many people refer to software practices as “software engineering”.  I whole-heartedly disagree with this.  I understand this work to be foundational, bedrock science that is required to do high-quality trustworthy high-level science.  But, we need not reinvent the wheel.  We can learn from the SW </a:t>
+            </a:r>
+            <a:r>
+              <a:rPr lang="en-US" dirty="0" err="1"/>
+              <a:t>Eng</a:t>
+            </a:r>
+            <a:r>
+              <a:rPr lang="en-US" dirty="0"/>
+              <a:t> community and adapt what they know and use.</a:t>
+            </a:r>
           </a:p>
         </p:txBody>
       </p:sp>
@@ -2493,7 +2493,7 @@
     </p:spTree>
     <p:extLst>
       <p:ext uri="{BB962C8B-B14F-4D97-AF65-F5344CB8AC3E}">
-        <p14:creationId xmlns:p14="http://schemas.microsoft.com/office/powerpoint/2010/main" val="795729674"/>
+        <p14:creationId xmlns:p14="http://schemas.microsoft.com/office/powerpoint/2010/main" val="1936705258"/>
       </p:ext>
     </p:extLst>
   </p:cSld>
@@ -7206,7 +7206,7 @@
             <a:pPr lvl="1"/>
             <a:r>
               <a:rPr lang="en-US" dirty="0"/>
-              <a:t>This workflow should protect code so that we can’t do damage</a:t>
+              <a:t>This git workflow should protect code so that we can’t do damage</a:t>
             </a:r>
           </a:p>
           <a:p>
@@ -7513,6 +7513,13 @@
             </a:r>
           </a:p>
           <a:p>
+            <a:pPr lvl="1"/>
+            <a:r>
+              <a:rPr lang="en-US" dirty="0"/>
+              <a:t>Hope to improve understanding</a:t>
+            </a:r>
+          </a:p>
+          <a:p>
             <a:r>
               <a:rPr lang="en-US" dirty="0"/>
               <a:t>We get more if we derive lessons learned together.</a:t>
@@ -7530,12 +7537,6 @@
             <a:r>
               <a:rPr lang="en-US" dirty="0"/>
               <a:t>Communicate the knowledge implicitly</a:t>
-            </a:r>
-          </a:p>
-          <a:p>
-            <a:r>
-              <a:rPr lang="en-US" dirty="0"/>
-              <a:t>We hope that understanding can be improved or generated.</a:t>
             </a:r>
           </a:p>
           <a:p>
@@ -9904,6 +9905,12 @@
           <a:p>
             <a:r>
               <a:rPr lang="en-US" dirty="0"/>
+              <a:t>Open format can allow for creativity and easier annotation</a:t>
+            </a:r>
+          </a:p>
+          <a:p>
+            <a:r>
+              <a:rPr lang="en-US" dirty="0"/>
               <a:t>Concentrate on the work that I am performing rather than on tooling</a:t>
             </a:r>
           </a:p>
@@ -9917,12 +9924,6 @@
             <a:r>
               <a:rPr lang="en-US" dirty="0"/>
               <a:t>Sometimes it’s good if notetaking slows down progress</a:t>
-            </a:r>
-          </a:p>
-          <a:p>
-            <a:r>
-              <a:rPr lang="en-US" dirty="0"/>
-              <a:t>Open format can allow for creativity and easier annotation</a:t>
             </a:r>
           </a:p>
           <a:p>
@@ -10551,13 +10552,7 @@
               <a:rPr lang="en-US" dirty="0">
                 <a:hlinkClick r:id="rId3"/>
               </a:rPr>
-              <a:t>YouTub</a:t>
-            </a:r>
-            <a:r>
-              <a:rPr lang="en-US" dirty="0">
-                <a:hlinkClick r:id="rId3"/>
-              </a:rPr>
-              <a:t>e</a:t>
+              <a:t>YouTube</a:t>
             </a:r>
             <a:r>
               <a:rPr lang="en-US" dirty="0"/>
@@ -10925,7 +10920,7 @@
           <p:cNvPr id="2" name="Title 1">
             <a:extLst>
               <a:ext uri="{FF2B5EF4-FFF2-40B4-BE49-F238E27FC236}">
-                <a16:creationId xmlns:a16="http://schemas.microsoft.com/office/drawing/2014/main" id="{D1E181A3-6671-7FC8-9B8C-EFA7CD94AE43}"/>
+                <a16:creationId xmlns:a16="http://schemas.microsoft.com/office/drawing/2014/main" id="{DD7726F5-3910-8BD6-E06A-CE367C4572DD}"/>
               </a:ext>
             </a:extLst>
           </p:cNvPr>
@@ -10943,7 +10938,7 @@
           <a:p>
             <a:r>
               <a:rPr lang="en-US" dirty="0"/>
-              <a:t>Why discuss experimental sciences at ATPESC?</a:t>
+              <a:t>My background</a:t>
             </a:r>
           </a:p>
         </p:txBody>
@@ -10953,7 +10948,7 @@
           <p:cNvPr id="3" name="Content Placeholder 2">
             <a:extLst>
               <a:ext uri="{FF2B5EF4-FFF2-40B4-BE49-F238E27FC236}">
-                <a16:creationId xmlns:a16="http://schemas.microsoft.com/office/drawing/2014/main" id="{7478E814-3FD6-683A-287B-C6BF8DC954B1}"/>
+                <a16:creationId xmlns:a16="http://schemas.microsoft.com/office/drawing/2014/main" id="{EBD2BFD3-91EC-7E65-A99A-FDC0ED7B4620}"/>
               </a:ext>
             </a:extLst>
           </p:cNvPr>
@@ -10966,7 +10961,7 @@
         </p:nvSpPr>
         <p:spPr>
           <a:xfrm>
-            <a:off x="365760" y="1259840"/>
+            <a:off x="365760" y="1438778"/>
             <a:ext cx="11369809" cy="4047778"/>
           </a:xfrm>
         </p:spPr>
@@ -10974,62 +10969,113 @@
           <a:bodyPr/>
           <a:lstStyle/>
           <a:p>
+            <a:r>
+              <a:rPr lang="en-US" dirty="0"/>
+              <a:t>Experimental condensed matter physics background</a:t>
+            </a:r>
+          </a:p>
+          <a:p>
+            <a:pPr lvl="1"/>
+            <a:r>
+              <a:rPr lang="en-US" dirty="0"/>
+              <a:t>Low-energy positron diffraction</a:t>
+            </a:r>
+          </a:p>
+          <a:p>
+            <a:pPr lvl="1"/>
+            <a:r>
+              <a:rPr lang="en-US" dirty="0"/>
+              <a:t>Low-temperature, ultra-high-vacuum scanning tunneling microscopy</a:t>
+            </a:r>
+          </a:p>
+          <a:p>
+            <a:r>
+              <a:rPr lang="en-US" dirty="0"/>
+              <a:t>Professional experience in observational science environment</a:t>
+            </a:r>
+          </a:p>
+          <a:p>
+            <a:pPr lvl="1"/>
+            <a:r>
+              <a:rPr lang="en-US" dirty="0"/>
+              <a:t>European Southern Observatory’s Paranal Observatory</a:t>
+            </a:r>
+          </a:p>
+          <a:p>
+            <a:pPr lvl="1"/>
+            <a:r>
+              <a:rPr lang="en-US" dirty="0"/>
+              <a:t>Systems engineer specialized in adaptive optics</a:t>
+            </a:r>
+          </a:p>
+          <a:p>
+            <a:r>
+              <a:rPr lang="en-US" dirty="0"/>
+              <a:t>Scientific software developer</a:t>
+            </a:r>
+          </a:p>
+          <a:p>
+            <a:pPr lvl="1"/>
+            <a:r>
+              <a:rPr lang="en-US" dirty="0"/>
+              <a:t>Primarily focused on applications</a:t>
+            </a:r>
+          </a:p>
+          <a:p>
             <a:pPr marL="0" indent="0">
               <a:buNone/>
             </a:pPr>
-            <a:r>
-              <a:rPr lang="en-US" dirty="0"/>
-              <a:t>Scientific HPC is several young fields that “on close examination, have not really stabilized or optimized their collaborative processes in a manner analogous to that of more mature, ‘classical’ sciences. As a consequence, valuable science is often needlessly lost, or left uncollected.”</a:t>
-            </a:r>
-          </a:p>
-          <a:p>
-            <a:pPr marL="0" indent="0">
-              <a:buNone/>
-            </a:pPr>
-            <a:r>
-              <a:rPr lang="en-US" dirty="0"/>
-              <a:t>	- </a:t>
-            </a:r>
-            <a:r>
-              <a:rPr lang="en-US" sz="2000" dirty="0"/>
-              <a:t>Carlo Graziani, Computational Scientist at ANL, </a:t>
-            </a:r>
-            <a:r>
-              <a:rPr lang="en-US" sz="2000" i="1" dirty="0"/>
-              <a:t>HPC and the Lab Manager</a:t>
-            </a:r>
-          </a:p>
-          <a:p>
-            <a:pPr marL="0" indent="0">
-              <a:buNone/>
-            </a:pPr>
             <a:endParaRPr lang="en-US" dirty="0"/>
           </a:p>
-          <a:p>
-            <a:pPr marL="0" indent="0">
-              <a:buNone/>
-            </a:pPr>
-            <a:r>
-              <a:rPr lang="en-US" dirty="0"/>
-              <a:t>“… practicing the scientific method properly requires good software practices.  This is understood in the experimental community…The computational science side has had a historic problem with it.  As we can see, it’s getting better.”</a:t>
-            </a:r>
-          </a:p>
-          <a:p>
-            <a:pPr marL="0" indent="0">
-              <a:buNone/>
-            </a:pPr>
-            <a:r>
-              <a:rPr lang="en-US" dirty="0"/>
-              <a:t>	- </a:t>
-            </a:r>
-            <a:r>
-              <a:rPr lang="en-US" sz="2000" dirty="0"/>
-              <a:t>Katherine Riley, Director of Science at ALCF, ATPESC 2019</a:t>
-            </a:r>
-          </a:p>
-          <a:p>
-            <a:pPr marL="0" indent="0">
-              <a:buNone/>
+        </p:txBody>
+      </p:sp>
+      <p:sp>
+        <p:nvSpPr>
+          <p:cNvPr id="5" name="TextBox 4">
+            <a:extLst>
+              <a:ext uri="{FF2B5EF4-FFF2-40B4-BE49-F238E27FC236}">
+                <a16:creationId xmlns:a16="http://schemas.microsoft.com/office/drawing/2014/main" id="{32FF8EC1-19AD-86DC-1D34-D5AA90E512D2}"/>
+              </a:ext>
+            </a:extLst>
+          </p:cNvPr>
+          <p:cNvSpPr txBox="1"/>
+          <p:nvPr/>
+        </p:nvSpPr>
+        <p:spPr>
+          <a:xfrm>
+            <a:off x="3121573" y="5232715"/>
+            <a:ext cx="6620017" cy="766364"/>
+          </a:xfrm>
+          <a:prstGeom prst="rect">
+            <a:avLst/>
+          </a:prstGeom>
+          <a:noFill/>
+        </p:spPr>
+        <p:txBody>
+          <a:bodyPr wrap="none" lIns="118872" tIns="91440" rIns="118872" bIns="91440" rtlCol="0" anchor="ctr" anchorCtr="0">
+            <a:spAutoFit/>
+          </a:bodyPr>
+          <a:lstStyle/>
+          <a:p>
+            <a:pPr>
+              <a:lnSpc>
+                <a:spcPct val="90000"/>
+              </a:lnSpc>
+            </a:pPr>
+            <a:r>
+              <a:rPr lang="en-US" sz="2400" dirty="0"/>
+              <a:t>Always working on </a:t>
+            </a:r>
+            <a:r>
+              <a:rPr lang="en-US" sz="2400" b="1" dirty="0"/>
+              <a:t>scientific instrumentation</a:t>
+            </a:r>
+          </a:p>
+          <a:p>
+            <a:pPr algn="l">
+              <a:lnSpc>
+                <a:spcPct val="90000"/>
+              </a:lnSpc>
             </a:pPr>
             <a:endParaRPr lang="en-US" dirty="0"/>
           </a:p>
@@ -11038,7 +11084,7 @@
     </p:spTree>
     <p:extLst>
       <p:ext uri="{BB962C8B-B14F-4D97-AF65-F5344CB8AC3E}">
-        <p14:creationId xmlns:p14="http://schemas.microsoft.com/office/powerpoint/2010/main" val="437670017"/>
+        <p14:creationId xmlns:p14="http://schemas.microsoft.com/office/powerpoint/2010/main" val="1597596200"/>
       </p:ext>
     </p:extLst>
   </p:cSld>
@@ -11070,7 +11116,7 @@
           <p:cNvPr id="2" name="Title 1">
             <a:extLst>
               <a:ext uri="{FF2B5EF4-FFF2-40B4-BE49-F238E27FC236}">
-                <a16:creationId xmlns:a16="http://schemas.microsoft.com/office/drawing/2014/main" id="{DD7726F5-3910-8BD6-E06A-CE367C4572DD}"/>
+                <a16:creationId xmlns:a16="http://schemas.microsoft.com/office/drawing/2014/main" id="{D1E181A3-6671-7FC8-9B8C-EFA7CD94AE43}"/>
               </a:ext>
             </a:extLst>
           </p:cNvPr>
@@ -11088,7 +11134,7 @@
           <a:p>
             <a:r>
               <a:rPr lang="en-US" dirty="0"/>
-              <a:t>Why me?</a:t>
+              <a:t>Why discuss experimental sciences at ATPESC?</a:t>
             </a:r>
           </a:p>
         </p:txBody>
@@ -11098,7 +11144,7 @@
           <p:cNvPr id="3" name="Content Placeholder 2">
             <a:extLst>
               <a:ext uri="{FF2B5EF4-FFF2-40B4-BE49-F238E27FC236}">
-                <a16:creationId xmlns:a16="http://schemas.microsoft.com/office/drawing/2014/main" id="{EBD2BFD3-91EC-7E65-A99A-FDC0ED7B4620}"/>
+                <a16:creationId xmlns:a16="http://schemas.microsoft.com/office/drawing/2014/main" id="{7478E814-3FD6-683A-287B-C6BF8DC954B1}"/>
               </a:ext>
             </a:extLst>
           </p:cNvPr>
@@ -11111,7 +11157,7 @@
         </p:nvSpPr>
         <p:spPr>
           <a:xfrm>
-            <a:off x="365760" y="1438778"/>
+            <a:off x="365760" y="1259840"/>
             <a:ext cx="11369809" cy="4047778"/>
           </a:xfrm>
         </p:spPr>
@@ -11119,113 +11165,62 @@
           <a:bodyPr/>
           <a:lstStyle/>
           <a:p>
-            <a:r>
-              <a:rPr lang="en-US" dirty="0"/>
-              <a:t>Experimental condensed matter physics background</a:t>
-            </a:r>
-          </a:p>
-          <a:p>
-            <a:pPr lvl="1"/>
-            <a:r>
-              <a:rPr lang="en-US" dirty="0"/>
-              <a:t>Low-energy positron diffraction</a:t>
-            </a:r>
-          </a:p>
-          <a:p>
-            <a:pPr lvl="1"/>
-            <a:r>
-              <a:rPr lang="en-US" dirty="0"/>
-              <a:t>Low-temperature, ultra-high-vacuum scanning tunneling microscopy</a:t>
-            </a:r>
-          </a:p>
-          <a:p>
-            <a:r>
-              <a:rPr lang="en-US" dirty="0"/>
-              <a:t>Professional experience in observational science environment</a:t>
-            </a:r>
-          </a:p>
-          <a:p>
-            <a:pPr lvl="1"/>
-            <a:r>
-              <a:rPr lang="en-US" dirty="0"/>
-              <a:t>European Southern Observatory’s Paranal Observatory</a:t>
-            </a:r>
-          </a:p>
-          <a:p>
-            <a:pPr lvl="1"/>
-            <a:r>
-              <a:rPr lang="en-US" dirty="0"/>
-              <a:t>Systems engineer specialized in adaptive optics</a:t>
-            </a:r>
-          </a:p>
-          <a:p>
-            <a:r>
-              <a:rPr lang="en-US" dirty="0"/>
-              <a:t>Scientific software developer</a:t>
-            </a:r>
-          </a:p>
-          <a:p>
-            <a:pPr lvl="1"/>
-            <a:r>
-              <a:rPr lang="en-US" dirty="0"/>
-              <a:t>Primarily focused on applications</a:t>
-            </a:r>
-          </a:p>
-          <a:p>
             <a:pPr marL="0" indent="0">
               <a:buNone/>
             </a:pPr>
+            <a:r>
+              <a:rPr lang="en-US" dirty="0"/>
+              <a:t>Scientific HPC is several young fields that “on close examination, have not really stabilized or optimized their collaborative processes in a manner analogous to that of more mature, ‘classical’ sciences. As a consequence, valuable science is often needlessly lost, or left uncollected.”</a:t>
+            </a:r>
+          </a:p>
+          <a:p>
+            <a:pPr marL="0" indent="0">
+              <a:buNone/>
+            </a:pPr>
+            <a:r>
+              <a:rPr lang="en-US" dirty="0"/>
+              <a:t>	- </a:t>
+            </a:r>
+            <a:r>
+              <a:rPr lang="en-US" sz="2000" dirty="0"/>
+              <a:t>Carlo Graziani, Computational Scientist at ANL, </a:t>
+            </a:r>
+            <a:r>
+              <a:rPr lang="en-US" sz="2000" i="1" dirty="0"/>
+              <a:t>HPC and the Lab Manager</a:t>
+            </a:r>
+          </a:p>
+          <a:p>
+            <a:pPr marL="0" indent="0">
+              <a:buNone/>
+            </a:pPr>
             <a:endParaRPr lang="en-US" dirty="0"/>
           </a:p>
-        </p:txBody>
-      </p:sp>
-      <p:sp>
-        <p:nvSpPr>
-          <p:cNvPr id="5" name="TextBox 4">
-            <a:extLst>
-              <a:ext uri="{FF2B5EF4-FFF2-40B4-BE49-F238E27FC236}">
-                <a16:creationId xmlns:a16="http://schemas.microsoft.com/office/drawing/2014/main" id="{32FF8EC1-19AD-86DC-1D34-D5AA90E512D2}"/>
-              </a:ext>
-            </a:extLst>
-          </p:cNvPr>
-          <p:cNvSpPr txBox="1"/>
-          <p:nvPr/>
-        </p:nvSpPr>
-        <p:spPr>
-          <a:xfrm>
-            <a:off x="3121573" y="5232715"/>
-            <a:ext cx="6620017" cy="766364"/>
-          </a:xfrm>
-          <a:prstGeom prst="rect">
-            <a:avLst/>
-          </a:prstGeom>
-          <a:noFill/>
-        </p:spPr>
-        <p:txBody>
-          <a:bodyPr wrap="none" lIns="118872" tIns="91440" rIns="118872" bIns="91440" rtlCol="0" anchor="ctr" anchorCtr="0">
-            <a:spAutoFit/>
-          </a:bodyPr>
-          <a:lstStyle/>
-          <a:p>
-            <a:pPr>
-              <a:lnSpc>
-                <a:spcPct val="90000"/>
-              </a:lnSpc>
-            </a:pPr>
-            <a:r>
-              <a:rPr lang="en-US" sz="2400" dirty="0"/>
-              <a:t>Always working on </a:t>
-            </a:r>
-            <a:r>
-              <a:rPr lang="en-US" sz="2400" b="1" dirty="0"/>
-              <a:t>scientific instrumentation</a:t>
-            </a:r>
-          </a:p>
-          <a:p>
-            <a:pPr algn="l">
-              <a:lnSpc>
-                <a:spcPct val="90000"/>
-              </a:lnSpc>
+          <a:p>
+            <a:pPr marL="0" indent="0">
+              <a:buNone/>
+            </a:pPr>
+            <a:r>
+              <a:rPr lang="en-US" dirty="0"/>
+              <a:t>“… practicing the scientific method properly requires good software practices.  This is understood in the experimental community…The computational science side has had a historic problem with it.  As we can see, it’s getting better.”</a:t>
+            </a:r>
+          </a:p>
+          <a:p>
+            <a:pPr marL="0" indent="0">
+              <a:buNone/>
+            </a:pPr>
+            <a:r>
+              <a:rPr lang="en-US" dirty="0"/>
+              <a:t>	- </a:t>
+            </a:r>
+            <a:r>
+              <a:rPr lang="en-US" sz="2000" dirty="0"/>
+              <a:t>Katherine Riley, Director of Science at ALCF, ATPESC 2019</a:t>
+            </a:r>
+          </a:p>
+          <a:p>
+            <a:pPr marL="0" indent="0">
+              <a:buNone/>
             </a:pPr>
             <a:endParaRPr lang="en-US" dirty="0"/>
           </a:p>
@@ -11234,7 +11229,7 @@
     </p:spTree>
     <p:extLst>
       <p:ext uri="{BB962C8B-B14F-4D97-AF65-F5344CB8AC3E}">
-        <p14:creationId xmlns:p14="http://schemas.microsoft.com/office/powerpoint/2010/main" val="1597596200"/>
+        <p14:creationId xmlns:p14="http://schemas.microsoft.com/office/powerpoint/2010/main" val="437670017"/>
       </p:ext>
     </p:extLst>
   </p:cSld>
@@ -11742,21 +11737,21 @@
             <a:pPr lvl="1"/>
             <a:r>
               <a:rPr lang="en-US" dirty="0"/>
+              <a:t>A deep theoretical background in and practical experience with the system whose data was acquired and studied?</a:t>
+            </a:r>
+          </a:p>
+          <a:p>
+            <a:pPr lvl="1"/>
+            <a:r>
+              <a:rPr lang="en-US" dirty="0"/>
+              <a:t>The ability to explain why?</a:t>
+            </a:r>
+          </a:p>
+          <a:p>
+            <a:pPr lvl="1"/>
+            <a:r>
+              <a:rPr lang="en-US" dirty="0"/>
               <a:t>“Understanding is a kind of ecstasy” – Carl Sagan </a:t>
-            </a:r>
-          </a:p>
-          <a:p>
-            <a:pPr lvl="1"/>
-            <a:r>
-              <a:rPr lang="en-US" dirty="0"/>
-              <a:t>A deep theoretical background in and practical experience with the system whose data was acquired and studied?</a:t>
-            </a:r>
-          </a:p>
-          <a:p>
-            <a:pPr lvl="1"/>
-            <a:r>
-              <a:rPr lang="en-US" dirty="0"/>
-              <a:t>The ability to explain why?</a:t>
             </a:r>
           </a:p>
           <a:p>
@@ -12961,12 +12956,6 @@
 </file>
 
 <file path=customXml/item1.xml><?xml version="1.0" encoding="utf-8"?>
-<p:properties xmlns:p="http://schemas.microsoft.com/office/2006/metadata/properties" xmlns:xsi="http://www.w3.org/2001/XMLSchema-instance" xmlns:pc="http://schemas.microsoft.com/office/infopath/2007/PartnerControls">
-  <documentManagement/>
-</p:properties>
-</file>
-
-<file path=customXml/item2.xml><?xml version="1.0" encoding="utf-8"?>
 <ct:contentTypeSchema xmlns:ct="http://schemas.microsoft.com/office/2006/metadata/contentType" xmlns:ma="http://schemas.microsoft.com/office/2006/metadata/properties/metaAttributes" ct:_="" ma:_="" ma:contentTypeName="Document" ma:contentTypeID="0x010100565464437F680748A68B85EB6594EA7D" ma:contentTypeVersion="0" ma:contentTypeDescription="Create a new document." ma:contentTypeScope="" ma:versionID="fe3f4dd58d5914c51cfc6deaa8ad845c">
   <xsd:schema xmlns:xsd="http://www.w3.org/2001/XMLSchema" xmlns:p="http://schemas.microsoft.com/office/2006/metadata/properties" targetNamespace="http://schemas.microsoft.com/office/2006/metadata/properties" ma:root="true" ma:fieldsID="4aeb20c0e3442673af7ee10786458764">
     <xsd:element name="properties">
@@ -13015,6 +13004,12 @@
 </ct:contentTypeSchema>
 </file>
 
+<file path=customXml/item2.xml><?xml version="1.0" encoding="utf-8"?>
+<p:properties xmlns:p="http://schemas.microsoft.com/office/2006/metadata/properties" xmlns:xsi="http://www.w3.org/2001/XMLSchema-instance" xmlns:pc="http://schemas.microsoft.com/office/infopath/2007/PartnerControls">
+  <documentManagement/>
+</p:properties>
+</file>
+
 <file path=customXml/item3.xml><?xml version="1.0" encoding="utf-8"?>
 <?mso-contentType ?>
 <FormTemplates xmlns="http://schemas.microsoft.com/sharepoint/v3/contenttype/forms">
@@ -13025,6 +13020,21 @@
 </file>
 
 <file path=customXml/itemProps1.xml><?xml version="1.0" encoding="utf-8"?>
+<ds:datastoreItem xmlns:ds="http://schemas.openxmlformats.org/officeDocument/2006/customXml" ds:itemID="{E8DB7DEB-074E-4EE8-9B6E-FD277323109C}">
+  <ds:schemaRefs>
+    <ds:schemaRef ds:uri="http://schemas.microsoft.com/office/2006/metadata/contentType"/>
+    <ds:schemaRef ds:uri="http://schemas.microsoft.com/office/2006/metadata/properties/metaAttributes"/>
+    <ds:schemaRef ds:uri="http://www.w3.org/2001/XMLSchema"/>
+    <ds:schemaRef ds:uri="http://schemas.microsoft.com/office/2006/metadata/properties"/>
+    <ds:schemaRef ds:uri="http://schemas.openxmlformats.org/package/2006/metadata/core-properties"/>
+    <ds:schemaRef ds:uri="http://purl.org/dc/elements/1.1/"/>
+    <ds:schemaRef ds:uri="http://purl.org/dc/terms/"/>
+    <ds:schemaRef ds:uri="http://schemas.microsoft.com/office/internal/2005/internalDocumentation"/>
+  </ds:schemaRefs>
+</ds:datastoreItem>
+</file>
+
+<file path=customXml/itemProps2.xml><?xml version="1.0" encoding="utf-8"?>
 <ds:datastoreItem xmlns:ds="http://schemas.openxmlformats.org/officeDocument/2006/customXml" ds:itemID="{A50EC660-24D0-43A0-AE5E-E274115E726B}">
   <ds:schemaRefs>
     <ds:schemaRef ds:uri="http://purl.org/dc/elements/1.1/"/>
@@ -13039,21 +13049,6 @@
 </ds:datastoreItem>
 </file>
 
-<file path=customXml/itemProps2.xml><?xml version="1.0" encoding="utf-8"?>
-<ds:datastoreItem xmlns:ds="http://schemas.openxmlformats.org/officeDocument/2006/customXml" ds:itemID="{E8DB7DEB-074E-4EE8-9B6E-FD277323109C}">
-  <ds:schemaRefs>
-    <ds:schemaRef ds:uri="http://schemas.microsoft.com/office/2006/metadata/contentType"/>
-    <ds:schemaRef ds:uri="http://schemas.microsoft.com/office/2006/metadata/properties/metaAttributes"/>
-    <ds:schemaRef ds:uri="http://www.w3.org/2001/XMLSchema"/>
-    <ds:schemaRef ds:uri="http://schemas.microsoft.com/office/2006/metadata/properties"/>
-    <ds:schemaRef ds:uri="http://schemas.openxmlformats.org/package/2006/metadata/core-properties"/>
-    <ds:schemaRef ds:uri="http://purl.org/dc/elements/1.1/"/>
-    <ds:schemaRef ds:uri="http://purl.org/dc/terms/"/>
-    <ds:schemaRef ds:uri="http://schemas.microsoft.com/office/internal/2005/internalDocumentation"/>
-  </ds:schemaRefs>
-</ds:datastoreItem>
-</file>
-
 <file path=customXml/itemProps3.xml><?xml version="1.0" encoding="utf-8"?>
 <ds:datastoreItem xmlns:ds="http://schemas.openxmlformats.org/officeDocument/2006/customXml" ds:itemID="{19E20559-B232-4371-8690-E3D8007EDB82}">
   <ds:schemaRefs>

</xml_diff>

<commit_message>
Update DavidB's presentations for SC23
</commit_message>
<xml_diff>
--- a/lab-notebooks.pptx
+++ b/lab-notebooks.pptx
@@ -12,7 +12,7 @@
   </p:handoutMasterIdLst>
   <p:sldIdLst>
     <p:sldId id="256" r:id="rId5"/>
-    <p:sldId id="350" r:id="rId6"/>
+    <p:sldId id="320" r:id="rId6"/>
     <p:sldId id="349" r:id="rId7"/>
     <p:sldId id="322" r:id="rId8"/>
     <p:sldId id="325" r:id="rId9"/>
@@ -283,7 +283,7 @@
           <a:p>
             <a:fld id="{0B842F42-2CE9-4E35-95C1-410DC08A50B1}" type="datetimeFigureOut">
               <a:rPr lang="en-US" smtClean="0"/>
-              <a:t>7/28/2023</a:t>
+              <a:t>10/26/2023</a:t>
             </a:fld>
             <a:endParaRPr lang="en-US"/>
           </a:p>
@@ -448,7 +448,7 @@
           <a:p>
             <a:fld id="{6F282904-F315-4730-8D91-37D99E141A6F}" type="datetimeFigureOut">
               <a:rPr lang="en-US" smtClean="0"/>
-              <a:t>7/28/2023</a:t>
+              <a:t>10/26/2023</a:t>
             </a:fld>
             <a:endParaRPr lang="en-US"/>
           </a:p>
@@ -6595,14 +6595,25 @@
           <a:bodyPr/>
           <a:lstStyle/>
           <a:p>
-            <a:pPr>
-              <a:spcBef>
-                <a:spcPts val="2800"/>
-              </a:spcBef>
-            </a:pPr>
+            <a:r>
+              <a:rPr lang="en-US" sz="2000" b="0" i="0" dirty="0">
+                <a:solidFill>
+                  <a:srgbClr val="111111"/>
+                </a:solidFill>
+                <a:effectLst/>
+                <a:latin typeface="+mn-lt"/>
+              </a:rPr>
+              <a:t>Better Software for Reproducible Science tutorial</a:t>
+            </a:r>
+            <a:r>
+              <a:rPr lang="en-US" sz="2000" dirty="0">
+                <a:latin typeface="+mn-lt"/>
+              </a:rPr>
+              <a:t> </a:t>
+            </a:r>
             <a:r>
               <a:rPr lang="en-US" sz="2000" dirty="0"/>
-              <a:t>Better Scientific Software tutorial @ NOAA Global Systems Laboratory </a:t>
+              <a:t>@ SC23</a:t>
             </a:r>
           </a:p>
         </p:txBody>
@@ -9638,9 +9649,9 @@
                   <a:srgbClr val="111111"/>
                 </a:solidFill>
                 <a:effectLst/>
-                <a:latin typeface="+mj-lt"/>
+                <a:latin typeface="+mn-lt"/>
               </a:rPr>
-              <a:t>David E. Bernholdt, Anshu Dubey, and Patricia A. Grubel, Better Scientific Software tutorial, in NOAA Global Systems Laboratory, Boulder, Colorado, 2023. DOI: </a:t>
+              <a:t>David E. Bernholdt, Patricia A. Grubel, David M. Rogers, and Gregory R. Watson, Better Software for Reproducible Science tutorial, in The International Conference for High-Performance Computing, Networking, Storage, and Analysis (SC23), Denver, Colorado, 2023. DOI: </a:t>
             </a:r>
             <a:r>
               <a:rPr lang="en-US" sz="1600" b="0" i="0" u="none" strike="noStrike" dirty="0">
@@ -9648,10 +9659,10 @@
                   <a:srgbClr val="2A7AE2"/>
                 </a:solidFill>
                 <a:effectLst/>
-                <a:latin typeface="+mj-lt"/>
+                <a:latin typeface="+mn-lt"/>
                 <a:hlinkClick r:id="rId4"/>
               </a:rPr>
-              <a:t>10.6084/m9.figshare.23796606</a:t>
+              <a:t>10.6084/m9.figshare.24226105</a:t>
             </a:r>
             <a:r>
               <a:rPr lang="en-US" sz="1600" b="0" i="0" dirty="0">
@@ -9659,7 +9670,7 @@
                   <a:srgbClr val="111111"/>
                 </a:solidFill>
                 <a:effectLst/>
-                <a:latin typeface="+mj-lt"/>
+                <a:latin typeface="+mn-lt"/>
               </a:rPr>
               <a:t>.</a:t>
             </a:r>
@@ -9832,7 +9843,7 @@
     </p:spTree>
     <p:extLst>
       <p:ext uri="{BB962C8B-B14F-4D97-AF65-F5344CB8AC3E}">
-        <p14:creationId xmlns:p14="http://schemas.microsoft.com/office/powerpoint/2010/main" val="1080259182"/>
+        <p14:creationId xmlns:p14="http://schemas.microsoft.com/office/powerpoint/2010/main" val="978726433"/>
       </p:ext>
     </p:extLst>
   </p:cSld>
@@ -13778,15 +13789,6 @@
 </file>
 
 <file path=customXml/item1.xml><?xml version="1.0" encoding="utf-8"?>
-<?mso-contentType ?>
-<FormTemplates xmlns="http://schemas.microsoft.com/sharepoint/v3/contenttype/forms">
-  <Display>DocumentLibraryForm</Display>
-  <Edit>DocumentLibraryForm</Edit>
-  <New>DocumentLibraryForm</New>
-</FormTemplates>
-</file>
-
-<file path=customXml/item2.xml><?xml version="1.0" encoding="utf-8"?>
 <ct:contentTypeSchema xmlns:ct="http://schemas.microsoft.com/office/2006/metadata/contentType" xmlns:ma="http://schemas.microsoft.com/office/2006/metadata/properties/metaAttributes" ct:_="" ma:_="" ma:contentTypeName="Document" ma:contentTypeID="0x010100565464437F680748A68B85EB6594EA7D" ma:contentTypeVersion="0" ma:contentTypeDescription="Create a new document." ma:contentTypeScope="" ma:versionID="fe3f4dd58d5914c51cfc6deaa8ad845c">
   <xsd:schema xmlns:xsd="http://www.w3.org/2001/XMLSchema" xmlns:p="http://schemas.microsoft.com/office/2006/metadata/properties" targetNamespace="http://schemas.microsoft.com/office/2006/metadata/properties" ma:root="true" ma:fieldsID="4aeb20c0e3442673af7ee10786458764">
     <xsd:element name="properties">
@@ -13835,6 +13837,15 @@
 </ct:contentTypeSchema>
 </file>
 
+<file path=customXml/item2.xml><?xml version="1.0" encoding="utf-8"?>
+<?mso-contentType ?>
+<FormTemplates xmlns="http://schemas.microsoft.com/sharepoint/v3/contenttype/forms">
+  <Display>DocumentLibraryForm</Display>
+  <Edit>DocumentLibraryForm</Edit>
+  <New>DocumentLibraryForm</New>
+</FormTemplates>
+</file>
+
 <file path=customXml/item3.xml><?xml version="1.0" encoding="utf-8"?>
 <p:properties xmlns:p="http://schemas.microsoft.com/office/2006/metadata/properties" xmlns:xsi="http://www.w3.org/2001/XMLSchema-instance" xmlns:pc="http://schemas.microsoft.com/office/infopath/2007/PartnerControls">
   <documentManagement/>
@@ -13842,14 +13853,6 @@
 </file>
 
 <file path=customXml/itemProps1.xml><?xml version="1.0" encoding="utf-8"?>
-<ds:datastoreItem xmlns:ds="http://schemas.openxmlformats.org/officeDocument/2006/customXml" ds:itemID="{19E20559-B232-4371-8690-E3D8007EDB82}">
-  <ds:schemaRefs>
-    <ds:schemaRef ds:uri="http://schemas.microsoft.com/sharepoint/v3/contenttype/forms"/>
-  </ds:schemaRefs>
-</ds:datastoreItem>
-</file>
-
-<file path=customXml/itemProps2.xml><?xml version="1.0" encoding="utf-8"?>
 <ds:datastoreItem xmlns:ds="http://schemas.openxmlformats.org/officeDocument/2006/customXml" ds:itemID="{E8DB7DEB-074E-4EE8-9B6E-FD277323109C}">
   <ds:schemaRefs>
     <ds:schemaRef ds:uri="http://schemas.microsoft.com/office/2006/metadata/contentType"/>
@@ -13860,6 +13863,14 @@
     <ds:schemaRef ds:uri="http://purl.org/dc/elements/1.1/"/>
     <ds:schemaRef ds:uri="http://purl.org/dc/terms/"/>
     <ds:schemaRef ds:uri="http://schemas.microsoft.com/office/internal/2005/internalDocumentation"/>
+  </ds:schemaRefs>
+</ds:datastoreItem>
+</file>
+
+<file path=customXml/itemProps2.xml><?xml version="1.0" encoding="utf-8"?>
+<ds:datastoreItem xmlns:ds="http://schemas.openxmlformats.org/officeDocument/2006/customXml" ds:itemID="{19E20559-B232-4371-8690-E3D8007EDB82}">
+  <ds:schemaRefs>
+    <ds:schemaRef ds:uri="http://schemas.microsoft.com/sharepoint/v3/contenttype/forms"/>
   </ds:schemaRefs>
 </ds:datastoreItem>
 </file>

</xml_diff>